<commit_message>
Modulo 2 y 3
</commit_message>
<xml_diff>
--- a/Módulos/Módulo 3/Boceto/Boceto.pptx
+++ b/Módulos/Módulo 3/Boceto/Boceto.pptx
@@ -6,33 +6,33 @@
   </p:sldMasterIdLst>
   <p:sldIdLst>
     <p:sldId id="256" r:id="rId2"/>
-    <p:sldId id="257" r:id="rId3"/>
-    <p:sldId id="263" r:id="rId4"/>
-    <p:sldId id="258" r:id="rId5"/>
-    <p:sldId id="259" r:id="rId6"/>
-    <p:sldId id="260" r:id="rId7"/>
-    <p:sldId id="261" r:id="rId8"/>
-    <p:sldId id="262" r:id="rId9"/>
-    <p:sldId id="264" r:id="rId10"/>
-    <p:sldId id="265" r:id="rId11"/>
-    <p:sldId id="267" r:id="rId12"/>
-    <p:sldId id="266" r:id="rId13"/>
-    <p:sldId id="268" r:id="rId14"/>
-    <p:sldId id="269" r:id="rId15"/>
-    <p:sldId id="270" r:id="rId16"/>
-    <p:sldId id="273" r:id="rId17"/>
-    <p:sldId id="274" r:id="rId18"/>
-    <p:sldId id="276" r:id="rId19"/>
-    <p:sldId id="271" r:id="rId20"/>
-    <p:sldId id="272" r:id="rId21"/>
-    <p:sldId id="275" r:id="rId22"/>
-    <p:sldId id="277" r:id="rId23"/>
-    <p:sldId id="280" r:id="rId24"/>
-    <p:sldId id="281" r:id="rId25"/>
-    <p:sldId id="282" r:id="rId26"/>
-    <p:sldId id="278" r:id="rId27"/>
-    <p:sldId id="283" r:id="rId28"/>
-    <p:sldId id="284" r:id="rId29"/>
+    <p:sldId id="290" r:id="rId3"/>
+    <p:sldId id="291" r:id="rId4"/>
+    <p:sldId id="292" r:id="rId5"/>
+    <p:sldId id="257" r:id="rId6"/>
+    <p:sldId id="263" r:id="rId7"/>
+    <p:sldId id="258" r:id="rId8"/>
+    <p:sldId id="259" r:id="rId9"/>
+    <p:sldId id="260" r:id="rId10"/>
+    <p:sldId id="261" r:id="rId11"/>
+    <p:sldId id="262" r:id="rId12"/>
+    <p:sldId id="264" r:id="rId13"/>
+    <p:sldId id="265" r:id="rId14"/>
+    <p:sldId id="267" r:id="rId15"/>
+    <p:sldId id="266" r:id="rId16"/>
+    <p:sldId id="268" r:id="rId17"/>
+    <p:sldId id="270" r:id="rId18"/>
+    <p:sldId id="273" r:id="rId19"/>
+    <p:sldId id="274" r:id="rId20"/>
+    <p:sldId id="276" r:id="rId21"/>
+    <p:sldId id="271" r:id="rId22"/>
+    <p:sldId id="272" r:id="rId23"/>
+    <p:sldId id="275" r:id="rId24"/>
+    <p:sldId id="278" r:id="rId25"/>
+    <p:sldId id="283" r:id="rId26"/>
+    <p:sldId id="293" r:id="rId27"/>
+    <p:sldId id="294" r:id="rId28"/>
+    <p:sldId id="295" r:id="rId29"/>
     <p:sldId id="279" r:id="rId30"/>
     <p:sldId id="285" r:id="rId31"/>
     <p:sldId id="286" r:id="rId32"/>
@@ -136,6 +136,11 @@
       </a:defRPr>
     </a:lvl9pPr>
   </p:defaultTextStyle>
+  <p:extLst>
+    <p:ext uri="{EFAFB233-063F-42B5-8137-9DF3F51BA10A}">
+      <p15:sldGuideLst xmlns:p15="http://schemas.microsoft.com/office/powerpoint/2012/main"/>
+    </p:ext>
+  </p:extLst>
 </p:presentation>
 </file>
 
@@ -288,7 +293,7 @@
           <a:p>
             <a:fld id="{92A6B4C6-52FB-4472-9FB7-3E8303B7B811}" type="datetimeFigureOut">
               <a:rPr lang="es-CO" smtClean="0"/>
-              <a:t>19/03/2024</a:t>
+              <a:t>20/03/2024</a:t>
             </a:fld>
             <a:endParaRPr lang="es-CO"/>
           </a:p>
@@ -488,7 +493,7 @@
           <a:p>
             <a:fld id="{92A6B4C6-52FB-4472-9FB7-3E8303B7B811}" type="datetimeFigureOut">
               <a:rPr lang="es-CO" smtClean="0"/>
-              <a:t>19/03/2024</a:t>
+              <a:t>20/03/2024</a:t>
             </a:fld>
             <a:endParaRPr lang="es-CO"/>
           </a:p>
@@ -698,7 +703,7 @@
           <a:p>
             <a:fld id="{92A6B4C6-52FB-4472-9FB7-3E8303B7B811}" type="datetimeFigureOut">
               <a:rPr lang="es-CO" smtClean="0"/>
-              <a:t>19/03/2024</a:t>
+              <a:t>20/03/2024</a:t>
             </a:fld>
             <a:endParaRPr lang="es-CO"/>
           </a:p>
@@ -898,7 +903,7 @@
           <a:p>
             <a:fld id="{92A6B4C6-52FB-4472-9FB7-3E8303B7B811}" type="datetimeFigureOut">
               <a:rPr lang="es-CO" smtClean="0"/>
-              <a:t>19/03/2024</a:t>
+              <a:t>20/03/2024</a:t>
             </a:fld>
             <a:endParaRPr lang="es-CO"/>
           </a:p>
@@ -1174,7 +1179,7 @@
           <a:p>
             <a:fld id="{92A6B4C6-52FB-4472-9FB7-3E8303B7B811}" type="datetimeFigureOut">
               <a:rPr lang="es-CO" smtClean="0"/>
-              <a:t>19/03/2024</a:t>
+              <a:t>20/03/2024</a:t>
             </a:fld>
             <a:endParaRPr lang="es-CO"/>
           </a:p>
@@ -1442,7 +1447,7 @@
           <a:p>
             <a:fld id="{92A6B4C6-52FB-4472-9FB7-3E8303B7B811}" type="datetimeFigureOut">
               <a:rPr lang="es-CO" smtClean="0"/>
-              <a:t>19/03/2024</a:t>
+              <a:t>20/03/2024</a:t>
             </a:fld>
             <a:endParaRPr lang="es-CO"/>
           </a:p>
@@ -1857,7 +1862,7 @@
           <a:p>
             <a:fld id="{92A6B4C6-52FB-4472-9FB7-3E8303B7B811}" type="datetimeFigureOut">
               <a:rPr lang="es-CO" smtClean="0"/>
-              <a:t>19/03/2024</a:t>
+              <a:t>20/03/2024</a:t>
             </a:fld>
             <a:endParaRPr lang="es-CO"/>
           </a:p>
@@ -1999,7 +2004,7 @@
           <a:p>
             <a:fld id="{92A6B4C6-52FB-4472-9FB7-3E8303B7B811}" type="datetimeFigureOut">
               <a:rPr lang="es-CO" smtClean="0"/>
-              <a:t>19/03/2024</a:t>
+              <a:t>20/03/2024</a:t>
             </a:fld>
             <a:endParaRPr lang="es-CO"/>
           </a:p>
@@ -2112,7 +2117,7 @@
           <a:p>
             <a:fld id="{92A6B4C6-52FB-4472-9FB7-3E8303B7B811}" type="datetimeFigureOut">
               <a:rPr lang="es-CO" smtClean="0"/>
-              <a:t>19/03/2024</a:t>
+              <a:t>20/03/2024</a:t>
             </a:fld>
             <a:endParaRPr lang="es-CO"/>
           </a:p>
@@ -2425,7 +2430,7 @@
           <a:p>
             <a:fld id="{92A6B4C6-52FB-4472-9FB7-3E8303B7B811}" type="datetimeFigureOut">
               <a:rPr lang="es-CO" smtClean="0"/>
-              <a:t>19/03/2024</a:t>
+              <a:t>20/03/2024</a:t>
             </a:fld>
             <a:endParaRPr lang="es-CO"/>
           </a:p>
@@ -2714,7 +2719,7 @@
           <a:p>
             <a:fld id="{92A6B4C6-52FB-4472-9FB7-3E8303B7B811}" type="datetimeFigureOut">
               <a:rPr lang="es-CO" smtClean="0"/>
-              <a:t>19/03/2024</a:t>
+              <a:t>20/03/2024</a:t>
             </a:fld>
             <a:endParaRPr lang="es-CO"/>
           </a:p>
@@ -2957,7 +2962,7 @@
           <a:p>
             <a:fld id="{92A6B4C6-52FB-4472-9FB7-3E8303B7B811}" type="datetimeFigureOut">
               <a:rPr lang="es-CO" smtClean="0"/>
-              <a:t>19/03/2024</a:t>
+              <a:t>20/03/2024</a:t>
             </a:fld>
             <a:endParaRPr lang="es-CO"/>
           </a:p>
@@ -3463,7 +3468,7 @@
           <p:cNvPr id="2" name="Título 1">
             <a:extLst>
               <a:ext uri="{FF2B5EF4-FFF2-40B4-BE49-F238E27FC236}">
-                <a16:creationId xmlns:a16="http://schemas.microsoft.com/office/drawing/2014/main" id="{3FA5BEAA-1C13-D6B6-7AFE-5A28A5A37B23}"/>
+                <a16:creationId xmlns:a16="http://schemas.microsoft.com/office/drawing/2014/main" id="{758FBC08-6F65-2E0E-B919-895DCC315CB6}"/>
               </a:ext>
             </a:extLst>
           </p:cNvPr>
@@ -3476,19 +3481,17 @@
         </p:nvSpPr>
         <p:spPr>
           <a:xfrm>
-            <a:off x="829810" y="245991"/>
-            <a:ext cx="6938396" cy="945246"/>
-          </a:xfrm>
-        </p:spPr>
-        <p:txBody>
-          <a:bodyPr>
-            <a:normAutofit fontScale="90000"/>
-          </a:bodyPr>
+            <a:off x="838200" y="155623"/>
+            <a:ext cx="10515600" cy="1325563"/>
+          </a:xfrm>
+        </p:spPr>
+        <p:txBody>
+          <a:bodyPr/>
           <a:lstStyle/>
           <a:p>
             <a:r>
               <a:rPr lang="es-ES" dirty="0"/>
-              <a:t>Comparación de distribuciones</a:t>
+              <a:t>Examinar variables categóricas (cont.) </a:t>
             </a:r>
             <a:endParaRPr lang="es-CO" dirty="0"/>
           </a:p>
@@ -3499,7 +3502,7 @@
           <p:cNvPr id="4" name="Imagen 3">
             <a:extLst>
               <a:ext uri="{FF2B5EF4-FFF2-40B4-BE49-F238E27FC236}">
-                <a16:creationId xmlns:a16="http://schemas.microsoft.com/office/drawing/2014/main" id="{7E77027F-F5A1-26A0-F555-08F32173E0E8}"/>
+                <a16:creationId xmlns:a16="http://schemas.microsoft.com/office/drawing/2014/main" id="{4E1FBA2F-3F7C-C2EA-0F73-A3F47736D450}"/>
               </a:ext>
             </a:extLst>
           </p:cNvPr>
@@ -3516,20 +3519,60 @@
         </p:blipFill>
         <p:spPr>
           <a:xfrm>
-            <a:off x="4084738" y="962895"/>
-            <a:ext cx="7287777" cy="5713257"/>
+            <a:off x="1165851" y="1321796"/>
+            <a:ext cx="4930149" cy="5078131"/>
           </a:xfrm>
           <a:prstGeom prst="rect">
             <a:avLst/>
           </a:prstGeom>
+          <a:ln w="12700">
+            <a:solidFill>
+              <a:schemeClr val="tx1"/>
+            </a:solidFill>
+          </a:ln>
         </p:spPr>
       </p:pic>
-      <p:sp>
-        <p:nvSpPr>
-          <p:cNvPr id="6" name="CuadroTexto 5">
-            <a:extLst>
-              <a:ext uri="{FF2B5EF4-FFF2-40B4-BE49-F238E27FC236}">
-                <a16:creationId xmlns:a16="http://schemas.microsoft.com/office/drawing/2014/main" id="{02C6B9A4-BFC7-6FD7-3D7B-4BCB276F18B4}"/>
+      <p:pic>
+        <p:nvPicPr>
+          <p:cNvPr id="7" name="Imagen 6">
+            <a:extLst>
+              <a:ext uri="{FF2B5EF4-FFF2-40B4-BE49-F238E27FC236}">
+                <a16:creationId xmlns:a16="http://schemas.microsoft.com/office/drawing/2014/main" id="{944EF5AA-5893-7CA2-2250-1F6835C2EDD0}"/>
+              </a:ext>
+            </a:extLst>
+          </p:cNvPr>
+          <p:cNvPicPr>
+            <a:picLocks noChangeAspect="1"/>
+          </p:cNvPicPr>
+          <p:nvPr/>
+        </p:nvPicPr>
+        <p:blipFill>
+          <a:blip r:embed="rId3"/>
+          <a:stretch>
+            <a:fillRect/>
+          </a:stretch>
+        </p:blipFill>
+        <p:spPr>
+          <a:xfrm>
+            <a:off x="7806437" y="2410485"/>
+            <a:ext cx="2152650" cy="1895475"/>
+          </a:xfrm>
+          <a:prstGeom prst="rect">
+            <a:avLst/>
+          </a:prstGeom>
+          <a:ln w="12700">
+            <a:solidFill>
+              <a:schemeClr val="tx1"/>
+            </a:solidFill>
+          </a:ln>
+        </p:spPr>
+      </p:pic>
+      <p:sp>
+        <p:nvSpPr>
+          <p:cNvPr id="8" name="CuadroTexto 7">
+            <a:extLst>
+              <a:ext uri="{FF2B5EF4-FFF2-40B4-BE49-F238E27FC236}">
+                <a16:creationId xmlns:a16="http://schemas.microsoft.com/office/drawing/2014/main" id="{30C82750-CC75-68DC-6892-D0F91C60A40F}"/>
               </a:ext>
             </a:extLst>
           </p:cNvPr>
@@ -3538,8 +3581,8 @@
         </p:nvSpPr>
         <p:spPr>
           <a:xfrm>
-            <a:off x="313887" y="1652781"/>
-            <a:ext cx="3847052" cy="923330"/>
+            <a:off x="6581513" y="1481186"/>
+            <a:ext cx="4286774" cy="646331"/>
           </a:xfrm>
           <a:prstGeom prst="rect">
             <a:avLst/>
@@ -3554,7 +3597,79 @@
           <a:p>
             <a:r>
               <a:rPr lang="es-ES" dirty="0"/>
-              <a:t>Introducir directamente la prueba de Kruskal-Wallis (incluir tratamiento formal)</a:t>
+              <a:t>Los resultados son verificados mediante una prueba chi-2 por independencia</a:t>
+            </a:r>
+            <a:endParaRPr lang="es-CO" dirty="0"/>
+          </a:p>
+        </p:txBody>
+      </p:sp>
+      <p:sp>
+        <p:nvSpPr>
+          <p:cNvPr id="9" name="CuadroTexto 8">
+            <a:extLst>
+              <a:ext uri="{FF2B5EF4-FFF2-40B4-BE49-F238E27FC236}">
+                <a16:creationId xmlns:a16="http://schemas.microsoft.com/office/drawing/2014/main" id="{DB7F0733-3C70-7C1A-7DED-83E0D4903130}"/>
+              </a:ext>
+            </a:extLst>
+          </p:cNvPr>
+          <p:cNvSpPr txBox="1"/>
+          <p:nvPr/>
+        </p:nvSpPr>
+        <p:spPr>
+          <a:xfrm>
+            <a:off x="6739375" y="5376814"/>
+            <a:ext cx="4286774" cy="923330"/>
+          </a:xfrm>
+          <a:prstGeom prst="rect">
+            <a:avLst/>
+          </a:prstGeom>
+          <a:noFill/>
+        </p:spPr>
+        <p:txBody>
+          <a:bodyPr wrap="square" rtlCol="0">
+            <a:spAutoFit/>
+          </a:bodyPr>
+          <a:lstStyle/>
+          <a:p>
+            <a:r>
+              <a:rPr lang="es-ES" dirty="0"/>
+              <a:t>Nota: esta forma extendida no debe ser el centro. Sólo deben aprender a correr la prueba.</a:t>
+            </a:r>
+            <a:endParaRPr lang="es-CO" dirty="0"/>
+          </a:p>
+        </p:txBody>
+      </p:sp>
+      <p:sp>
+        <p:nvSpPr>
+          <p:cNvPr id="10" name="CuadroTexto 9">
+            <a:extLst>
+              <a:ext uri="{FF2B5EF4-FFF2-40B4-BE49-F238E27FC236}">
+                <a16:creationId xmlns:a16="http://schemas.microsoft.com/office/drawing/2014/main" id="{72560CEF-612D-FF02-75BB-533B77B5B46A}"/>
+              </a:ext>
+            </a:extLst>
+          </p:cNvPr>
+          <p:cNvSpPr txBox="1"/>
+          <p:nvPr/>
+        </p:nvSpPr>
+        <p:spPr>
+          <a:xfrm>
+            <a:off x="6739375" y="4588928"/>
+            <a:ext cx="4286774" cy="646331"/>
+          </a:xfrm>
+          <a:prstGeom prst="rect">
+            <a:avLst/>
+          </a:prstGeom>
+          <a:noFill/>
+        </p:spPr>
+        <p:txBody>
+          <a:bodyPr wrap="square" rtlCol="0">
+            <a:spAutoFit/>
+          </a:bodyPr>
+          <a:lstStyle/>
+          <a:p>
+            <a:r>
+              <a:rPr lang="es-ES" dirty="0"/>
+              <a:t>Lo mismo se realiza para la variable educación</a:t>
             </a:r>
             <a:endParaRPr lang="es-CO" dirty="0"/>
           </a:p>
@@ -3563,7 +3678,7 @@
     </p:spTree>
     <p:extLst>
       <p:ext uri="{BB962C8B-B14F-4D97-AF65-F5344CB8AC3E}">
-        <p14:creationId xmlns:p14="http://schemas.microsoft.com/office/powerpoint/2010/main" val="2180135705"/>
+        <p14:creationId xmlns:p14="http://schemas.microsoft.com/office/powerpoint/2010/main" val="1385627984"/>
       </p:ext>
     </p:extLst>
   </p:cSld>
@@ -3608,55 +3723,17 @@
         </p:nvSpPr>
         <p:spPr>
           <a:xfrm>
-            <a:off x="829810" y="245991"/>
-            <a:ext cx="6938396" cy="945246"/>
-          </a:xfrm>
-        </p:spPr>
-        <p:txBody>
-          <a:bodyPr>
-            <a:normAutofit fontScale="90000"/>
-          </a:bodyPr>
+            <a:off x="829811" y="245991"/>
+            <a:ext cx="3935136" cy="1287506"/>
+          </a:xfrm>
+        </p:spPr>
+        <p:txBody>
+          <a:bodyPr/>
           <a:lstStyle/>
           <a:p>
             <a:r>
               <a:rPr lang="es-ES" dirty="0"/>
-              <a:t>Comparación de distribuciones</a:t>
-            </a:r>
-            <a:endParaRPr lang="es-CO" dirty="0"/>
-          </a:p>
-        </p:txBody>
-      </p:sp>
-      <p:sp>
-        <p:nvSpPr>
-          <p:cNvPr id="6" name="CuadroTexto 5">
-            <a:extLst>
-              <a:ext uri="{FF2B5EF4-FFF2-40B4-BE49-F238E27FC236}">
-                <a16:creationId xmlns:a16="http://schemas.microsoft.com/office/drawing/2014/main" id="{02C6B9A4-BFC7-6FD7-3D7B-4BCB276F18B4}"/>
-              </a:ext>
-            </a:extLst>
-          </p:cNvPr>
-          <p:cNvSpPr txBox="1"/>
-          <p:nvPr/>
-        </p:nvSpPr>
-        <p:spPr>
-          <a:xfrm>
-            <a:off x="313887" y="1652781"/>
-            <a:ext cx="3847052" cy="1754326"/>
-          </a:xfrm>
-          <a:prstGeom prst="rect">
-            <a:avLst/>
-          </a:prstGeom>
-          <a:noFill/>
-        </p:spPr>
-        <p:txBody>
-          <a:bodyPr wrap="square" rtlCol="0">
-            <a:spAutoFit/>
-          </a:bodyPr>
-          <a:lstStyle/>
-          <a:p>
-            <a:r>
-              <a:rPr lang="es-ES" dirty="0"/>
-              <a:t>La prueba de Kruskal-Wallis permite examinar las diferencias entre k&gt;2 poblaciones. Una alternativa útil para comparar pares de poblaciones es la prueba de Mann-Whitney (incluir formalmente)</a:t>
+              <a:t>Alternativa:</a:t>
             </a:r>
             <a:endParaRPr lang="es-CO" dirty="0"/>
           </a:p>
@@ -3667,7 +3744,7 @@
           <p:cNvPr id="5" name="Imagen 4">
             <a:extLst>
               <a:ext uri="{FF2B5EF4-FFF2-40B4-BE49-F238E27FC236}">
-                <a16:creationId xmlns:a16="http://schemas.microsoft.com/office/drawing/2014/main" id="{E1156763-38FC-94AF-9DDD-901E280E585E}"/>
+                <a16:creationId xmlns:a16="http://schemas.microsoft.com/office/drawing/2014/main" id="{7EC0A3F9-3ADF-D5BE-3E96-97953F377372}"/>
               </a:ext>
             </a:extLst>
           </p:cNvPr>
@@ -3684,8 +3761,74 @@
         </p:blipFill>
         <p:spPr>
           <a:xfrm>
-            <a:off x="5061936" y="1233181"/>
-            <a:ext cx="6602685" cy="5108896"/>
+            <a:off x="6316909" y="2024897"/>
+            <a:ext cx="5595458" cy="4536035"/>
+          </a:xfrm>
+          <a:prstGeom prst="rect">
+            <a:avLst/>
+          </a:prstGeom>
+        </p:spPr>
+      </p:pic>
+      <p:sp>
+        <p:nvSpPr>
+          <p:cNvPr id="8" name="CuadroTexto 7">
+            <a:extLst>
+              <a:ext uri="{FF2B5EF4-FFF2-40B4-BE49-F238E27FC236}">
+                <a16:creationId xmlns:a16="http://schemas.microsoft.com/office/drawing/2014/main" id="{2898B067-88E6-D5A8-0EDC-5142C573B3F8}"/>
+              </a:ext>
+            </a:extLst>
+          </p:cNvPr>
+          <p:cNvSpPr txBox="1"/>
+          <p:nvPr/>
+        </p:nvSpPr>
+        <p:spPr>
+          <a:xfrm>
+            <a:off x="486562" y="1348831"/>
+            <a:ext cx="10754686" cy="369332"/>
+          </a:xfrm>
+          <a:prstGeom prst="rect">
+            <a:avLst/>
+          </a:prstGeom>
+          <a:noFill/>
+        </p:spPr>
+        <p:txBody>
+          <a:bodyPr wrap="square" rtlCol="0">
+            <a:spAutoFit/>
+          </a:bodyPr>
+          <a:lstStyle/>
+          <a:p>
+            <a:r>
+              <a:rPr lang="es-ES" dirty="0"/>
+              <a:t>Esta es una forma sencilla de mostrar el resultado diferenciado por grupos (pares de variables categóricas).</a:t>
+            </a:r>
+            <a:endParaRPr lang="es-CO" dirty="0"/>
+          </a:p>
+        </p:txBody>
+      </p:sp>
+      <p:pic>
+        <p:nvPicPr>
+          <p:cNvPr id="10" name="Imagen 9">
+            <a:extLst>
+              <a:ext uri="{FF2B5EF4-FFF2-40B4-BE49-F238E27FC236}">
+                <a16:creationId xmlns:a16="http://schemas.microsoft.com/office/drawing/2014/main" id="{E062E314-B9BC-451B-FF53-1E6FE556E821}"/>
+              </a:ext>
+            </a:extLst>
+          </p:cNvPr>
+          <p:cNvPicPr>
+            <a:picLocks noChangeAspect="1"/>
+          </p:cNvPicPr>
+          <p:nvPr/>
+        </p:nvPicPr>
+        <p:blipFill>
+          <a:blip r:embed="rId3"/>
+          <a:stretch>
+            <a:fillRect/>
+          </a:stretch>
+        </p:blipFill>
+        <p:spPr>
+          <a:xfrm>
+            <a:off x="486561" y="2024897"/>
+            <a:ext cx="5830348" cy="4536035"/>
           </a:xfrm>
           <a:prstGeom prst="rect">
             <a:avLst/>
@@ -3695,7 +3838,7 @@
     </p:spTree>
     <p:extLst>
       <p:ext uri="{BB962C8B-B14F-4D97-AF65-F5344CB8AC3E}">
-        <p14:creationId xmlns:p14="http://schemas.microsoft.com/office/powerpoint/2010/main" val="115186000"/>
+        <p14:creationId xmlns:p14="http://schemas.microsoft.com/office/powerpoint/2010/main" val="3052615878"/>
       </p:ext>
     </p:extLst>
   </p:cSld>
@@ -3727,7 +3870,7 @@
           <p:cNvPr id="2" name="Título 1">
             <a:extLst>
               <a:ext uri="{FF2B5EF4-FFF2-40B4-BE49-F238E27FC236}">
-                <a16:creationId xmlns:a16="http://schemas.microsoft.com/office/drawing/2014/main" id="{3FA5BEAA-1C13-D6B6-7AFE-5A28A5A37B23}"/>
+                <a16:creationId xmlns:a16="http://schemas.microsoft.com/office/drawing/2014/main" id="{6A97BA76-486F-CB55-C28E-847CB6E676D6}"/>
               </a:ext>
             </a:extLst>
           </p:cNvPr>
@@ -3740,94 +3883,28 @@
         </p:nvSpPr>
         <p:spPr>
           <a:xfrm>
-            <a:off x="829810" y="245991"/>
-            <a:ext cx="8289023" cy="1287506"/>
+            <a:off x="6096000" y="5046181"/>
+            <a:ext cx="5721991" cy="1325563"/>
           </a:xfrm>
         </p:spPr>
         <p:txBody>
           <a:bodyPr>
-            <a:normAutofit fontScale="90000"/>
+            <a:normAutofit/>
           </a:bodyPr>
           <a:lstStyle/>
           <a:p>
             <a:r>
               <a:rPr lang="es-ES" dirty="0"/>
-              <a:t>Comparación de distribuciones (cont.)</a:t>
+              <a:t>Análisis de variables continuas según grupos</a:t>
             </a:r>
             <a:endParaRPr lang="es-CO" dirty="0"/>
           </a:p>
         </p:txBody>
       </p:sp>
-      <p:sp>
-        <p:nvSpPr>
-          <p:cNvPr id="4" name="CuadroTexto 3">
-            <a:extLst>
-              <a:ext uri="{FF2B5EF4-FFF2-40B4-BE49-F238E27FC236}">
-                <a16:creationId xmlns:a16="http://schemas.microsoft.com/office/drawing/2014/main" id="{E4354527-7EC1-5A2F-D063-644553ED0F5A}"/>
-              </a:ext>
-            </a:extLst>
-          </p:cNvPr>
-          <p:cNvSpPr txBox="1"/>
-          <p:nvPr/>
-        </p:nvSpPr>
-        <p:spPr>
-          <a:xfrm>
-            <a:off x="523612" y="1283160"/>
-            <a:ext cx="8595221" cy="646331"/>
-          </a:xfrm>
-          <a:prstGeom prst="rect">
-            <a:avLst/>
-          </a:prstGeom>
-          <a:noFill/>
-        </p:spPr>
-        <p:txBody>
-          <a:bodyPr wrap="square" rtlCol="0">
-            <a:spAutoFit/>
-          </a:bodyPr>
-          <a:lstStyle/>
-          <a:p>
-            <a:r>
-              <a:rPr lang="es-ES" dirty="0"/>
-              <a:t>Un ejercicio análogo es realizado con la inclusión de una variable adicional. Los resultados son presentados por facetas.</a:t>
-            </a:r>
-            <a:endParaRPr lang="es-CO" dirty="0"/>
-          </a:p>
-        </p:txBody>
-      </p:sp>
-      <p:pic>
-        <p:nvPicPr>
-          <p:cNvPr id="7" name="Imagen 6">
-            <a:extLst>
-              <a:ext uri="{FF2B5EF4-FFF2-40B4-BE49-F238E27FC236}">
-                <a16:creationId xmlns:a16="http://schemas.microsoft.com/office/drawing/2014/main" id="{87AA1A8D-8FB2-987F-B29E-55F44C7675D4}"/>
-              </a:ext>
-            </a:extLst>
-          </p:cNvPr>
-          <p:cNvPicPr>
-            <a:picLocks noChangeAspect="1"/>
-          </p:cNvPicPr>
-          <p:nvPr/>
-        </p:nvPicPr>
-        <p:blipFill>
-          <a:blip r:embed="rId2"/>
-          <a:stretch>
-            <a:fillRect/>
-          </a:stretch>
-        </p:blipFill>
-        <p:spPr>
-          <a:xfrm>
-            <a:off x="1693776" y="2032271"/>
-            <a:ext cx="8595220" cy="4561939"/>
-          </a:xfrm>
-          <a:prstGeom prst="rect">
-            <a:avLst/>
-          </a:prstGeom>
-        </p:spPr>
-      </p:pic>
     </p:spTree>
     <p:extLst>
       <p:ext uri="{BB962C8B-B14F-4D97-AF65-F5344CB8AC3E}">
-        <p14:creationId xmlns:p14="http://schemas.microsoft.com/office/powerpoint/2010/main" val="3135990510"/>
+        <p14:creationId xmlns:p14="http://schemas.microsoft.com/office/powerpoint/2010/main" val="1333504306"/>
       </p:ext>
     </p:extLst>
   </p:cSld>
@@ -3859,7 +3936,7 @@
           <p:cNvPr id="2" name="Título 1">
             <a:extLst>
               <a:ext uri="{FF2B5EF4-FFF2-40B4-BE49-F238E27FC236}">
-                <a16:creationId xmlns:a16="http://schemas.microsoft.com/office/drawing/2014/main" id="{01C22E4B-8092-D370-D11F-846D676A6445}"/>
+                <a16:creationId xmlns:a16="http://schemas.microsoft.com/office/drawing/2014/main" id="{3FA5BEAA-1C13-D6B6-7AFE-5A28A5A37B23}"/>
               </a:ext>
             </a:extLst>
           </p:cNvPr>
@@ -3872,17 +3949,19 @@
         </p:nvSpPr>
         <p:spPr>
           <a:xfrm>
-            <a:off x="838200" y="365126"/>
-            <a:ext cx="10515600" cy="1102948"/>
-          </a:xfrm>
-        </p:spPr>
-        <p:txBody>
-          <a:bodyPr/>
+            <a:off x="829810" y="245991"/>
+            <a:ext cx="6938396" cy="945246"/>
+          </a:xfrm>
+        </p:spPr>
+        <p:txBody>
+          <a:bodyPr>
+            <a:normAutofit fontScale="90000"/>
+          </a:bodyPr>
           <a:lstStyle/>
           <a:p>
             <a:r>
               <a:rPr lang="es-ES" dirty="0"/>
-              <a:t>Extensión para las siguientes variables</a:t>
+              <a:t>Comparación de distribuciones</a:t>
             </a:r>
             <a:endParaRPr lang="es-CO" dirty="0"/>
           </a:p>
@@ -3890,10 +3969,10 @@
       </p:sp>
       <p:pic>
         <p:nvPicPr>
-          <p:cNvPr id="5" name="Imagen 4">
-            <a:extLst>
-              <a:ext uri="{FF2B5EF4-FFF2-40B4-BE49-F238E27FC236}">
-                <a16:creationId xmlns:a16="http://schemas.microsoft.com/office/drawing/2014/main" id="{FB9838DE-E17C-01FB-3E36-EEAA8E2ABFF4}"/>
+          <p:cNvPr id="4" name="Imagen 3">
+            <a:extLst>
+              <a:ext uri="{FF2B5EF4-FFF2-40B4-BE49-F238E27FC236}">
+                <a16:creationId xmlns:a16="http://schemas.microsoft.com/office/drawing/2014/main" id="{7E77027F-F5A1-26A0-F555-08F32173E0E8}"/>
               </a:ext>
             </a:extLst>
           </p:cNvPr>
@@ -3910,8 +3989,8 @@
         </p:blipFill>
         <p:spPr>
           <a:xfrm>
-            <a:off x="5944212" y="1841601"/>
-            <a:ext cx="4514850" cy="4181475"/>
+            <a:off x="4590336" y="1013229"/>
+            <a:ext cx="7287777" cy="5713257"/>
           </a:xfrm>
           <a:prstGeom prst="rect">
             <a:avLst/>
@@ -3923,7 +4002,7 @@
           <p:cNvPr id="6" name="CuadroTexto 5">
             <a:extLst>
               <a:ext uri="{FF2B5EF4-FFF2-40B4-BE49-F238E27FC236}">
-                <a16:creationId xmlns:a16="http://schemas.microsoft.com/office/drawing/2014/main" id="{9FB47A80-3F83-8951-33B5-7722DE6C60FA}"/>
+                <a16:creationId xmlns:a16="http://schemas.microsoft.com/office/drawing/2014/main" id="{02C6B9A4-BFC7-6FD7-3D7B-4BCB276F18B4}"/>
               </a:ext>
             </a:extLst>
           </p:cNvPr>
@@ -3932,7 +4011,7 @@
         </p:nvSpPr>
         <p:spPr>
           <a:xfrm>
-            <a:off x="968229" y="1822726"/>
+            <a:off x="313887" y="1652781"/>
             <a:ext cx="3847052" cy="923330"/>
           </a:xfrm>
           <a:prstGeom prst="rect">
@@ -3948,7 +4027,7 @@
           <a:p>
             <a:r>
               <a:rPr lang="es-ES" dirty="0"/>
-              <a:t>El mismo ejercicio es extendido para las siguientes variables continuas y categóricas</a:t>
+              <a:t>Introducir directamente la prueba de Kruskal-Wallis (incluir tratamiento formal)</a:t>
             </a:r>
             <a:endParaRPr lang="es-CO" dirty="0"/>
           </a:p>
@@ -3957,7 +4036,7 @@
     </p:spTree>
     <p:extLst>
       <p:ext uri="{BB962C8B-B14F-4D97-AF65-F5344CB8AC3E}">
-        <p14:creationId xmlns:p14="http://schemas.microsoft.com/office/powerpoint/2010/main" val="2654243959"/>
+        <p14:creationId xmlns:p14="http://schemas.microsoft.com/office/powerpoint/2010/main" val="2180135705"/>
       </p:ext>
     </p:extLst>
   </p:cSld>
@@ -3989,7 +4068,7 @@
           <p:cNvPr id="2" name="Título 1">
             <a:extLst>
               <a:ext uri="{FF2B5EF4-FFF2-40B4-BE49-F238E27FC236}">
-                <a16:creationId xmlns:a16="http://schemas.microsoft.com/office/drawing/2014/main" id="{01C22E4B-8092-D370-D11F-846D676A6445}"/>
+                <a16:creationId xmlns:a16="http://schemas.microsoft.com/office/drawing/2014/main" id="{3FA5BEAA-1C13-D6B6-7AFE-5A28A5A37B23}"/>
               </a:ext>
             </a:extLst>
           </p:cNvPr>
@@ -4002,17 +4081,55 @@
         </p:nvSpPr>
         <p:spPr>
           <a:xfrm>
-            <a:off x="838200" y="365126"/>
-            <a:ext cx="10515600" cy="1102948"/>
-          </a:xfrm>
-        </p:spPr>
-        <p:txBody>
-          <a:bodyPr/>
+            <a:off x="829810" y="245991"/>
+            <a:ext cx="6938396" cy="945246"/>
+          </a:xfrm>
+        </p:spPr>
+        <p:txBody>
+          <a:bodyPr>
+            <a:normAutofit fontScale="90000"/>
+          </a:bodyPr>
           <a:lstStyle/>
           <a:p>
             <a:r>
               <a:rPr lang="es-ES" dirty="0"/>
-              <a:t>Extensión para las siguientes variables</a:t>
+              <a:t>Comparación de distribuciones</a:t>
+            </a:r>
+            <a:endParaRPr lang="es-CO" dirty="0"/>
+          </a:p>
+        </p:txBody>
+      </p:sp>
+      <p:sp>
+        <p:nvSpPr>
+          <p:cNvPr id="6" name="CuadroTexto 5">
+            <a:extLst>
+              <a:ext uri="{FF2B5EF4-FFF2-40B4-BE49-F238E27FC236}">
+                <a16:creationId xmlns:a16="http://schemas.microsoft.com/office/drawing/2014/main" id="{02C6B9A4-BFC7-6FD7-3D7B-4BCB276F18B4}"/>
+              </a:ext>
+            </a:extLst>
+          </p:cNvPr>
+          <p:cNvSpPr txBox="1"/>
+          <p:nvPr/>
+        </p:nvSpPr>
+        <p:spPr>
+          <a:xfrm>
+            <a:off x="313887" y="1652781"/>
+            <a:ext cx="3847052" cy="1754326"/>
+          </a:xfrm>
+          <a:prstGeom prst="rect">
+            <a:avLst/>
+          </a:prstGeom>
+          <a:noFill/>
+        </p:spPr>
+        <p:txBody>
+          <a:bodyPr wrap="square" rtlCol="0">
+            <a:spAutoFit/>
+          </a:bodyPr>
+          <a:lstStyle/>
+          <a:p>
+            <a:r>
+              <a:rPr lang="es-ES" dirty="0"/>
+              <a:t>La prueba de Kruskal-Wallis permite examinar las diferencias entre k&gt;2 poblaciones. Una alternativa útil para comparar pares de poblaciones es la prueba de Mann-Whitney (incluir formalmente)</a:t>
             </a:r>
             <a:endParaRPr lang="es-CO" dirty="0"/>
           </a:p>
@@ -4023,7 +4140,7 @@
           <p:cNvPr id="5" name="Imagen 4">
             <a:extLst>
               <a:ext uri="{FF2B5EF4-FFF2-40B4-BE49-F238E27FC236}">
-                <a16:creationId xmlns:a16="http://schemas.microsoft.com/office/drawing/2014/main" id="{FB9838DE-E17C-01FB-3E36-EEAA8E2ABFF4}"/>
+                <a16:creationId xmlns:a16="http://schemas.microsoft.com/office/drawing/2014/main" id="{E1156763-38FC-94AF-9DDD-901E280E585E}"/>
               </a:ext>
             </a:extLst>
           </p:cNvPr>
@@ -4040,54 +4157,18 @@
         </p:blipFill>
         <p:spPr>
           <a:xfrm>
-            <a:off x="5944212" y="1841601"/>
-            <a:ext cx="4514850" cy="4181475"/>
+            <a:off x="5061936" y="1233181"/>
+            <a:ext cx="6602685" cy="5108896"/>
           </a:xfrm>
           <a:prstGeom prst="rect">
             <a:avLst/>
           </a:prstGeom>
         </p:spPr>
       </p:pic>
-      <p:sp>
-        <p:nvSpPr>
-          <p:cNvPr id="6" name="CuadroTexto 5">
-            <a:extLst>
-              <a:ext uri="{FF2B5EF4-FFF2-40B4-BE49-F238E27FC236}">
-                <a16:creationId xmlns:a16="http://schemas.microsoft.com/office/drawing/2014/main" id="{9FB47A80-3F83-8951-33B5-7722DE6C60FA}"/>
-              </a:ext>
-            </a:extLst>
-          </p:cNvPr>
-          <p:cNvSpPr txBox="1"/>
-          <p:nvPr/>
-        </p:nvSpPr>
-        <p:spPr>
-          <a:xfrm>
-            <a:off x="968229" y="1822726"/>
-            <a:ext cx="3847052" cy="923330"/>
-          </a:xfrm>
-          <a:prstGeom prst="rect">
-            <a:avLst/>
-          </a:prstGeom>
-          <a:noFill/>
-        </p:spPr>
-        <p:txBody>
-          <a:bodyPr wrap="square" rtlCol="0">
-            <a:spAutoFit/>
-          </a:bodyPr>
-          <a:lstStyle/>
-          <a:p>
-            <a:r>
-              <a:rPr lang="es-ES" dirty="0"/>
-              <a:t>El mismo ejercicio es extendido para las siguientes variables continuas y categóricas</a:t>
-            </a:r>
-            <a:endParaRPr lang="es-CO" dirty="0"/>
-          </a:p>
-        </p:txBody>
-      </p:sp>
     </p:spTree>
     <p:extLst>
       <p:ext uri="{BB962C8B-B14F-4D97-AF65-F5344CB8AC3E}">
-        <p14:creationId xmlns:p14="http://schemas.microsoft.com/office/powerpoint/2010/main" val="3158663479"/>
+        <p14:creationId xmlns:p14="http://schemas.microsoft.com/office/powerpoint/2010/main" val="115186000"/>
       </p:ext>
     </p:extLst>
   </p:cSld>
@@ -4119,7 +4200,7 @@
           <p:cNvPr id="2" name="Título 1">
             <a:extLst>
               <a:ext uri="{FF2B5EF4-FFF2-40B4-BE49-F238E27FC236}">
-                <a16:creationId xmlns:a16="http://schemas.microsoft.com/office/drawing/2014/main" id="{6A97BA76-486F-CB55-C28E-847CB6E676D6}"/>
+                <a16:creationId xmlns:a16="http://schemas.microsoft.com/office/drawing/2014/main" id="{3FA5BEAA-1C13-D6B6-7AFE-5A28A5A37B23}"/>
               </a:ext>
             </a:extLst>
           </p:cNvPr>
@@ -4132,28 +4213,94 @@
         </p:nvSpPr>
         <p:spPr>
           <a:xfrm>
-            <a:off x="6096000" y="5046181"/>
-            <a:ext cx="5721991" cy="1325563"/>
+            <a:off x="829810" y="245991"/>
+            <a:ext cx="8289023" cy="1287506"/>
           </a:xfrm>
         </p:spPr>
         <p:txBody>
           <a:bodyPr>
-            <a:normAutofit/>
+            <a:normAutofit fontScale="90000"/>
           </a:bodyPr>
           <a:lstStyle/>
           <a:p>
             <a:r>
               <a:rPr lang="es-ES" dirty="0"/>
-              <a:t>Contraste de variables continuas</a:t>
+              <a:t>Comparación de distribuciones (cont.)</a:t>
             </a:r>
             <a:endParaRPr lang="es-CO" dirty="0"/>
           </a:p>
         </p:txBody>
       </p:sp>
+      <p:sp>
+        <p:nvSpPr>
+          <p:cNvPr id="4" name="CuadroTexto 3">
+            <a:extLst>
+              <a:ext uri="{FF2B5EF4-FFF2-40B4-BE49-F238E27FC236}">
+                <a16:creationId xmlns:a16="http://schemas.microsoft.com/office/drawing/2014/main" id="{E4354527-7EC1-5A2F-D063-644553ED0F5A}"/>
+              </a:ext>
+            </a:extLst>
+          </p:cNvPr>
+          <p:cNvSpPr txBox="1"/>
+          <p:nvPr/>
+        </p:nvSpPr>
+        <p:spPr>
+          <a:xfrm>
+            <a:off x="523612" y="1283160"/>
+            <a:ext cx="8595221" cy="646331"/>
+          </a:xfrm>
+          <a:prstGeom prst="rect">
+            <a:avLst/>
+          </a:prstGeom>
+          <a:noFill/>
+        </p:spPr>
+        <p:txBody>
+          <a:bodyPr wrap="square" rtlCol="0">
+            <a:spAutoFit/>
+          </a:bodyPr>
+          <a:lstStyle/>
+          <a:p>
+            <a:r>
+              <a:rPr lang="es-ES" dirty="0"/>
+              <a:t>Un ejercicio análogo es realizado con la inclusión de una variable adicional. Los resultados son presentados por facetas.</a:t>
+            </a:r>
+            <a:endParaRPr lang="es-CO" dirty="0"/>
+          </a:p>
+        </p:txBody>
+      </p:sp>
+      <p:pic>
+        <p:nvPicPr>
+          <p:cNvPr id="7" name="Imagen 6">
+            <a:extLst>
+              <a:ext uri="{FF2B5EF4-FFF2-40B4-BE49-F238E27FC236}">
+                <a16:creationId xmlns:a16="http://schemas.microsoft.com/office/drawing/2014/main" id="{87AA1A8D-8FB2-987F-B29E-55F44C7675D4}"/>
+              </a:ext>
+            </a:extLst>
+          </p:cNvPr>
+          <p:cNvPicPr>
+            <a:picLocks noChangeAspect="1"/>
+          </p:cNvPicPr>
+          <p:nvPr/>
+        </p:nvPicPr>
+        <p:blipFill>
+          <a:blip r:embed="rId2"/>
+          <a:stretch>
+            <a:fillRect/>
+          </a:stretch>
+        </p:blipFill>
+        <p:spPr>
+          <a:xfrm>
+            <a:off x="1693776" y="2032271"/>
+            <a:ext cx="8595220" cy="4561939"/>
+          </a:xfrm>
+          <a:prstGeom prst="rect">
+            <a:avLst/>
+          </a:prstGeom>
+        </p:spPr>
+      </p:pic>
     </p:spTree>
     <p:extLst>
       <p:ext uri="{BB962C8B-B14F-4D97-AF65-F5344CB8AC3E}">
-        <p14:creationId xmlns:p14="http://schemas.microsoft.com/office/powerpoint/2010/main" val="504275449"/>
+        <p14:creationId xmlns:p14="http://schemas.microsoft.com/office/powerpoint/2010/main" val="3135990510"/>
       </p:ext>
     </p:extLst>
   </p:cSld>
@@ -4185,7 +4332,7 @@
           <p:cNvPr id="2" name="Título 1">
             <a:extLst>
               <a:ext uri="{FF2B5EF4-FFF2-40B4-BE49-F238E27FC236}">
-                <a16:creationId xmlns:a16="http://schemas.microsoft.com/office/drawing/2014/main" id="{3364F7F6-AE7A-6D73-4A3A-4825439E2F27}"/>
+                <a16:creationId xmlns:a16="http://schemas.microsoft.com/office/drawing/2014/main" id="{01C22E4B-8092-D370-D11F-846D676A6445}"/>
               </a:ext>
             </a:extLst>
           </p:cNvPr>
@@ -4196,26 +4343,19 @@
             <p:ph type="title"/>
           </p:nvPr>
         </p:nvSpPr>
-        <p:spPr/>
+        <p:spPr>
+          <a:xfrm>
+            <a:off x="838200" y="365126"/>
+            <a:ext cx="10515600" cy="1102948"/>
+          </a:xfrm>
+        </p:spPr>
         <p:txBody>
           <a:bodyPr/>
           <a:lstStyle/>
           <a:p>
             <a:r>
-              <a:rPr lang="es-ES" dirty="0" err="1"/>
-              <a:t>Scatter</a:t>
-            </a:r>
-            <a:r>
               <a:rPr lang="es-ES" dirty="0"/>
-              <a:t> </a:t>
-            </a:r>
-            <a:r>
-              <a:rPr lang="es-ES" dirty="0" err="1"/>
-              <a:t>plot</a:t>
-            </a:r>
-            <a:r>
-              <a:rPr lang="es-ES" dirty="0"/>
-              <a:t>: múltiples variables</a:t>
+              <a:t>Extensión para las siguientes variables</a:t>
             </a:r>
             <a:endParaRPr lang="es-CO" dirty="0"/>
           </a:p>
@@ -4226,7 +4366,7 @@
           <p:cNvPr id="5" name="Imagen 4">
             <a:extLst>
               <a:ext uri="{FF2B5EF4-FFF2-40B4-BE49-F238E27FC236}">
-                <a16:creationId xmlns:a16="http://schemas.microsoft.com/office/drawing/2014/main" id="{F6AB983A-96F0-86F4-E828-1BD57C4F1F40}"/>
+                <a16:creationId xmlns:a16="http://schemas.microsoft.com/office/drawing/2014/main" id="{FB9838DE-E17C-01FB-3E36-EEAA8E2ABFF4}"/>
               </a:ext>
             </a:extLst>
           </p:cNvPr>
@@ -4243,18 +4383,54 @@
         </p:blipFill>
         <p:spPr>
           <a:xfrm>
-            <a:off x="4496292" y="1690688"/>
-            <a:ext cx="6661065" cy="4762552"/>
+            <a:off x="5944212" y="1841601"/>
+            <a:ext cx="4514850" cy="4181475"/>
           </a:xfrm>
           <a:prstGeom prst="rect">
             <a:avLst/>
           </a:prstGeom>
         </p:spPr>
       </p:pic>
+      <p:sp>
+        <p:nvSpPr>
+          <p:cNvPr id="6" name="CuadroTexto 5">
+            <a:extLst>
+              <a:ext uri="{FF2B5EF4-FFF2-40B4-BE49-F238E27FC236}">
+                <a16:creationId xmlns:a16="http://schemas.microsoft.com/office/drawing/2014/main" id="{9FB47A80-3F83-8951-33B5-7722DE6C60FA}"/>
+              </a:ext>
+            </a:extLst>
+          </p:cNvPr>
+          <p:cNvSpPr txBox="1"/>
+          <p:nvPr/>
+        </p:nvSpPr>
+        <p:spPr>
+          <a:xfrm>
+            <a:off x="968229" y="1822726"/>
+            <a:ext cx="3847052" cy="923330"/>
+          </a:xfrm>
+          <a:prstGeom prst="rect">
+            <a:avLst/>
+          </a:prstGeom>
+          <a:noFill/>
+        </p:spPr>
+        <p:txBody>
+          <a:bodyPr wrap="square" rtlCol="0">
+            <a:spAutoFit/>
+          </a:bodyPr>
+          <a:lstStyle/>
+          <a:p>
+            <a:r>
+              <a:rPr lang="es-ES" dirty="0"/>
+              <a:t>El mismo ejercicio es extendido para las siguientes variables continuas y categóricas</a:t>
+            </a:r>
+            <a:endParaRPr lang="es-CO" dirty="0"/>
+          </a:p>
+        </p:txBody>
+      </p:sp>
     </p:spTree>
     <p:extLst>
       <p:ext uri="{BB962C8B-B14F-4D97-AF65-F5344CB8AC3E}">
-        <p14:creationId xmlns:p14="http://schemas.microsoft.com/office/powerpoint/2010/main" val="3250290922"/>
+        <p14:creationId xmlns:p14="http://schemas.microsoft.com/office/powerpoint/2010/main" val="2654243959"/>
       </p:ext>
     </p:extLst>
   </p:cSld>
@@ -4286,7 +4462,7 @@
           <p:cNvPr id="2" name="Título 1">
             <a:extLst>
               <a:ext uri="{FF2B5EF4-FFF2-40B4-BE49-F238E27FC236}">
-                <a16:creationId xmlns:a16="http://schemas.microsoft.com/office/drawing/2014/main" id="{3364F7F6-AE7A-6D73-4A3A-4825439E2F27}"/>
+                <a16:creationId xmlns:a16="http://schemas.microsoft.com/office/drawing/2014/main" id="{6A97BA76-486F-CB55-C28E-847CB6E676D6}"/>
               </a:ext>
             </a:extLst>
           </p:cNvPr>
@@ -4297,65 +4473,30 @@
             <p:ph type="title"/>
           </p:nvPr>
         </p:nvSpPr>
-        <p:spPr/>
-        <p:txBody>
-          <a:bodyPr/>
-          <a:lstStyle/>
-          <a:p>
-            <a:r>
-              <a:rPr lang="es-ES" dirty="0" err="1"/>
-              <a:t>Scatter</a:t>
-            </a:r>
+        <p:spPr>
+          <a:xfrm>
+            <a:off x="6096000" y="5046181"/>
+            <a:ext cx="5721991" cy="1325563"/>
+          </a:xfrm>
+        </p:spPr>
+        <p:txBody>
+          <a:bodyPr>
+            <a:normAutofit/>
+          </a:bodyPr>
+          <a:lstStyle/>
+          <a:p>
             <a:r>
               <a:rPr lang="es-ES" dirty="0"/>
-              <a:t> </a:t>
-            </a:r>
-            <a:r>
-              <a:rPr lang="es-ES" dirty="0" err="1"/>
-              <a:t>plot</a:t>
-            </a:r>
-            <a:r>
-              <a:rPr lang="es-ES" dirty="0"/>
-              <a:t>: múltiples variables</a:t>
+              <a:t>Contraste de variables continuas</a:t>
             </a:r>
             <a:endParaRPr lang="es-CO" dirty="0"/>
           </a:p>
         </p:txBody>
       </p:sp>
-      <p:pic>
-        <p:nvPicPr>
-          <p:cNvPr id="4" name="Imagen 3">
-            <a:extLst>
-              <a:ext uri="{FF2B5EF4-FFF2-40B4-BE49-F238E27FC236}">
-                <a16:creationId xmlns:a16="http://schemas.microsoft.com/office/drawing/2014/main" id="{C2B449A1-EA36-9CAE-1A77-6C6FDAFBED75}"/>
-              </a:ext>
-            </a:extLst>
-          </p:cNvPr>
-          <p:cNvPicPr>
-            <a:picLocks noChangeAspect="1"/>
-          </p:cNvPicPr>
-          <p:nvPr/>
-        </p:nvPicPr>
-        <p:blipFill>
-          <a:blip r:embed="rId2"/>
-          <a:stretch>
-            <a:fillRect/>
-          </a:stretch>
-        </p:blipFill>
-        <p:spPr>
-          <a:xfrm>
-            <a:off x="3719187" y="1385602"/>
-            <a:ext cx="7634613" cy="5220728"/>
-          </a:xfrm>
-          <a:prstGeom prst="rect">
-            <a:avLst/>
-          </a:prstGeom>
-        </p:spPr>
-      </p:pic>
     </p:spTree>
     <p:extLst>
       <p:ext uri="{BB962C8B-B14F-4D97-AF65-F5344CB8AC3E}">
-        <p14:creationId xmlns:p14="http://schemas.microsoft.com/office/powerpoint/2010/main" val="3696151648"/>
+        <p14:creationId xmlns:p14="http://schemas.microsoft.com/office/powerpoint/2010/main" val="504275449"/>
       </p:ext>
     </p:extLst>
   </p:cSld>
@@ -4387,7 +4528,7 @@
           <p:cNvPr id="2" name="Título 1">
             <a:extLst>
               <a:ext uri="{FF2B5EF4-FFF2-40B4-BE49-F238E27FC236}">
-                <a16:creationId xmlns:a16="http://schemas.microsoft.com/office/drawing/2014/main" id="{39D58B23-8659-9356-6E43-A4C0354C52C4}"/>
+                <a16:creationId xmlns:a16="http://schemas.microsoft.com/office/drawing/2014/main" id="{3364F7F6-AE7A-6D73-4A3A-4825439E2F27}"/>
               </a:ext>
             </a:extLst>
           </p:cNvPr>
@@ -4398,19 +4539,26 @@
             <p:ph type="title"/>
           </p:nvPr>
         </p:nvSpPr>
-        <p:spPr>
-          <a:xfrm>
-            <a:off x="838200" y="365125"/>
-            <a:ext cx="7307510" cy="784167"/>
-          </a:xfrm>
-        </p:spPr>
+        <p:spPr/>
         <p:txBody>
           <a:bodyPr/>
           <a:lstStyle/>
           <a:p>
             <a:r>
+              <a:rPr lang="es-ES" dirty="0" err="1"/>
+              <a:t>Scatter</a:t>
+            </a:r>
+            <a:r>
               <a:rPr lang="es-ES" dirty="0"/>
-              <a:t>Ajuste con múltiples variables</a:t>
+              <a:t> </a:t>
+            </a:r>
+            <a:r>
+              <a:rPr lang="es-ES" dirty="0" err="1"/>
+              <a:t>plot</a:t>
+            </a:r>
+            <a:r>
+              <a:rPr lang="es-ES" dirty="0"/>
+              <a:t>: múltiples variables</a:t>
             </a:r>
             <a:endParaRPr lang="es-CO" dirty="0"/>
           </a:p>
@@ -4421,7 +4569,7 @@
           <p:cNvPr id="5" name="Imagen 4">
             <a:extLst>
               <a:ext uri="{FF2B5EF4-FFF2-40B4-BE49-F238E27FC236}">
-                <a16:creationId xmlns:a16="http://schemas.microsoft.com/office/drawing/2014/main" id="{207A6AD8-47F1-8856-027F-6672756052C1}"/>
+                <a16:creationId xmlns:a16="http://schemas.microsoft.com/office/drawing/2014/main" id="{F6AB983A-96F0-86F4-E828-1BD57C4F1F40}"/>
               </a:ext>
             </a:extLst>
           </p:cNvPr>
@@ -4438,8 +4586,8 @@
         </p:blipFill>
         <p:spPr>
           <a:xfrm>
-            <a:off x="4424142" y="1269186"/>
-            <a:ext cx="7479835" cy="5223689"/>
+            <a:off x="4496292" y="1690688"/>
+            <a:ext cx="6661065" cy="4762552"/>
           </a:xfrm>
           <a:prstGeom prst="rect">
             <a:avLst/>
@@ -4449,7 +4597,7 @@
     </p:spTree>
     <p:extLst>
       <p:ext uri="{BB962C8B-B14F-4D97-AF65-F5344CB8AC3E}">
-        <p14:creationId xmlns:p14="http://schemas.microsoft.com/office/powerpoint/2010/main" val="4065838019"/>
+        <p14:creationId xmlns:p14="http://schemas.microsoft.com/office/powerpoint/2010/main" val="3250290922"/>
       </p:ext>
     </p:extLst>
   </p:cSld>
@@ -4481,7 +4629,7 @@
           <p:cNvPr id="2" name="Título 1">
             <a:extLst>
               <a:ext uri="{FF2B5EF4-FFF2-40B4-BE49-F238E27FC236}">
-                <a16:creationId xmlns:a16="http://schemas.microsoft.com/office/drawing/2014/main" id="{1C210B00-DE51-D0F3-A73A-AC3C2D665BAA}"/>
+                <a16:creationId xmlns:a16="http://schemas.microsoft.com/office/drawing/2014/main" id="{3364F7F6-AE7A-6D73-4A3A-4825439E2F27}"/>
               </a:ext>
             </a:extLst>
           </p:cNvPr>
@@ -4498,8 +4646,20 @@
           <a:lstStyle/>
           <a:p>
             <a:r>
+              <a:rPr lang="es-ES" dirty="0" err="1"/>
+              <a:t>Scatter</a:t>
+            </a:r>
+            <a:r>
               <a:rPr lang="es-ES" dirty="0"/>
-              <a:t>Correlación de variables continuas</a:t>
+              <a:t> </a:t>
+            </a:r>
+            <a:r>
+              <a:rPr lang="es-ES" dirty="0" err="1"/>
+              <a:t>plot</a:t>
+            </a:r>
+            <a:r>
+              <a:rPr lang="es-ES" dirty="0"/>
+              <a:t>: múltiples variables</a:t>
             </a:r>
             <a:endParaRPr lang="es-CO" dirty="0"/>
           </a:p>
@@ -4507,10 +4667,10 @@
       </p:sp>
       <p:pic>
         <p:nvPicPr>
-          <p:cNvPr id="6" name="Imagen 5">
-            <a:extLst>
-              <a:ext uri="{FF2B5EF4-FFF2-40B4-BE49-F238E27FC236}">
-                <a16:creationId xmlns:a16="http://schemas.microsoft.com/office/drawing/2014/main" id="{734CFC47-8B46-DA27-CDE0-4D3CBE71F5D8}"/>
+          <p:cNvPr id="4" name="Imagen 3">
+            <a:extLst>
+              <a:ext uri="{FF2B5EF4-FFF2-40B4-BE49-F238E27FC236}">
+                <a16:creationId xmlns:a16="http://schemas.microsoft.com/office/drawing/2014/main" id="{C2B449A1-EA36-9CAE-1A77-6C6FDAFBED75}"/>
               </a:ext>
             </a:extLst>
           </p:cNvPr>
@@ -4527,88 +4687,18 @@
         </p:blipFill>
         <p:spPr>
           <a:xfrm>
-            <a:off x="5953923" y="1889074"/>
-            <a:ext cx="5185920" cy="4720206"/>
+            <a:off x="3719187" y="1385602"/>
+            <a:ext cx="7634613" cy="5220728"/>
           </a:xfrm>
           <a:prstGeom prst="rect">
             <a:avLst/>
           </a:prstGeom>
         </p:spPr>
       </p:pic>
-      <p:pic>
-        <p:nvPicPr>
-          <p:cNvPr id="8" name="Imagen 7">
-            <a:extLst>
-              <a:ext uri="{FF2B5EF4-FFF2-40B4-BE49-F238E27FC236}">
-                <a16:creationId xmlns:a16="http://schemas.microsoft.com/office/drawing/2014/main" id="{08F7793C-1FBD-36E0-616D-1F131CF34349}"/>
-              </a:ext>
-            </a:extLst>
-          </p:cNvPr>
-          <p:cNvPicPr>
-            <a:picLocks noChangeAspect="1"/>
-          </p:cNvPicPr>
-          <p:nvPr/>
-        </p:nvPicPr>
-        <p:blipFill>
-          <a:blip r:embed="rId3"/>
-          <a:stretch>
-            <a:fillRect/>
-          </a:stretch>
-        </p:blipFill>
-        <p:spPr>
-          <a:xfrm>
-            <a:off x="751775" y="4639112"/>
-            <a:ext cx="4868848" cy="838900"/>
-          </a:xfrm>
-          <a:prstGeom prst="rect">
-            <a:avLst/>
-          </a:prstGeom>
-        </p:spPr>
-      </p:pic>
-      <p:sp>
-        <p:nvSpPr>
-          <p:cNvPr id="9" name="CuadroTexto 8">
-            <a:extLst>
-              <a:ext uri="{FF2B5EF4-FFF2-40B4-BE49-F238E27FC236}">
-                <a16:creationId xmlns:a16="http://schemas.microsoft.com/office/drawing/2014/main" id="{42E176B8-BC7E-39AC-87C0-3914FFED883E}"/>
-              </a:ext>
-            </a:extLst>
-          </p:cNvPr>
-          <p:cNvSpPr txBox="1"/>
-          <p:nvPr/>
-        </p:nvSpPr>
-        <p:spPr>
-          <a:xfrm>
-            <a:off x="751775" y="2628069"/>
-            <a:ext cx="3847052" cy="646331"/>
-          </a:xfrm>
-          <a:prstGeom prst="rect">
-            <a:avLst/>
-          </a:prstGeom>
-          <a:noFill/>
-        </p:spPr>
-        <p:txBody>
-          <a:bodyPr wrap="square" rtlCol="0">
-            <a:spAutoFit/>
-          </a:bodyPr>
-          <a:lstStyle/>
-          <a:p>
-            <a:r>
-              <a:rPr lang="es-ES" dirty="0"/>
-              <a:t>Matriz de correlaciones y gráfico de </a:t>
-            </a:r>
-            <a:r>
-              <a:rPr lang="es-ES" dirty="0" err="1"/>
-              <a:t>correlacions</a:t>
-            </a:r>
-            <a:endParaRPr lang="es-CO" dirty="0"/>
-          </a:p>
-        </p:txBody>
-      </p:sp>
     </p:spTree>
     <p:extLst>
       <p:ext uri="{BB962C8B-B14F-4D97-AF65-F5344CB8AC3E}">
-        <p14:creationId xmlns:p14="http://schemas.microsoft.com/office/powerpoint/2010/main" val="2850747834"/>
+        <p14:creationId xmlns:p14="http://schemas.microsoft.com/office/powerpoint/2010/main" val="3696151648"/>
       </p:ext>
     </p:extLst>
   </p:cSld>
@@ -4651,48 +4741,30 @@
             <p:ph type="title"/>
           </p:nvPr>
         </p:nvSpPr>
-        <p:spPr/>
-        <p:txBody>
-          <a:bodyPr/>
+        <p:spPr>
+          <a:xfrm>
+            <a:off x="6096000" y="5046181"/>
+            <a:ext cx="5721991" cy="1325563"/>
+          </a:xfrm>
+        </p:spPr>
+        <p:txBody>
+          <a:bodyPr>
+            <a:normAutofit/>
+          </a:bodyPr>
           <a:lstStyle/>
           <a:p>
             <a:r>
               <a:rPr lang="es-ES" dirty="0"/>
-              <a:t>EDA multivariante</a:t>
+              <a:t>Validación de supuestos</a:t>
             </a:r>
             <a:endParaRPr lang="es-CO" dirty="0"/>
-          </a:p>
-        </p:txBody>
-      </p:sp>
-      <p:sp>
-        <p:nvSpPr>
-          <p:cNvPr id="3" name="Marcador de contenido 2">
-            <a:extLst>
-              <a:ext uri="{FF2B5EF4-FFF2-40B4-BE49-F238E27FC236}">
-                <a16:creationId xmlns:a16="http://schemas.microsoft.com/office/drawing/2014/main" id="{A5074468-631E-E576-C197-DC03E072D7D6}"/>
-              </a:ext>
-            </a:extLst>
-          </p:cNvPr>
-          <p:cNvSpPr>
-            <a:spLocks noGrp="1"/>
-          </p:cNvSpPr>
-          <p:nvPr>
-            <p:ph idx="1"/>
-          </p:nvPr>
-        </p:nvSpPr>
-        <p:spPr/>
-        <p:txBody>
-          <a:bodyPr/>
-          <a:lstStyle/>
-          <a:p>
-            <a:endParaRPr lang="es-CO"/>
           </a:p>
         </p:txBody>
       </p:sp>
     </p:spTree>
     <p:extLst>
       <p:ext uri="{BB962C8B-B14F-4D97-AF65-F5344CB8AC3E}">
-        <p14:creationId xmlns:p14="http://schemas.microsoft.com/office/powerpoint/2010/main" val="1489651553"/>
+        <p14:creationId xmlns:p14="http://schemas.microsoft.com/office/powerpoint/2010/main" val="2189579790"/>
       </p:ext>
     </p:extLst>
   </p:cSld>
@@ -4724,7 +4796,7 @@
           <p:cNvPr id="2" name="Título 1">
             <a:extLst>
               <a:ext uri="{FF2B5EF4-FFF2-40B4-BE49-F238E27FC236}">
-                <a16:creationId xmlns:a16="http://schemas.microsoft.com/office/drawing/2014/main" id="{A196178F-FAD6-9314-15CD-CD3254EF7A11}"/>
+                <a16:creationId xmlns:a16="http://schemas.microsoft.com/office/drawing/2014/main" id="{39D58B23-8659-9356-6E43-A4C0354C52C4}"/>
               </a:ext>
             </a:extLst>
           </p:cNvPr>
@@ -4735,14 +4807,19 @@
             <p:ph type="title"/>
           </p:nvPr>
         </p:nvSpPr>
-        <p:spPr/>
+        <p:spPr>
+          <a:xfrm>
+            <a:off x="838200" y="365125"/>
+            <a:ext cx="7307510" cy="784167"/>
+          </a:xfrm>
+        </p:spPr>
         <p:txBody>
           <a:bodyPr/>
           <a:lstStyle/>
           <a:p>
             <a:r>
               <a:rPr lang="es-ES" dirty="0"/>
-              <a:t>Prueba sobre las variables transformadas</a:t>
+              <a:t>Ajuste con múltiples variables</a:t>
             </a:r>
             <a:endParaRPr lang="es-CO" dirty="0"/>
           </a:p>
@@ -4753,7 +4830,7 @@
           <p:cNvPr id="5" name="Imagen 4">
             <a:extLst>
               <a:ext uri="{FF2B5EF4-FFF2-40B4-BE49-F238E27FC236}">
-                <a16:creationId xmlns:a16="http://schemas.microsoft.com/office/drawing/2014/main" id="{05DB197D-776D-9D59-60F3-5CB23BAEE733}"/>
+                <a16:creationId xmlns:a16="http://schemas.microsoft.com/office/drawing/2014/main" id="{207A6AD8-47F1-8856-027F-6672756052C1}"/>
               </a:ext>
             </a:extLst>
           </p:cNvPr>
@@ -4770,8 +4847,8 @@
         </p:blipFill>
         <p:spPr>
           <a:xfrm>
-            <a:off x="1021798" y="1873485"/>
-            <a:ext cx="9632222" cy="4384499"/>
+            <a:off x="4424142" y="1269186"/>
+            <a:ext cx="7479835" cy="5223689"/>
           </a:xfrm>
           <a:prstGeom prst="rect">
             <a:avLst/>
@@ -4781,7 +4858,7 @@
     </p:spTree>
     <p:extLst>
       <p:ext uri="{BB962C8B-B14F-4D97-AF65-F5344CB8AC3E}">
-        <p14:creationId xmlns:p14="http://schemas.microsoft.com/office/powerpoint/2010/main" val="1903376349"/>
+        <p14:creationId xmlns:p14="http://schemas.microsoft.com/office/powerpoint/2010/main" val="4065838019"/>
       </p:ext>
     </p:extLst>
   </p:cSld>
@@ -4813,7 +4890,7 @@
           <p:cNvPr id="2" name="Título 1">
             <a:extLst>
               <a:ext uri="{FF2B5EF4-FFF2-40B4-BE49-F238E27FC236}">
-                <a16:creationId xmlns:a16="http://schemas.microsoft.com/office/drawing/2014/main" id="{A196178F-FAD6-9314-15CD-CD3254EF7A11}"/>
+                <a16:creationId xmlns:a16="http://schemas.microsoft.com/office/drawing/2014/main" id="{1C210B00-DE51-D0F3-A73A-AC3C2D665BAA}"/>
               </a:ext>
             </a:extLst>
           </p:cNvPr>
@@ -4824,23 +4901,14 @@
             <p:ph type="title"/>
           </p:nvPr>
         </p:nvSpPr>
-        <p:spPr>
-          <a:xfrm>
-            <a:off x="838200" y="205734"/>
-            <a:ext cx="10515600" cy="1325563"/>
-          </a:xfrm>
-        </p:spPr>
+        <p:spPr/>
         <p:txBody>
           <a:bodyPr/>
           <a:lstStyle/>
           <a:p>
             <a:r>
               <a:rPr lang="es-ES" dirty="0"/>
-              <a:t>Finalmente: resumen de  librería </a:t>
-            </a:r>
-            <a:r>
-              <a:rPr lang="es-ES" dirty="0" err="1"/>
-              <a:t>psych</a:t>
+              <a:t>Correlación de variables continuas</a:t>
             </a:r>
             <a:endParaRPr lang="es-CO" dirty="0"/>
           </a:p>
@@ -4848,10 +4916,10 @@
       </p:sp>
       <p:pic>
         <p:nvPicPr>
-          <p:cNvPr id="4" name="Imagen 3">
-            <a:extLst>
-              <a:ext uri="{FF2B5EF4-FFF2-40B4-BE49-F238E27FC236}">
-                <a16:creationId xmlns:a16="http://schemas.microsoft.com/office/drawing/2014/main" id="{0E215A39-A1EB-4CF8-D046-4F58CD4801DE}"/>
+          <p:cNvPr id="6" name="Imagen 5">
+            <a:extLst>
+              <a:ext uri="{FF2B5EF4-FFF2-40B4-BE49-F238E27FC236}">
+                <a16:creationId xmlns:a16="http://schemas.microsoft.com/office/drawing/2014/main" id="{734CFC47-8B46-DA27-CDE0-4D3CBE71F5D8}"/>
               </a:ext>
             </a:extLst>
           </p:cNvPr>
@@ -4868,18 +4936,88 @@
         </p:blipFill>
         <p:spPr>
           <a:xfrm>
-            <a:off x="1233181" y="1365096"/>
-            <a:ext cx="9848675" cy="5127779"/>
+            <a:off x="5953923" y="1889074"/>
+            <a:ext cx="5185920" cy="4720206"/>
           </a:xfrm>
           <a:prstGeom prst="rect">
             <a:avLst/>
           </a:prstGeom>
         </p:spPr>
       </p:pic>
+      <p:pic>
+        <p:nvPicPr>
+          <p:cNvPr id="8" name="Imagen 7">
+            <a:extLst>
+              <a:ext uri="{FF2B5EF4-FFF2-40B4-BE49-F238E27FC236}">
+                <a16:creationId xmlns:a16="http://schemas.microsoft.com/office/drawing/2014/main" id="{08F7793C-1FBD-36E0-616D-1F131CF34349}"/>
+              </a:ext>
+            </a:extLst>
+          </p:cNvPr>
+          <p:cNvPicPr>
+            <a:picLocks noChangeAspect="1"/>
+          </p:cNvPicPr>
+          <p:nvPr/>
+        </p:nvPicPr>
+        <p:blipFill>
+          <a:blip r:embed="rId3"/>
+          <a:stretch>
+            <a:fillRect/>
+          </a:stretch>
+        </p:blipFill>
+        <p:spPr>
+          <a:xfrm>
+            <a:off x="751775" y="4639112"/>
+            <a:ext cx="4868848" cy="838900"/>
+          </a:xfrm>
+          <a:prstGeom prst="rect">
+            <a:avLst/>
+          </a:prstGeom>
+        </p:spPr>
+      </p:pic>
+      <p:sp>
+        <p:nvSpPr>
+          <p:cNvPr id="9" name="CuadroTexto 8">
+            <a:extLst>
+              <a:ext uri="{FF2B5EF4-FFF2-40B4-BE49-F238E27FC236}">
+                <a16:creationId xmlns:a16="http://schemas.microsoft.com/office/drawing/2014/main" id="{42E176B8-BC7E-39AC-87C0-3914FFED883E}"/>
+              </a:ext>
+            </a:extLst>
+          </p:cNvPr>
+          <p:cNvSpPr txBox="1"/>
+          <p:nvPr/>
+        </p:nvSpPr>
+        <p:spPr>
+          <a:xfrm>
+            <a:off x="751775" y="2628069"/>
+            <a:ext cx="3847052" cy="646331"/>
+          </a:xfrm>
+          <a:prstGeom prst="rect">
+            <a:avLst/>
+          </a:prstGeom>
+          <a:noFill/>
+        </p:spPr>
+        <p:txBody>
+          <a:bodyPr wrap="square" rtlCol="0">
+            <a:spAutoFit/>
+          </a:bodyPr>
+          <a:lstStyle/>
+          <a:p>
+            <a:r>
+              <a:rPr lang="es-ES" dirty="0"/>
+              <a:t>Matriz de correlaciones y gráfico de </a:t>
+            </a:r>
+            <a:r>
+              <a:rPr lang="es-ES" dirty="0" err="1"/>
+              <a:t>correlacions</a:t>
+            </a:r>
+            <a:endParaRPr lang="es-CO" dirty="0"/>
+          </a:p>
+        </p:txBody>
+      </p:sp>
     </p:spTree>
     <p:extLst>
       <p:ext uri="{BB962C8B-B14F-4D97-AF65-F5344CB8AC3E}">
-        <p14:creationId xmlns:p14="http://schemas.microsoft.com/office/powerpoint/2010/main" val="3958235729"/>
+        <p14:creationId xmlns:p14="http://schemas.microsoft.com/office/powerpoint/2010/main" val="2850747834"/>
       </p:ext>
     </p:extLst>
   </p:cSld>
@@ -4911,7 +5049,7 @@
           <p:cNvPr id="2" name="Título 1">
             <a:extLst>
               <a:ext uri="{FF2B5EF4-FFF2-40B4-BE49-F238E27FC236}">
-                <a16:creationId xmlns:a16="http://schemas.microsoft.com/office/drawing/2014/main" id="{6A97BA76-486F-CB55-C28E-847CB6E676D6}"/>
+                <a16:creationId xmlns:a16="http://schemas.microsoft.com/office/drawing/2014/main" id="{A196178F-FAD6-9314-15CD-CD3254EF7A11}"/>
               </a:ext>
             </a:extLst>
           </p:cNvPr>
@@ -4922,30 +5060,53 @@
             <p:ph type="title"/>
           </p:nvPr>
         </p:nvSpPr>
-        <p:spPr>
-          <a:xfrm>
-            <a:off x="4655890" y="4395831"/>
-            <a:ext cx="7162101" cy="1975913"/>
-          </a:xfrm>
-        </p:spPr>
-        <p:txBody>
-          <a:bodyPr>
-            <a:normAutofit/>
-          </a:bodyPr>
+        <p:spPr/>
+        <p:txBody>
+          <a:bodyPr/>
           <a:lstStyle/>
           <a:p>
             <a:r>
               <a:rPr lang="es-ES" dirty="0"/>
-              <a:t>Detección multivariante de valores atípicos</a:t>
+              <a:t>Prueba sobre las variables transformadas</a:t>
             </a:r>
             <a:endParaRPr lang="es-CO" dirty="0"/>
           </a:p>
         </p:txBody>
       </p:sp>
+      <p:pic>
+        <p:nvPicPr>
+          <p:cNvPr id="5" name="Imagen 4">
+            <a:extLst>
+              <a:ext uri="{FF2B5EF4-FFF2-40B4-BE49-F238E27FC236}">
+                <a16:creationId xmlns:a16="http://schemas.microsoft.com/office/drawing/2014/main" id="{05DB197D-776D-9D59-60F3-5CB23BAEE733}"/>
+              </a:ext>
+            </a:extLst>
+          </p:cNvPr>
+          <p:cNvPicPr>
+            <a:picLocks noChangeAspect="1"/>
+          </p:cNvPicPr>
+          <p:nvPr/>
+        </p:nvPicPr>
+        <p:blipFill>
+          <a:blip r:embed="rId2"/>
+          <a:stretch>
+            <a:fillRect/>
+          </a:stretch>
+        </p:blipFill>
+        <p:spPr>
+          <a:xfrm>
+            <a:off x="1021798" y="1873485"/>
+            <a:ext cx="9632222" cy="4384499"/>
+          </a:xfrm>
+          <a:prstGeom prst="rect">
+            <a:avLst/>
+          </a:prstGeom>
+        </p:spPr>
+      </p:pic>
     </p:spTree>
     <p:extLst>
       <p:ext uri="{BB962C8B-B14F-4D97-AF65-F5344CB8AC3E}">
-        <p14:creationId xmlns:p14="http://schemas.microsoft.com/office/powerpoint/2010/main" val="2432421202"/>
+        <p14:creationId xmlns:p14="http://schemas.microsoft.com/office/powerpoint/2010/main" val="1903376349"/>
       </p:ext>
     </p:extLst>
   </p:cSld>
@@ -4977,7 +5138,7 @@
           <p:cNvPr id="2" name="Título 1">
             <a:extLst>
               <a:ext uri="{FF2B5EF4-FFF2-40B4-BE49-F238E27FC236}">
-                <a16:creationId xmlns:a16="http://schemas.microsoft.com/office/drawing/2014/main" id="{A05FBAE7-10CD-FE3A-CAE0-FCB5C3F35AF8}"/>
+                <a16:creationId xmlns:a16="http://schemas.microsoft.com/office/drawing/2014/main" id="{A196178F-FAD6-9314-15CD-CD3254EF7A11}"/>
               </a:ext>
             </a:extLst>
           </p:cNvPr>
@@ -4988,39 +5149,108 @@
             <p:ph type="title"/>
           </p:nvPr>
         </p:nvSpPr>
-        <p:spPr/>
+        <p:spPr>
+          <a:xfrm>
+            <a:off x="838200" y="205734"/>
+            <a:ext cx="10515600" cy="1325563"/>
+          </a:xfrm>
+        </p:spPr>
         <p:txBody>
           <a:bodyPr/>
           <a:lstStyle/>
           <a:p>
             <a:r>
               <a:rPr lang="es-ES" dirty="0"/>
-              <a:t>Detección multivariante</a:t>
+              <a:t>Finalmente: resumen de  librería </a:t>
+            </a:r>
+            <a:r>
+              <a:rPr lang="es-ES" dirty="0" err="1"/>
+              <a:t>psych</a:t>
             </a:r>
             <a:endParaRPr lang="es-CO" dirty="0"/>
           </a:p>
         </p:txBody>
       </p:sp>
-      <p:sp>
-        <p:nvSpPr>
-          <p:cNvPr id="3" name="Marcador de contenido 2">
-            <a:extLst>
-              <a:ext uri="{FF2B5EF4-FFF2-40B4-BE49-F238E27FC236}">
-                <a16:creationId xmlns:a16="http://schemas.microsoft.com/office/drawing/2014/main" id="{3678414F-E364-8B87-8661-D18AB1569415}"/>
-              </a:ext>
-            </a:extLst>
-          </p:cNvPr>
-          <p:cNvSpPr>
-            <a:spLocks noGrp="1"/>
-          </p:cNvSpPr>
-          <p:nvPr>
-            <p:ph idx="1"/>
-          </p:nvPr>
-        </p:nvSpPr>
-        <p:spPr>
-          <a:xfrm>
-            <a:off x="838200" y="1825625"/>
-            <a:ext cx="6594446" cy="1202801"/>
+      <p:pic>
+        <p:nvPicPr>
+          <p:cNvPr id="4" name="Imagen 3">
+            <a:extLst>
+              <a:ext uri="{FF2B5EF4-FFF2-40B4-BE49-F238E27FC236}">
+                <a16:creationId xmlns:a16="http://schemas.microsoft.com/office/drawing/2014/main" id="{0E215A39-A1EB-4CF8-D046-4F58CD4801DE}"/>
+              </a:ext>
+            </a:extLst>
+          </p:cNvPr>
+          <p:cNvPicPr>
+            <a:picLocks noChangeAspect="1"/>
+          </p:cNvPicPr>
+          <p:nvPr/>
+        </p:nvPicPr>
+        <p:blipFill>
+          <a:blip r:embed="rId2"/>
+          <a:stretch>
+            <a:fillRect/>
+          </a:stretch>
+        </p:blipFill>
+        <p:spPr>
+          <a:xfrm>
+            <a:off x="1233181" y="1365096"/>
+            <a:ext cx="9848675" cy="5127779"/>
+          </a:xfrm>
+          <a:prstGeom prst="rect">
+            <a:avLst/>
+          </a:prstGeom>
+        </p:spPr>
+      </p:pic>
+    </p:spTree>
+    <p:extLst>
+      <p:ext uri="{BB962C8B-B14F-4D97-AF65-F5344CB8AC3E}">
+        <p14:creationId xmlns:p14="http://schemas.microsoft.com/office/powerpoint/2010/main" val="3958235729"/>
+      </p:ext>
+    </p:extLst>
+  </p:cSld>
+  <p:clrMapOvr>
+    <a:masterClrMapping/>
+  </p:clrMapOvr>
+</p:sld>
+</file>
+
+<file path=ppt/slides/slide24.xml><?xml version="1.0" encoding="utf-8"?>
+<p:sld xmlns:a="http://schemas.openxmlformats.org/drawingml/2006/main" xmlns:r="http://schemas.openxmlformats.org/officeDocument/2006/relationships" xmlns:p="http://schemas.openxmlformats.org/presentationml/2006/main">
+  <p:cSld>
+    <p:spTree>
+      <p:nvGrpSpPr>
+        <p:cNvPr id="1" name=""/>
+        <p:cNvGrpSpPr/>
+        <p:nvPr/>
+      </p:nvGrpSpPr>
+      <p:grpSpPr>
+        <a:xfrm>
+          <a:off x="0" y="0"/>
+          <a:ext cx="0" cy="0"/>
+          <a:chOff x="0" y="0"/>
+          <a:chExt cx="0" cy="0"/>
+        </a:xfrm>
+      </p:grpSpPr>
+      <p:sp>
+        <p:nvSpPr>
+          <p:cNvPr id="2" name="Título 1">
+            <a:extLst>
+              <a:ext uri="{FF2B5EF4-FFF2-40B4-BE49-F238E27FC236}">
+                <a16:creationId xmlns:a16="http://schemas.microsoft.com/office/drawing/2014/main" id="{6A97BA76-486F-CB55-C28E-847CB6E676D6}"/>
+              </a:ext>
+            </a:extLst>
+          </p:cNvPr>
+          <p:cNvSpPr>
+            <a:spLocks noGrp="1"/>
+          </p:cNvSpPr>
+          <p:nvPr>
+            <p:ph type="title"/>
+          </p:nvPr>
+        </p:nvSpPr>
+        <p:spPr>
+          <a:xfrm>
+            <a:off x="6096000" y="5046181"/>
+            <a:ext cx="5721991" cy="1325563"/>
           </a:xfrm>
         </p:spPr>
         <p:txBody>
@@ -5029,12 +5259,526 @@
           </a:bodyPr>
           <a:lstStyle/>
           <a:p>
+            <a:r>
+              <a:rPr lang="es-ES" dirty="0"/>
+              <a:t>Datos faltantes</a:t>
+            </a:r>
+            <a:endParaRPr lang="es-CO" dirty="0"/>
+          </a:p>
+        </p:txBody>
+      </p:sp>
+    </p:spTree>
+    <p:extLst>
+      <p:ext uri="{BB962C8B-B14F-4D97-AF65-F5344CB8AC3E}">
+        <p14:creationId xmlns:p14="http://schemas.microsoft.com/office/powerpoint/2010/main" val="4232120404"/>
+      </p:ext>
+    </p:extLst>
+  </p:cSld>
+  <p:clrMapOvr>
+    <a:masterClrMapping/>
+  </p:clrMapOvr>
+</p:sld>
+</file>
+
+<file path=ppt/slides/slide25.xml><?xml version="1.0" encoding="utf-8"?>
+<p:sld xmlns:a="http://schemas.openxmlformats.org/drawingml/2006/main" xmlns:r="http://schemas.openxmlformats.org/officeDocument/2006/relationships" xmlns:p="http://schemas.openxmlformats.org/presentationml/2006/main">
+  <p:cSld>
+    <p:spTree>
+      <p:nvGrpSpPr>
+        <p:cNvPr id="1" name=""/>
+        <p:cNvGrpSpPr/>
+        <p:nvPr/>
+      </p:nvGrpSpPr>
+      <p:grpSpPr>
+        <a:xfrm>
+          <a:off x="0" y="0"/>
+          <a:ext cx="0" cy="0"/>
+          <a:chOff x="0" y="0"/>
+          <a:chExt cx="0" cy="0"/>
+        </a:xfrm>
+      </p:grpSpPr>
+      <p:pic>
+        <p:nvPicPr>
+          <p:cNvPr id="10" name="Imagen 9">
+            <a:extLst>
+              <a:ext uri="{FF2B5EF4-FFF2-40B4-BE49-F238E27FC236}">
+                <a16:creationId xmlns:a16="http://schemas.microsoft.com/office/drawing/2014/main" id="{91EA3F96-4A1A-4462-2A35-52FE00681B09}"/>
+              </a:ext>
+            </a:extLst>
+          </p:cNvPr>
+          <p:cNvPicPr>
+            <a:picLocks noChangeAspect="1"/>
+          </p:cNvPicPr>
+          <p:nvPr/>
+        </p:nvPicPr>
+        <p:blipFill>
+          <a:blip r:embed="rId2"/>
+          <a:stretch>
+            <a:fillRect/>
+          </a:stretch>
+        </p:blipFill>
+        <p:spPr>
+          <a:xfrm>
+            <a:off x="922789" y="1045073"/>
+            <a:ext cx="10570128" cy="5196007"/>
+          </a:xfrm>
+          <a:prstGeom prst="rect">
+            <a:avLst/>
+          </a:prstGeom>
+        </p:spPr>
+      </p:pic>
+    </p:spTree>
+    <p:extLst>
+      <p:ext uri="{BB962C8B-B14F-4D97-AF65-F5344CB8AC3E}">
+        <p14:creationId xmlns:p14="http://schemas.microsoft.com/office/powerpoint/2010/main" val="1660012433"/>
+      </p:ext>
+    </p:extLst>
+  </p:cSld>
+  <p:clrMapOvr>
+    <a:masterClrMapping/>
+  </p:clrMapOvr>
+</p:sld>
+</file>
+
+<file path=ppt/slides/slide26.xml><?xml version="1.0" encoding="utf-8"?>
+<p:sld xmlns:a="http://schemas.openxmlformats.org/drawingml/2006/main" xmlns:r="http://schemas.openxmlformats.org/officeDocument/2006/relationships" xmlns:p="http://schemas.openxmlformats.org/presentationml/2006/main">
+  <p:cSld>
+    <p:spTree>
+      <p:nvGrpSpPr>
+        <p:cNvPr id="1" name=""/>
+        <p:cNvGrpSpPr/>
+        <p:nvPr/>
+      </p:nvGrpSpPr>
+      <p:grpSpPr>
+        <a:xfrm>
+          <a:off x="0" y="0"/>
+          <a:ext cx="0" cy="0"/>
+          <a:chOff x="0" y="0"/>
+          <a:chExt cx="0" cy="0"/>
+        </a:xfrm>
+      </p:grpSpPr>
+      <p:pic>
+        <p:nvPicPr>
+          <p:cNvPr id="3" name="Imagen 2">
+            <a:extLst>
+              <a:ext uri="{FF2B5EF4-FFF2-40B4-BE49-F238E27FC236}">
+                <a16:creationId xmlns:a16="http://schemas.microsoft.com/office/drawing/2014/main" id="{5DD7AE1B-4CD6-8029-01C5-22283ACE052F}"/>
+              </a:ext>
+            </a:extLst>
+          </p:cNvPr>
+          <p:cNvPicPr>
+            <a:picLocks noChangeAspect="1"/>
+          </p:cNvPicPr>
+          <p:nvPr/>
+        </p:nvPicPr>
+        <p:blipFill>
+          <a:blip r:embed="rId2"/>
+          <a:stretch>
+            <a:fillRect/>
+          </a:stretch>
+        </p:blipFill>
+        <p:spPr>
+          <a:xfrm>
+            <a:off x="1174459" y="998290"/>
+            <a:ext cx="10337305" cy="5351853"/>
+          </a:xfrm>
+          <a:prstGeom prst="rect">
+            <a:avLst/>
+          </a:prstGeom>
+        </p:spPr>
+      </p:pic>
+    </p:spTree>
+    <p:extLst>
+      <p:ext uri="{BB962C8B-B14F-4D97-AF65-F5344CB8AC3E}">
+        <p14:creationId xmlns:p14="http://schemas.microsoft.com/office/powerpoint/2010/main" val="3746460009"/>
+      </p:ext>
+    </p:extLst>
+  </p:cSld>
+  <p:clrMapOvr>
+    <a:masterClrMapping/>
+  </p:clrMapOvr>
+</p:sld>
+</file>
+
+<file path=ppt/slides/slide27.xml><?xml version="1.0" encoding="utf-8"?>
+<p:sld xmlns:a="http://schemas.openxmlformats.org/drawingml/2006/main" xmlns:r="http://schemas.openxmlformats.org/officeDocument/2006/relationships" xmlns:p="http://schemas.openxmlformats.org/presentationml/2006/main">
+  <p:cSld>
+    <p:spTree>
+      <p:nvGrpSpPr>
+        <p:cNvPr id="1" name=""/>
+        <p:cNvGrpSpPr/>
+        <p:nvPr/>
+      </p:nvGrpSpPr>
+      <p:grpSpPr>
+        <a:xfrm>
+          <a:off x="0" y="0"/>
+          <a:ext cx="0" cy="0"/>
+          <a:chOff x="0" y="0"/>
+          <a:chExt cx="0" cy="0"/>
+        </a:xfrm>
+      </p:grpSpPr>
+      <p:pic>
+        <p:nvPicPr>
+          <p:cNvPr id="4" name="Imagen 3">
+            <a:extLst>
+              <a:ext uri="{FF2B5EF4-FFF2-40B4-BE49-F238E27FC236}">
+                <a16:creationId xmlns:a16="http://schemas.microsoft.com/office/drawing/2014/main" id="{11E94A5A-7BFF-8FA7-FE07-2EBAC561C90F}"/>
+              </a:ext>
+            </a:extLst>
+          </p:cNvPr>
+          <p:cNvPicPr>
+            <a:picLocks noChangeAspect="1"/>
+          </p:cNvPicPr>
+          <p:nvPr/>
+        </p:nvPicPr>
+        <p:blipFill>
+          <a:blip r:embed="rId2"/>
+          <a:stretch>
+            <a:fillRect/>
+          </a:stretch>
+        </p:blipFill>
+        <p:spPr>
+          <a:xfrm>
+            <a:off x="1981200" y="591765"/>
+            <a:ext cx="8229600" cy="5964232"/>
+          </a:xfrm>
+          <a:prstGeom prst="rect">
+            <a:avLst/>
+          </a:prstGeom>
+        </p:spPr>
+      </p:pic>
+    </p:spTree>
+    <p:extLst>
+      <p:ext uri="{BB962C8B-B14F-4D97-AF65-F5344CB8AC3E}">
+        <p14:creationId xmlns:p14="http://schemas.microsoft.com/office/powerpoint/2010/main" val="2032745329"/>
+      </p:ext>
+    </p:extLst>
+  </p:cSld>
+  <p:clrMapOvr>
+    <a:masterClrMapping/>
+  </p:clrMapOvr>
+</p:sld>
+</file>
+
+<file path=ppt/slides/slide28.xml><?xml version="1.0" encoding="utf-8"?>
+<p:sld xmlns:a="http://schemas.openxmlformats.org/drawingml/2006/main" xmlns:r="http://schemas.openxmlformats.org/officeDocument/2006/relationships" xmlns:p="http://schemas.openxmlformats.org/presentationml/2006/main">
+  <p:cSld>
+    <p:spTree>
+      <p:nvGrpSpPr>
+        <p:cNvPr id="1" name=""/>
+        <p:cNvGrpSpPr/>
+        <p:nvPr/>
+      </p:nvGrpSpPr>
+      <p:grpSpPr>
+        <a:xfrm>
+          <a:off x="0" y="0"/>
+          <a:ext cx="0" cy="0"/>
+          <a:chOff x="0" y="0"/>
+          <a:chExt cx="0" cy="0"/>
+        </a:xfrm>
+      </p:grpSpPr>
+      <p:sp>
+        <p:nvSpPr>
+          <p:cNvPr id="2" name="CuadroTexto 1">
+            <a:extLst>
+              <a:ext uri="{FF2B5EF4-FFF2-40B4-BE49-F238E27FC236}">
+                <a16:creationId xmlns:a16="http://schemas.microsoft.com/office/drawing/2014/main" id="{ADF258C2-2FDB-265D-853E-0201B83DC465}"/>
+              </a:ext>
+            </a:extLst>
+          </p:cNvPr>
+          <p:cNvSpPr txBox="1"/>
+          <p:nvPr/>
+        </p:nvSpPr>
+        <p:spPr>
+          <a:xfrm>
+            <a:off x="738231" y="679508"/>
+            <a:ext cx="4613945" cy="369332"/>
+          </a:xfrm>
+          <a:prstGeom prst="rect">
+            <a:avLst/>
+          </a:prstGeom>
+          <a:noFill/>
+        </p:spPr>
+        <p:txBody>
+          <a:bodyPr wrap="square" rtlCol="0">
+            <a:spAutoFit/>
+          </a:bodyPr>
+          <a:lstStyle/>
+          <a:p>
+            <a:r>
+              <a:rPr lang="es-ES" dirty="0"/>
+              <a:t>Soluciones a los valores faltantes</a:t>
+            </a:r>
+            <a:endParaRPr lang="es-CO" dirty="0"/>
+          </a:p>
+        </p:txBody>
+      </p:sp>
+      <p:sp>
+        <p:nvSpPr>
+          <p:cNvPr id="3" name="CuadroTexto 2">
+            <a:extLst>
+              <a:ext uri="{FF2B5EF4-FFF2-40B4-BE49-F238E27FC236}">
+                <a16:creationId xmlns:a16="http://schemas.microsoft.com/office/drawing/2014/main" id="{AD8FCE12-651C-42B5-6DE5-018DFA0F9112}"/>
+              </a:ext>
+            </a:extLst>
+          </p:cNvPr>
+          <p:cNvSpPr txBox="1"/>
+          <p:nvPr/>
+        </p:nvSpPr>
+        <p:spPr>
+          <a:xfrm>
+            <a:off x="738231" y="5546521"/>
+            <a:ext cx="4613945" cy="369332"/>
+          </a:xfrm>
+          <a:prstGeom prst="rect">
+            <a:avLst/>
+          </a:prstGeom>
+          <a:noFill/>
+        </p:spPr>
+        <p:txBody>
+          <a:bodyPr wrap="square" rtlCol="0">
+            <a:spAutoFit/>
+          </a:bodyPr>
+          <a:lstStyle/>
+          <a:p>
+            <a:r>
+              <a:rPr lang="es-ES" dirty="0"/>
+              <a:t>A continuación, exploramos la opción d</a:t>
+            </a:r>
+            <a:endParaRPr lang="es-CO" dirty="0"/>
+          </a:p>
+        </p:txBody>
+      </p:sp>
+    </p:spTree>
+    <p:extLst>
+      <p:ext uri="{BB962C8B-B14F-4D97-AF65-F5344CB8AC3E}">
+        <p14:creationId xmlns:p14="http://schemas.microsoft.com/office/powerpoint/2010/main" val="2328010641"/>
+      </p:ext>
+    </p:extLst>
+  </p:cSld>
+  <p:clrMapOvr>
+    <a:masterClrMapping/>
+  </p:clrMapOvr>
+</p:sld>
+</file>
+
+<file path=ppt/slides/slide29.xml><?xml version="1.0" encoding="utf-8"?>
+<p:sld xmlns:a="http://schemas.openxmlformats.org/drawingml/2006/main" xmlns:r="http://schemas.openxmlformats.org/officeDocument/2006/relationships" xmlns:p="http://schemas.openxmlformats.org/presentationml/2006/main">
+  <p:cSld>
+    <p:spTree>
+      <p:nvGrpSpPr>
+        <p:cNvPr id="1" name=""/>
+        <p:cNvGrpSpPr/>
+        <p:nvPr/>
+      </p:nvGrpSpPr>
+      <p:grpSpPr>
+        <a:xfrm>
+          <a:off x="0" y="0"/>
+          <a:ext cx="0" cy="0"/>
+          <a:chOff x="0" y="0"/>
+          <a:chExt cx="0" cy="0"/>
+        </a:xfrm>
+      </p:grpSpPr>
+      <p:sp>
+        <p:nvSpPr>
+          <p:cNvPr id="2" name="Título 1">
+            <a:extLst>
+              <a:ext uri="{FF2B5EF4-FFF2-40B4-BE49-F238E27FC236}">
+                <a16:creationId xmlns:a16="http://schemas.microsoft.com/office/drawing/2014/main" id="{6A97BA76-486F-CB55-C28E-847CB6E676D6}"/>
+              </a:ext>
+            </a:extLst>
+          </p:cNvPr>
+          <p:cNvSpPr>
+            <a:spLocks noGrp="1"/>
+          </p:cNvSpPr>
+          <p:nvPr>
+            <p:ph type="title"/>
+          </p:nvPr>
+        </p:nvSpPr>
+        <p:spPr>
+          <a:xfrm>
+            <a:off x="4228052" y="3800213"/>
+            <a:ext cx="7589940" cy="2571532"/>
+          </a:xfrm>
+        </p:spPr>
+        <p:txBody>
+          <a:bodyPr>
+            <a:normAutofit/>
+          </a:bodyPr>
+          <a:lstStyle/>
+          <a:p>
+            <a:r>
+              <a:rPr lang="es-ES" dirty="0"/>
+              <a:t>Imputación múltiple:</a:t>
+            </a:r>
+            <a:br>
+              <a:rPr lang="es-ES" dirty="0"/>
+            </a:br>
+            <a:r>
+              <a:rPr lang="es-ES" dirty="0"/>
+              <a:t>Aplicación de las leyes de </a:t>
+            </a:r>
+            <a:r>
+              <a:rPr lang="es-ES" dirty="0" err="1"/>
+              <a:t>Rubin</a:t>
+            </a:r>
+            <a:endParaRPr lang="es-CO" dirty="0"/>
+          </a:p>
+        </p:txBody>
+      </p:sp>
+    </p:spTree>
+    <p:extLst>
+      <p:ext uri="{BB962C8B-B14F-4D97-AF65-F5344CB8AC3E}">
+        <p14:creationId xmlns:p14="http://schemas.microsoft.com/office/powerpoint/2010/main" val="1877949141"/>
+      </p:ext>
+    </p:extLst>
+  </p:cSld>
+  <p:clrMapOvr>
+    <a:masterClrMapping/>
+  </p:clrMapOvr>
+</p:sld>
+</file>
+
+<file path=ppt/slides/slide3.xml><?xml version="1.0" encoding="utf-8"?>
+<p:sld xmlns:a="http://schemas.openxmlformats.org/drawingml/2006/main" xmlns:r="http://schemas.openxmlformats.org/officeDocument/2006/relationships" xmlns:p="http://schemas.openxmlformats.org/presentationml/2006/main">
+  <p:cSld>
+    <p:spTree>
+      <p:nvGrpSpPr>
+        <p:cNvPr id="1" name=""/>
+        <p:cNvGrpSpPr/>
+        <p:nvPr/>
+      </p:nvGrpSpPr>
+      <p:grpSpPr>
+        <a:xfrm>
+          <a:off x="0" y="0"/>
+          <a:ext cx="0" cy="0"/>
+          <a:chOff x="0" y="0"/>
+          <a:chExt cx="0" cy="0"/>
+        </a:xfrm>
+      </p:grpSpPr>
+      <p:pic>
+        <p:nvPicPr>
+          <p:cNvPr id="5" name="Imagen 4">
+            <a:extLst>
+              <a:ext uri="{FF2B5EF4-FFF2-40B4-BE49-F238E27FC236}">
+                <a16:creationId xmlns:a16="http://schemas.microsoft.com/office/drawing/2014/main" id="{871C416A-F661-3C0E-3C79-8E2EF435E104}"/>
+              </a:ext>
+            </a:extLst>
+          </p:cNvPr>
+          <p:cNvPicPr>
+            <a:picLocks noChangeAspect="1"/>
+          </p:cNvPicPr>
+          <p:nvPr/>
+        </p:nvPicPr>
+        <p:blipFill>
+          <a:blip r:embed="rId2"/>
+          <a:stretch>
+            <a:fillRect/>
+          </a:stretch>
+        </p:blipFill>
+        <p:spPr>
+          <a:xfrm>
+            <a:off x="1037088" y="751375"/>
+            <a:ext cx="10117824" cy="5355250"/>
+          </a:xfrm>
+          <a:prstGeom prst="rect">
+            <a:avLst/>
+          </a:prstGeom>
+        </p:spPr>
+      </p:pic>
+    </p:spTree>
+    <p:extLst>
+      <p:ext uri="{BB962C8B-B14F-4D97-AF65-F5344CB8AC3E}">
+        <p14:creationId xmlns:p14="http://schemas.microsoft.com/office/powerpoint/2010/main" val="2735233311"/>
+      </p:ext>
+    </p:extLst>
+  </p:cSld>
+  <p:clrMapOvr>
+    <a:masterClrMapping/>
+  </p:clrMapOvr>
+</p:sld>
+</file>
+
+<file path=ppt/slides/slide30.xml><?xml version="1.0" encoding="utf-8"?>
+<p:sld xmlns:a="http://schemas.openxmlformats.org/drawingml/2006/main" xmlns:r="http://schemas.openxmlformats.org/officeDocument/2006/relationships" xmlns:p="http://schemas.openxmlformats.org/presentationml/2006/main">
+  <p:cSld>
+    <p:spTree>
+      <p:nvGrpSpPr>
+        <p:cNvPr id="1" name=""/>
+        <p:cNvGrpSpPr/>
+        <p:nvPr/>
+      </p:nvGrpSpPr>
+      <p:grpSpPr>
+        <a:xfrm>
+          <a:off x="0" y="0"/>
+          <a:ext cx="0" cy="0"/>
+          <a:chOff x="0" y="0"/>
+          <a:chExt cx="0" cy="0"/>
+        </a:xfrm>
+      </p:grpSpPr>
+      <p:sp>
+        <p:nvSpPr>
+          <p:cNvPr id="2" name="Título 1">
+            <a:extLst>
+              <a:ext uri="{FF2B5EF4-FFF2-40B4-BE49-F238E27FC236}">
+                <a16:creationId xmlns:a16="http://schemas.microsoft.com/office/drawing/2014/main" id="{A05FBAE7-10CD-FE3A-CAE0-FCB5C3F35AF8}"/>
+              </a:ext>
+            </a:extLst>
+          </p:cNvPr>
+          <p:cNvSpPr>
+            <a:spLocks noGrp="1"/>
+          </p:cNvSpPr>
+          <p:nvPr>
+            <p:ph type="title"/>
+          </p:nvPr>
+        </p:nvSpPr>
+        <p:spPr/>
+        <p:txBody>
+          <a:bodyPr/>
+          <a:lstStyle/>
+          <a:p>
+            <a:r>
+              <a:rPr lang="es-ES" dirty="0"/>
+              <a:t>Imputación</a:t>
+            </a:r>
+            <a:endParaRPr lang="es-CO" dirty="0"/>
+          </a:p>
+        </p:txBody>
+      </p:sp>
+      <p:sp>
+        <p:nvSpPr>
+          <p:cNvPr id="3" name="Marcador de contenido 2">
+            <a:extLst>
+              <a:ext uri="{FF2B5EF4-FFF2-40B4-BE49-F238E27FC236}">
+                <a16:creationId xmlns:a16="http://schemas.microsoft.com/office/drawing/2014/main" id="{3678414F-E364-8B87-8661-D18AB1569415}"/>
+              </a:ext>
+            </a:extLst>
+          </p:cNvPr>
+          <p:cNvSpPr>
+            <a:spLocks noGrp="1"/>
+          </p:cNvSpPr>
+          <p:nvPr>
+            <p:ph idx="1"/>
+          </p:nvPr>
+        </p:nvSpPr>
+        <p:spPr>
+          <a:xfrm>
+            <a:off x="838200" y="1920510"/>
+            <a:ext cx="9648039" cy="1202801"/>
+          </a:xfrm>
+        </p:spPr>
+        <p:txBody>
+          <a:bodyPr>
+            <a:normAutofit/>
+          </a:bodyPr>
+          <a:lstStyle/>
+          <a:p>
             <a:pPr marL="0" indent="0">
               <a:buNone/>
             </a:pPr>
             <a:r>
               <a:rPr lang="es-ES" sz="2000" dirty="0"/>
-              <a:t>Nótese que un caso puede no tomar valores atípicos en dos variables consideradas individualmente, pero pueden ser valores atípicos cuando son considerados de manera conjunta</a:t>
+              <a:t>Si no hay una variable dependiente bien definida, el investigador podría estar interesado en examinar si un caso es atípico en relación con el conjunto completo de datos (p. 49 de Aldás y Uriel).</a:t>
             </a:r>
             <a:endParaRPr lang="es-CO" sz="2000" dirty="0"/>
           </a:p>
@@ -5056,8 +5800,8 @@
         </p:nvSpPr>
         <p:spPr>
           <a:xfrm>
-            <a:off x="838200" y="3163363"/>
-            <a:ext cx="6594446" cy="2398538"/>
+            <a:off x="2323052" y="3353134"/>
+            <a:ext cx="6594446" cy="1400248"/>
           </a:xfrm>
           <a:prstGeom prst="rect">
             <a:avLst/>
@@ -5232,1764 +5976,6 @@
             </a:lvl9pPr>
           </a:lstStyle>
           <a:p>
-            <a:pPr marL="0" indent="0">
-              <a:buFont typeface="Arial" panose="020B0604020202020204" pitchFamily="34" charset="0"/>
-              <a:buNone/>
-            </a:pPr>
-            <a:r>
-              <a:rPr lang="es-ES" sz="2000" dirty="0"/>
-              <a:t>Ejemplo: </a:t>
-            </a:r>
-          </a:p>
-          <a:p>
-            <a:r>
-              <a:rPr lang="es-ES" sz="2000" dirty="0"/>
-              <a:t>Un individuo de 14 años no es un valor atípico</a:t>
-            </a:r>
-          </a:p>
-          <a:p>
-            <a:r>
-              <a:rPr lang="es-ES" sz="2000" dirty="0"/>
-              <a:t>Un individuo con doctorado no es un valor atípico</a:t>
-            </a:r>
-          </a:p>
-          <a:p>
-            <a:endParaRPr lang="es-CO" sz="2000" dirty="0"/>
-          </a:p>
-          <a:p>
-            <a:pPr marL="0" indent="0">
-              <a:buNone/>
-            </a:pPr>
-            <a:r>
-              <a:rPr lang="es-CO" sz="2000" dirty="0"/>
-              <a:t>Pero un individuo de 14 años con doctorado es un valor atípico.</a:t>
-            </a:r>
-          </a:p>
-        </p:txBody>
-      </p:sp>
-    </p:spTree>
-    <p:extLst>
-      <p:ext uri="{BB962C8B-B14F-4D97-AF65-F5344CB8AC3E}">
-        <p14:creationId xmlns:p14="http://schemas.microsoft.com/office/powerpoint/2010/main" val="2481580118"/>
-      </p:ext>
-    </p:extLst>
-  </p:cSld>
-  <p:clrMapOvr>
-    <a:masterClrMapping/>
-  </p:clrMapOvr>
-</p:sld>
-</file>
-
-<file path=ppt/slides/slide24.xml><?xml version="1.0" encoding="utf-8"?>
-<p:sld xmlns:a="http://schemas.openxmlformats.org/drawingml/2006/main" xmlns:r="http://schemas.openxmlformats.org/officeDocument/2006/relationships" xmlns:p="http://schemas.openxmlformats.org/presentationml/2006/main">
-  <p:cSld>
-    <p:spTree>
-      <p:nvGrpSpPr>
-        <p:cNvPr id="1" name=""/>
-        <p:cNvGrpSpPr/>
-        <p:nvPr/>
-      </p:nvGrpSpPr>
-      <p:grpSpPr>
-        <a:xfrm>
-          <a:off x="0" y="0"/>
-          <a:ext cx="0" cy="0"/>
-          <a:chOff x="0" y="0"/>
-          <a:chExt cx="0" cy="0"/>
-        </a:xfrm>
-      </p:grpSpPr>
-      <p:sp>
-        <p:nvSpPr>
-          <p:cNvPr id="2" name="Título 1">
-            <a:extLst>
-              <a:ext uri="{FF2B5EF4-FFF2-40B4-BE49-F238E27FC236}">
-                <a16:creationId xmlns:a16="http://schemas.microsoft.com/office/drawing/2014/main" id="{A05FBAE7-10CD-FE3A-CAE0-FCB5C3F35AF8}"/>
-              </a:ext>
-            </a:extLst>
-          </p:cNvPr>
-          <p:cNvSpPr>
-            <a:spLocks noGrp="1"/>
-          </p:cNvSpPr>
-          <p:nvPr>
-            <p:ph type="title"/>
-          </p:nvPr>
-        </p:nvSpPr>
-        <p:spPr/>
-        <p:txBody>
-          <a:bodyPr/>
-          <a:lstStyle/>
-          <a:p>
-            <a:r>
-              <a:rPr lang="es-ES" dirty="0"/>
-              <a:t>Detección bivariante</a:t>
-            </a:r>
-            <a:endParaRPr lang="es-CO" dirty="0"/>
-          </a:p>
-        </p:txBody>
-      </p:sp>
-      <p:sp>
-        <p:nvSpPr>
-          <p:cNvPr id="3" name="Marcador de contenido 2">
-            <a:extLst>
-              <a:ext uri="{FF2B5EF4-FFF2-40B4-BE49-F238E27FC236}">
-                <a16:creationId xmlns:a16="http://schemas.microsoft.com/office/drawing/2014/main" id="{3678414F-E364-8B87-8661-D18AB1569415}"/>
-              </a:ext>
-            </a:extLst>
-          </p:cNvPr>
-          <p:cNvSpPr>
-            <a:spLocks noGrp="1"/>
-          </p:cNvSpPr>
-          <p:nvPr>
-            <p:ph idx="1"/>
-          </p:nvPr>
-        </p:nvSpPr>
-        <p:spPr>
-          <a:xfrm>
-            <a:off x="838200" y="1920510"/>
-            <a:ext cx="9648039" cy="1202801"/>
-          </a:xfrm>
-        </p:spPr>
-        <p:txBody>
-          <a:bodyPr>
-            <a:normAutofit/>
-          </a:bodyPr>
-          <a:lstStyle/>
-          <a:p>
-            <a:pPr marL="0" indent="0">
-              <a:buNone/>
-            </a:pPr>
-            <a:r>
-              <a:rPr lang="es-ES" sz="2000" dirty="0"/>
-              <a:t>Si hay una variable dependiente bien definida, el análisis bivariante permite contrastar la variable dependiente con el conjunto de variables independientes. Un procedimiento sencillo es el siguiente:</a:t>
-            </a:r>
-            <a:endParaRPr lang="es-CO" sz="2000" dirty="0"/>
-          </a:p>
-        </p:txBody>
-      </p:sp>
-      <p:sp>
-        <p:nvSpPr>
-          <p:cNvPr id="4" name="Marcador de contenido 2">
-            <a:extLst>
-              <a:ext uri="{FF2B5EF4-FFF2-40B4-BE49-F238E27FC236}">
-                <a16:creationId xmlns:a16="http://schemas.microsoft.com/office/drawing/2014/main" id="{90E4CC4C-C3C7-2C01-BD95-BD6F7605669C}"/>
-              </a:ext>
-            </a:extLst>
-          </p:cNvPr>
-          <p:cNvSpPr txBox="1">
-            <a:spLocks/>
-          </p:cNvSpPr>
-          <p:nvPr/>
-        </p:nvSpPr>
-        <p:spPr>
-          <a:xfrm>
-            <a:off x="2323052" y="3353134"/>
-            <a:ext cx="6594446" cy="1400248"/>
-          </a:xfrm>
-          <a:prstGeom prst="rect">
-            <a:avLst/>
-          </a:prstGeom>
-        </p:spPr>
-        <p:txBody>
-          <a:bodyPr vert="horz" lIns="91440" tIns="45720" rIns="91440" bIns="45720" rtlCol="0">
-            <a:normAutofit/>
-          </a:bodyPr>
-          <a:lstStyle>
-            <a:lvl1pPr marL="228600" indent="-228600" algn="l" defTabSz="914400" rtl="0" eaLnBrk="1" latinLnBrk="0" hangingPunct="1">
-              <a:lnSpc>
-                <a:spcPct val="90000"/>
-              </a:lnSpc>
-              <a:spcBef>
-                <a:spcPts val="1000"/>
-              </a:spcBef>
-              <a:buFont typeface="Arial" panose="020B0604020202020204" pitchFamily="34" charset="0"/>
-              <a:buChar char="•"/>
-              <a:defRPr sz="2800" kern="1200">
-                <a:solidFill>
-                  <a:schemeClr val="tx1"/>
-                </a:solidFill>
-                <a:latin typeface="+mn-lt"/>
-                <a:ea typeface="+mn-ea"/>
-                <a:cs typeface="+mn-cs"/>
-              </a:defRPr>
-            </a:lvl1pPr>
-            <a:lvl2pPr marL="685800" indent="-228600" algn="l" defTabSz="914400" rtl="0" eaLnBrk="1" latinLnBrk="0" hangingPunct="1">
-              <a:lnSpc>
-                <a:spcPct val="90000"/>
-              </a:lnSpc>
-              <a:spcBef>
-                <a:spcPts val="500"/>
-              </a:spcBef>
-              <a:buFont typeface="Arial" panose="020B0604020202020204" pitchFamily="34" charset="0"/>
-              <a:buChar char="•"/>
-              <a:defRPr sz="2400" kern="1200">
-                <a:solidFill>
-                  <a:schemeClr val="tx1"/>
-                </a:solidFill>
-                <a:latin typeface="+mn-lt"/>
-                <a:ea typeface="+mn-ea"/>
-                <a:cs typeface="+mn-cs"/>
-              </a:defRPr>
-            </a:lvl2pPr>
-            <a:lvl3pPr marL="1143000" indent="-228600" algn="l" defTabSz="914400" rtl="0" eaLnBrk="1" latinLnBrk="0" hangingPunct="1">
-              <a:lnSpc>
-                <a:spcPct val="90000"/>
-              </a:lnSpc>
-              <a:spcBef>
-                <a:spcPts val="500"/>
-              </a:spcBef>
-              <a:buFont typeface="Arial" panose="020B0604020202020204" pitchFamily="34" charset="0"/>
-              <a:buChar char="•"/>
-              <a:defRPr sz="2000" kern="1200">
-                <a:solidFill>
-                  <a:schemeClr val="tx1"/>
-                </a:solidFill>
-                <a:latin typeface="+mn-lt"/>
-                <a:ea typeface="+mn-ea"/>
-                <a:cs typeface="+mn-cs"/>
-              </a:defRPr>
-            </a:lvl3pPr>
-            <a:lvl4pPr marL="1600200" indent="-228600" algn="l" defTabSz="914400" rtl="0" eaLnBrk="1" latinLnBrk="0" hangingPunct="1">
-              <a:lnSpc>
-                <a:spcPct val="90000"/>
-              </a:lnSpc>
-              <a:spcBef>
-                <a:spcPts val="500"/>
-              </a:spcBef>
-              <a:buFont typeface="Arial" panose="020B0604020202020204" pitchFamily="34" charset="0"/>
-              <a:buChar char="•"/>
-              <a:defRPr sz="1800" kern="1200">
-                <a:solidFill>
-                  <a:schemeClr val="tx1"/>
-                </a:solidFill>
-                <a:latin typeface="+mn-lt"/>
-                <a:ea typeface="+mn-ea"/>
-                <a:cs typeface="+mn-cs"/>
-              </a:defRPr>
-            </a:lvl4pPr>
-            <a:lvl5pPr marL="2057400" indent="-228600" algn="l" defTabSz="914400" rtl="0" eaLnBrk="1" latinLnBrk="0" hangingPunct="1">
-              <a:lnSpc>
-                <a:spcPct val="90000"/>
-              </a:lnSpc>
-              <a:spcBef>
-                <a:spcPts val="500"/>
-              </a:spcBef>
-              <a:buFont typeface="Arial" panose="020B0604020202020204" pitchFamily="34" charset="0"/>
-              <a:buChar char="•"/>
-              <a:defRPr sz="1800" kern="1200">
-                <a:solidFill>
-                  <a:schemeClr val="tx1"/>
-                </a:solidFill>
-                <a:latin typeface="+mn-lt"/>
-                <a:ea typeface="+mn-ea"/>
-                <a:cs typeface="+mn-cs"/>
-              </a:defRPr>
-            </a:lvl5pPr>
-            <a:lvl6pPr marL="2514600" indent="-228600" algn="l" defTabSz="914400" rtl="0" eaLnBrk="1" latinLnBrk="0" hangingPunct="1">
-              <a:lnSpc>
-                <a:spcPct val="90000"/>
-              </a:lnSpc>
-              <a:spcBef>
-                <a:spcPts val="500"/>
-              </a:spcBef>
-              <a:buFont typeface="Arial" panose="020B0604020202020204" pitchFamily="34" charset="0"/>
-              <a:buChar char="•"/>
-              <a:defRPr sz="1800" kern="1200">
-                <a:solidFill>
-                  <a:schemeClr val="tx1"/>
-                </a:solidFill>
-                <a:latin typeface="+mn-lt"/>
-                <a:ea typeface="+mn-ea"/>
-                <a:cs typeface="+mn-cs"/>
-              </a:defRPr>
-            </a:lvl6pPr>
-            <a:lvl7pPr marL="2971800" indent="-228600" algn="l" defTabSz="914400" rtl="0" eaLnBrk="1" latinLnBrk="0" hangingPunct="1">
-              <a:lnSpc>
-                <a:spcPct val="90000"/>
-              </a:lnSpc>
-              <a:spcBef>
-                <a:spcPts val="500"/>
-              </a:spcBef>
-              <a:buFont typeface="Arial" panose="020B0604020202020204" pitchFamily="34" charset="0"/>
-              <a:buChar char="•"/>
-              <a:defRPr sz="1800" kern="1200">
-                <a:solidFill>
-                  <a:schemeClr val="tx1"/>
-                </a:solidFill>
-                <a:latin typeface="+mn-lt"/>
-                <a:ea typeface="+mn-ea"/>
-                <a:cs typeface="+mn-cs"/>
-              </a:defRPr>
-            </a:lvl7pPr>
-            <a:lvl8pPr marL="3429000" indent="-228600" algn="l" defTabSz="914400" rtl="0" eaLnBrk="1" latinLnBrk="0" hangingPunct="1">
-              <a:lnSpc>
-                <a:spcPct val="90000"/>
-              </a:lnSpc>
-              <a:spcBef>
-                <a:spcPts val="500"/>
-              </a:spcBef>
-              <a:buFont typeface="Arial" panose="020B0604020202020204" pitchFamily="34" charset="0"/>
-              <a:buChar char="•"/>
-              <a:defRPr sz="1800" kern="1200">
-                <a:solidFill>
-                  <a:schemeClr val="tx1"/>
-                </a:solidFill>
-                <a:latin typeface="+mn-lt"/>
-                <a:ea typeface="+mn-ea"/>
-                <a:cs typeface="+mn-cs"/>
-              </a:defRPr>
-            </a:lvl8pPr>
-            <a:lvl9pPr marL="3886200" indent="-228600" algn="l" defTabSz="914400" rtl="0" eaLnBrk="1" latinLnBrk="0" hangingPunct="1">
-              <a:lnSpc>
-                <a:spcPct val="90000"/>
-              </a:lnSpc>
-              <a:spcBef>
-                <a:spcPts val="500"/>
-              </a:spcBef>
-              <a:buFont typeface="Arial" panose="020B0604020202020204" pitchFamily="34" charset="0"/>
-              <a:buChar char="•"/>
-              <a:defRPr sz="1800" kern="1200">
-                <a:solidFill>
-                  <a:schemeClr val="tx1"/>
-                </a:solidFill>
-                <a:latin typeface="+mn-lt"/>
-                <a:ea typeface="+mn-ea"/>
-                <a:cs typeface="+mn-cs"/>
-              </a:defRPr>
-            </a:lvl9pPr>
-          </a:lstStyle>
-          <a:p>
-            <a:r>
-              <a:rPr lang="es-ES" sz="2000" dirty="0"/>
-              <a:t>Ajustar una regresión lineal simple</a:t>
-            </a:r>
-          </a:p>
-          <a:p>
-            <a:r>
-              <a:rPr lang="es-ES" sz="2000" dirty="0"/>
-              <a:t>Examinar los casos que están por fuera de las bandas de un intervalo de predicción individual (95%)</a:t>
-            </a:r>
-          </a:p>
-          <a:p>
-            <a:endParaRPr lang="es-CO" sz="2000" dirty="0"/>
-          </a:p>
-        </p:txBody>
-      </p:sp>
-    </p:spTree>
-    <p:extLst>
-      <p:ext uri="{BB962C8B-B14F-4D97-AF65-F5344CB8AC3E}">
-        <p14:creationId xmlns:p14="http://schemas.microsoft.com/office/powerpoint/2010/main" val="3798956567"/>
-      </p:ext>
-    </p:extLst>
-  </p:cSld>
-  <p:clrMapOvr>
-    <a:masterClrMapping/>
-  </p:clrMapOvr>
-</p:sld>
-</file>
-
-<file path=ppt/slides/slide25.xml><?xml version="1.0" encoding="utf-8"?>
-<p:sld xmlns:a="http://schemas.openxmlformats.org/drawingml/2006/main" xmlns:r="http://schemas.openxmlformats.org/officeDocument/2006/relationships" xmlns:p="http://schemas.openxmlformats.org/presentationml/2006/main">
-  <p:cSld>
-    <p:spTree>
-      <p:nvGrpSpPr>
-        <p:cNvPr id="1" name=""/>
-        <p:cNvGrpSpPr/>
-        <p:nvPr/>
-      </p:nvGrpSpPr>
-      <p:grpSpPr>
-        <a:xfrm>
-          <a:off x="0" y="0"/>
-          <a:ext cx="0" cy="0"/>
-          <a:chOff x="0" y="0"/>
-          <a:chExt cx="0" cy="0"/>
-        </a:xfrm>
-      </p:grpSpPr>
-      <p:sp>
-        <p:nvSpPr>
-          <p:cNvPr id="2" name="Título 1">
-            <a:extLst>
-              <a:ext uri="{FF2B5EF4-FFF2-40B4-BE49-F238E27FC236}">
-                <a16:creationId xmlns:a16="http://schemas.microsoft.com/office/drawing/2014/main" id="{A05FBAE7-10CD-FE3A-CAE0-FCB5C3F35AF8}"/>
-              </a:ext>
-            </a:extLst>
-          </p:cNvPr>
-          <p:cNvSpPr>
-            <a:spLocks noGrp="1"/>
-          </p:cNvSpPr>
-          <p:nvPr>
-            <p:ph type="title"/>
-          </p:nvPr>
-        </p:nvSpPr>
-        <p:spPr/>
-        <p:txBody>
-          <a:bodyPr/>
-          <a:lstStyle/>
-          <a:p>
-            <a:r>
-              <a:rPr lang="es-ES" dirty="0"/>
-              <a:t>Detección Multivariante</a:t>
-            </a:r>
-            <a:endParaRPr lang="es-CO" dirty="0"/>
-          </a:p>
-        </p:txBody>
-      </p:sp>
-      <p:sp>
-        <p:nvSpPr>
-          <p:cNvPr id="3" name="Marcador de contenido 2">
-            <a:extLst>
-              <a:ext uri="{FF2B5EF4-FFF2-40B4-BE49-F238E27FC236}">
-                <a16:creationId xmlns:a16="http://schemas.microsoft.com/office/drawing/2014/main" id="{3678414F-E364-8B87-8661-D18AB1569415}"/>
-              </a:ext>
-            </a:extLst>
-          </p:cNvPr>
-          <p:cNvSpPr>
-            <a:spLocks noGrp="1"/>
-          </p:cNvSpPr>
-          <p:nvPr>
-            <p:ph idx="1"/>
-          </p:nvPr>
-        </p:nvSpPr>
-        <p:spPr>
-          <a:xfrm>
-            <a:off x="838200" y="1920510"/>
-            <a:ext cx="9648039" cy="1202801"/>
-          </a:xfrm>
-        </p:spPr>
-        <p:txBody>
-          <a:bodyPr>
-            <a:normAutofit/>
-          </a:bodyPr>
-          <a:lstStyle/>
-          <a:p>
-            <a:pPr marL="0" indent="0">
-              <a:buNone/>
-            </a:pPr>
-            <a:r>
-              <a:rPr lang="es-ES" sz="2000" dirty="0"/>
-              <a:t>Si no hay una variable dependiente bien definida, el investigador podría estar interesado en examinar si un caso es atípico en relación con el conjunto completo de datos (p. 49 de Aldás y Uriel).</a:t>
-            </a:r>
-            <a:endParaRPr lang="es-CO" sz="2000" dirty="0"/>
-          </a:p>
-        </p:txBody>
-      </p:sp>
-      <p:sp>
-        <p:nvSpPr>
-          <p:cNvPr id="4" name="Marcador de contenido 2">
-            <a:extLst>
-              <a:ext uri="{FF2B5EF4-FFF2-40B4-BE49-F238E27FC236}">
-                <a16:creationId xmlns:a16="http://schemas.microsoft.com/office/drawing/2014/main" id="{90E4CC4C-C3C7-2C01-BD95-BD6F7605669C}"/>
-              </a:ext>
-            </a:extLst>
-          </p:cNvPr>
-          <p:cNvSpPr txBox="1">
-            <a:spLocks/>
-          </p:cNvSpPr>
-          <p:nvPr/>
-        </p:nvSpPr>
-        <p:spPr>
-          <a:xfrm>
-            <a:off x="2323052" y="3353134"/>
-            <a:ext cx="6594446" cy="1400248"/>
-          </a:xfrm>
-          <a:prstGeom prst="rect">
-            <a:avLst/>
-          </a:prstGeom>
-        </p:spPr>
-        <p:txBody>
-          <a:bodyPr vert="horz" lIns="91440" tIns="45720" rIns="91440" bIns="45720" rtlCol="0">
-            <a:normAutofit/>
-          </a:bodyPr>
-          <a:lstStyle>
-            <a:lvl1pPr marL="228600" indent="-228600" algn="l" defTabSz="914400" rtl="0" eaLnBrk="1" latinLnBrk="0" hangingPunct="1">
-              <a:lnSpc>
-                <a:spcPct val="90000"/>
-              </a:lnSpc>
-              <a:spcBef>
-                <a:spcPts val="1000"/>
-              </a:spcBef>
-              <a:buFont typeface="Arial" panose="020B0604020202020204" pitchFamily="34" charset="0"/>
-              <a:buChar char="•"/>
-              <a:defRPr sz="2800" kern="1200">
-                <a:solidFill>
-                  <a:schemeClr val="tx1"/>
-                </a:solidFill>
-                <a:latin typeface="+mn-lt"/>
-                <a:ea typeface="+mn-ea"/>
-                <a:cs typeface="+mn-cs"/>
-              </a:defRPr>
-            </a:lvl1pPr>
-            <a:lvl2pPr marL="685800" indent="-228600" algn="l" defTabSz="914400" rtl="0" eaLnBrk="1" latinLnBrk="0" hangingPunct="1">
-              <a:lnSpc>
-                <a:spcPct val="90000"/>
-              </a:lnSpc>
-              <a:spcBef>
-                <a:spcPts val="500"/>
-              </a:spcBef>
-              <a:buFont typeface="Arial" panose="020B0604020202020204" pitchFamily="34" charset="0"/>
-              <a:buChar char="•"/>
-              <a:defRPr sz="2400" kern="1200">
-                <a:solidFill>
-                  <a:schemeClr val="tx1"/>
-                </a:solidFill>
-                <a:latin typeface="+mn-lt"/>
-                <a:ea typeface="+mn-ea"/>
-                <a:cs typeface="+mn-cs"/>
-              </a:defRPr>
-            </a:lvl2pPr>
-            <a:lvl3pPr marL="1143000" indent="-228600" algn="l" defTabSz="914400" rtl="0" eaLnBrk="1" latinLnBrk="0" hangingPunct="1">
-              <a:lnSpc>
-                <a:spcPct val="90000"/>
-              </a:lnSpc>
-              <a:spcBef>
-                <a:spcPts val="500"/>
-              </a:spcBef>
-              <a:buFont typeface="Arial" panose="020B0604020202020204" pitchFamily="34" charset="0"/>
-              <a:buChar char="•"/>
-              <a:defRPr sz="2000" kern="1200">
-                <a:solidFill>
-                  <a:schemeClr val="tx1"/>
-                </a:solidFill>
-                <a:latin typeface="+mn-lt"/>
-                <a:ea typeface="+mn-ea"/>
-                <a:cs typeface="+mn-cs"/>
-              </a:defRPr>
-            </a:lvl3pPr>
-            <a:lvl4pPr marL="1600200" indent="-228600" algn="l" defTabSz="914400" rtl="0" eaLnBrk="1" latinLnBrk="0" hangingPunct="1">
-              <a:lnSpc>
-                <a:spcPct val="90000"/>
-              </a:lnSpc>
-              <a:spcBef>
-                <a:spcPts val="500"/>
-              </a:spcBef>
-              <a:buFont typeface="Arial" panose="020B0604020202020204" pitchFamily="34" charset="0"/>
-              <a:buChar char="•"/>
-              <a:defRPr sz="1800" kern="1200">
-                <a:solidFill>
-                  <a:schemeClr val="tx1"/>
-                </a:solidFill>
-                <a:latin typeface="+mn-lt"/>
-                <a:ea typeface="+mn-ea"/>
-                <a:cs typeface="+mn-cs"/>
-              </a:defRPr>
-            </a:lvl4pPr>
-            <a:lvl5pPr marL="2057400" indent="-228600" algn="l" defTabSz="914400" rtl="0" eaLnBrk="1" latinLnBrk="0" hangingPunct="1">
-              <a:lnSpc>
-                <a:spcPct val="90000"/>
-              </a:lnSpc>
-              <a:spcBef>
-                <a:spcPts val="500"/>
-              </a:spcBef>
-              <a:buFont typeface="Arial" panose="020B0604020202020204" pitchFamily="34" charset="0"/>
-              <a:buChar char="•"/>
-              <a:defRPr sz="1800" kern="1200">
-                <a:solidFill>
-                  <a:schemeClr val="tx1"/>
-                </a:solidFill>
-                <a:latin typeface="+mn-lt"/>
-                <a:ea typeface="+mn-ea"/>
-                <a:cs typeface="+mn-cs"/>
-              </a:defRPr>
-            </a:lvl5pPr>
-            <a:lvl6pPr marL="2514600" indent="-228600" algn="l" defTabSz="914400" rtl="0" eaLnBrk="1" latinLnBrk="0" hangingPunct="1">
-              <a:lnSpc>
-                <a:spcPct val="90000"/>
-              </a:lnSpc>
-              <a:spcBef>
-                <a:spcPts val="500"/>
-              </a:spcBef>
-              <a:buFont typeface="Arial" panose="020B0604020202020204" pitchFamily="34" charset="0"/>
-              <a:buChar char="•"/>
-              <a:defRPr sz="1800" kern="1200">
-                <a:solidFill>
-                  <a:schemeClr val="tx1"/>
-                </a:solidFill>
-                <a:latin typeface="+mn-lt"/>
-                <a:ea typeface="+mn-ea"/>
-                <a:cs typeface="+mn-cs"/>
-              </a:defRPr>
-            </a:lvl6pPr>
-            <a:lvl7pPr marL="2971800" indent="-228600" algn="l" defTabSz="914400" rtl="0" eaLnBrk="1" latinLnBrk="0" hangingPunct="1">
-              <a:lnSpc>
-                <a:spcPct val="90000"/>
-              </a:lnSpc>
-              <a:spcBef>
-                <a:spcPts val="500"/>
-              </a:spcBef>
-              <a:buFont typeface="Arial" panose="020B0604020202020204" pitchFamily="34" charset="0"/>
-              <a:buChar char="•"/>
-              <a:defRPr sz="1800" kern="1200">
-                <a:solidFill>
-                  <a:schemeClr val="tx1"/>
-                </a:solidFill>
-                <a:latin typeface="+mn-lt"/>
-                <a:ea typeface="+mn-ea"/>
-                <a:cs typeface="+mn-cs"/>
-              </a:defRPr>
-            </a:lvl7pPr>
-            <a:lvl8pPr marL="3429000" indent="-228600" algn="l" defTabSz="914400" rtl="0" eaLnBrk="1" latinLnBrk="0" hangingPunct="1">
-              <a:lnSpc>
-                <a:spcPct val="90000"/>
-              </a:lnSpc>
-              <a:spcBef>
-                <a:spcPts val="500"/>
-              </a:spcBef>
-              <a:buFont typeface="Arial" panose="020B0604020202020204" pitchFamily="34" charset="0"/>
-              <a:buChar char="•"/>
-              <a:defRPr sz="1800" kern="1200">
-                <a:solidFill>
-                  <a:schemeClr val="tx1"/>
-                </a:solidFill>
-                <a:latin typeface="+mn-lt"/>
-                <a:ea typeface="+mn-ea"/>
-                <a:cs typeface="+mn-cs"/>
-              </a:defRPr>
-            </a:lvl8pPr>
-            <a:lvl9pPr marL="3886200" indent="-228600" algn="l" defTabSz="914400" rtl="0" eaLnBrk="1" latinLnBrk="0" hangingPunct="1">
-              <a:lnSpc>
-                <a:spcPct val="90000"/>
-              </a:lnSpc>
-              <a:spcBef>
-                <a:spcPts val="500"/>
-              </a:spcBef>
-              <a:buFont typeface="Arial" panose="020B0604020202020204" pitchFamily="34" charset="0"/>
-              <a:buChar char="•"/>
-              <a:defRPr sz="1800" kern="1200">
-                <a:solidFill>
-                  <a:schemeClr val="tx1"/>
-                </a:solidFill>
-                <a:latin typeface="+mn-lt"/>
-                <a:ea typeface="+mn-ea"/>
-                <a:cs typeface="+mn-cs"/>
-              </a:defRPr>
-            </a:lvl9pPr>
-          </a:lstStyle>
-          <a:p>
-            <a:r>
-              <a:rPr lang="es-ES" sz="2000" dirty="0"/>
-              <a:t>Ajustar una regresión lineal simple</a:t>
-            </a:r>
-          </a:p>
-          <a:p>
-            <a:r>
-              <a:rPr lang="es-ES" sz="2000" dirty="0"/>
-              <a:t>Examinar los casos que están por fuera de las bandas de un intervalo de predicción individual (95%)</a:t>
-            </a:r>
-          </a:p>
-          <a:p>
-            <a:endParaRPr lang="es-CO" sz="2000" dirty="0"/>
-          </a:p>
-        </p:txBody>
-      </p:sp>
-    </p:spTree>
-    <p:extLst>
-      <p:ext uri="{BB962C8B-B14F-4D97-AF65-F5344CB8AC3E}">
-        <p14:creationId xmlns:p14="http://schemas.microsoft.com/office/powerpoint/2010/main" val="498486101"/>
-      </p:ext>
-    </p:extLst>
-  </p:cSld>
-  <p:clrMapOvr>
-    <a:masterClrMapping/>
-  </p:clrMapOvr>
-</p:sld>
-</file>
-
-<file path=ppt/slides/slide26.xml><?xml version="1.0" encoding="utf-8"?>
-<p:sld xmlns:a="http://schemas.openxmlformats.org/drawingml/2006/main" xmlns:r="http://schemas.openxmlformats.org/officeDocument/2006/relationships" xmlns:p="http://schemas.openxmlformats.org/presentationml/2006/main">
-  <p:cSld>
-    <p:spTree>
-      <p:nvGrpSpPr>
-        <p:cNvPr id="1" name=""/>
-        <p:cNvGrpSpPr/>
-        <p:nvPr/>
-      </p:nvGrpSpPr>
-      <p:grpSpPr>
-        <a:xfrm>
-          <a:off x="0" y="0"/>
-          <a:ext cx="0" cy="0"/>
-          <a:chOff x="0" y="0"/>
-          <a:chExt cx="0" cy="0"/>
-        </a:xfrm>
-      </p:grpSpPr>
-      <p:sp>
-        <p:nvSpPr>
-          <p:cNvPr id="2" name="Título 1">
-            <a:extLst>
-              <a:ext uri="{FF2B5EF4-FFF2-40B4-BE49-F238E27FC236}">
-                <a16:creationId xmlns:a16="http://schemas.microsoft.com/office/drawing/2014/main" id="{6A97BA76-486F-CB55-C28E-847CB6E676D6}"/>
-              </a:ext>
-            </a:extLst>
-          </p:cNvPr>
-          <p:cNvSpPr>
-            <a:spLocks noGrp="1"/>
-          </p:cNvSpPr>
-          <p:nvPr>
-            <p:ph type="title"/>
-          </p:nvPr>
-        </p:nvSpPr>
-        <p:spPr>
-          <a:xfrm>
-            <a:off x="6096000" y="5046181"/>
-            <a:ext cx="5721991" cy="1325563"/>
-          </a:xfrm>
-        </p:spPr>
-        <p:txBody>
-          <a:bodyPr>
-            <a:normAutofit/>
-          </a:bodyPr>
-          <a:lstStyle/>
-          <a:p>
-            <a:r>
-              <a:rPr lang="es-ES" dirty="0"/>
-              <a:t>Datos faltantes</a:t>
-            </a:r>
-            <a:endParaRPr lang="es-CO" dirty="0"/>
-          </a:p>
-        </p:txBody>
-      </p:sp>
-    </p:spTree>
-    <p:extLst>
-      <p:ext uri="{BB962C8B-B14F-4D97-AF65-F5344CB8AC3E}">
-        <p14:creationId xmlns:p14="http://schemas.microsoft.com/office/powerpoint/2010/main" val="4232120404"/>
-      </p:ext>
-    </p:extLst>
-  </p:cSld>
-  <p:clrMapOvr>
-    <a:masterClrMapping/>
-  </p:clrMapOvr>
-</p:sld>
-</file>
-
-<file path=ppt/slides/slide27.xml><?xml version="1.0" encoding="utf-8"?>
-<p:sld xmlns:a="http://schemas.openxmlformats.org/drawingml/2006/main" xmlns:r="http://schemas.openxmlformats.org/officeDocument/2006/relationships" xmlns:p="http://schemas.openxmlformats.org/presentationml/2006/main">
-  <p:cSld>
-    <p:spTree>
-      <p:nvGrpSpPr>
-        <p:cNvPr id="1" name=""/>
-        <p:cNvGrpSpPr/>
-        <p:nvPr/>
-      </p:nvGrpSpPr>
-      <p:grpSpPr>
-        <a:xfrm>
-          <a:off x="0" y="0"/>
-          <a:ext cx="0" cy="0"/>
-          <a:chOff x="0" y="0"/>
-          <a:chExt cx="0" cy="0"/>
-        </a:xfrm>
-      </p:grpSpPr>
-      <p:sp>
-        <p:nvSpPr>
-          <p:cNvPr id="2" name="Título 1">
-            <a:extLst>
-              <a:ext uri="{FF2B5EF4-FFF2-40B4-BE49-F238E27FC236}">
-                <a16:creationId xmlns:a16="http://schemas.microsoft.com/office/drawing/2014/main" id="{A05FBAE7-10CD-FE3A-CAE0-FCB5C3F35AF8}"/>
-              </a:ext>
-            </a:extLst>
-          </p:cNvPr>
-          <p:cNvSpPr>
-            <a:spLocks noGrp="1"/>
-          </p:cNvSpPr>
-          <p:nvPr>
-            <p:ph type="title"/>
-          </p:nvPr>
-        </p:nvSpPr>
-        <p:spPr/>
-        <p:txBody>
-          <a:bodyPr/>
-          <a:lstStyle/>
-          <a:p>
-            <a:r>
-              <a:rPr lang="es-ES" dirty="0"/>
-              <a:t>Gráficas de datos faltantes en proporción</a:t>
-            </a:r>
-            <a:endParaRPr lang="es-CO" dirty="0"/>
-          </a:p>
-        </p:txBody>
-      </p:sp>
-      <p:sp>
-        <p:nvSpPr>
-          <p:cNvPr id="3" name="Marcador de contenido 2">
-            <a:extLst>
-              <a:ext uri="{FF2B5EF4-FFF2-40B4-BE49-F238E27FC236}">
-                <a16:creationId xmlns:a16="http://schemas.microsoft.com/office/drawing/2014/main" id="{3678414F-E364-8B87-8661-D18AB1569415}"/>
-              </a:ext>
-            </a:extLst>
-          </p:cNvPr>
-          <p:cNvSpPr>
-            <a:spLocks noGrp="1"/>
-          </p:cNvSpPr>
-          <p:nvPr>
-            <p:ph idx="1"/>
-          </p:nvPr>
-        </p:nvSpPr>
-        <p:spPr>
-          <a:xfrm>
-            <a:off x="838200" y="1920510"/>
-            <a:ext cx="9648039" cy="1202801"/>
-          </a:xfrm>
-        </p:spPr>
-        <p:txBody>
-          <a:bodyPr>
-            <a:normAutofit/>
-          </a:bodyPr>
-          <a:lstStyle/>
-          <a:p>
-            <a:pPr marL="0" indent="0">
-              <a:buNone/>
-            </a:pPr>
-            <a:r>
-              <a:rPr lang="es-ES" sz="2000" dirty="0"/>
-              <a:t>Si no hay una variable dependiente bien definida, el investigador podría estar interesado en examinar si un caso es atípico en relación con el conjunto completo de datos (p. 49 de Aldás y Uriel).</a:t>
-            </a:r>
-            <a:endParaRPr lang="es-CO" sz="2000" dirty="0"/>
-          </a:p>
-        </p:txBody>
-      </p:sp>
-      <p:sp>
-        <p:nvSpPr>
-          <p:cNvPr id="4" name="Marcador de contenido 2">
-            <a:extLst>
-              <a:ext uri="{FF2B5EF4-FFF2-40B4-BE49-F238E27FC236}">
-                <a16:creationId xmlns:a16="http://schemas.microsoft.com/office/drawing/2014/main" id="{90E4CC4C-C3C7-2C01-BD95-BD6F7605669C}"/>
-              </a:ext>
-            </a:extLst>
-          </p:cNvPr>
-          <p:cNvSpPr txBox="1">
-            <a:spLocks/>
-          </p:cNvSpPr>
-          <p:nvPr/>
-        </p:nvSpPr>
-        <p:spPr>
-          <a:xfrm>
-            <a:off x="2323052" y="3353134"/>
-            <a:ext cx="6594446" cy="1400248"/>
-          </a:xfrm>
-          <a:prstGeom prst="rect">
-            <a:avLst/>
-          </a:prstGeom>
-        </p:spPr>
-        <p:txBody>
-          <a:bodyPr vert="horz" lIns="91440" tIns="45720" rIns="91440" bIns="45720" rtlCol="0">
-            <a:normAutofit/>
-          </a:bodyPr>
-          <a:lstStyle>
-            <a:lvl1pPr marL="228600" indent="-228600" algn="l" defTabSz="914400" rtl="0" eaLnBrk="1" latinLnBrk="0" hangingPunct="1">
-              <a:lnSpc>
-                <a:spcPct val="90000"/>
-              </a:lnSpc>
-              <a:spcBef>
-                <a:spcPts val="1000"/>
-              </a:spcBef>
-              <a:buFont typeface="Arial" panose="020B0604020202020204" pitchFamily="34" charset="0"/>
-              <a:buChar char="•"/>
-              <a:defRPr sz="2800" kern="1200">
-                <a:solidFill>
-                  <a:schemeClr val="tx1"/>
-                </a:solidFill>
-                <a:latin typeface="+mn-lt"/>
-                <a:ea typeface="+mn-ea"/>
-                <a:cs typeface="+mn-cs"/>
-              </a:defRPr>
-            </a:lvl1pPr>
-            <a:lvl2pPr marL="685800" indent="-228600" algn="l" defTabSz="914400" rtl="0" eaLnBrk="1" latinLnBrk="0" hangingPunct="1">
-              <a:lnSpc>
-                <a:spcPct val="90000"/>
-              </a:lnSpc>
-              <a:spcBef>
-                <a:spcPts val="500"/>
-              </a:spcBef>
-              <a:buFont typeface="Arial" panose="020B0604020202020204" pitchFamily="34" charset="0"/>
-              <a:buChar char="•"/>
-              <a:defRPr sz="2400" kern="1200">
-                <a:solidFill>
-                  <a:schemeClr val="tx1"/>
-                </a:solidFill>
-                <a:latin typeface="+mn-lt"/>
-                <a:ea typeface="+mn-ea"/>
-                <a:cs typeface="+mn-cs"/>
-              </a:defRPr>
-            </a:lvl2pPr>
-            <a:lvl3pPr marL="1143000" indent="-228600" algn="l" defTabSz="914400" rtl="0" eaLnBrk="1" latinLnBrk="0" hangingPunct="1">
-              <a:lnSpc>
-                <a:spcPct val="90000"/>
-              </a:lnSpc>
-              <a:spcBef>
-                <a:spcPts val="500"/>
-              </a:spcBef>
-              <a:buFont typeface="Arial" panose="020B0604020202020204" pitchFamily="34" charset="0"/>
-              <a:buChar char="•"/>
-              <a:defRPr sz="2000" kern="1200">
-                <a:solidFill>
-                  <a:schemeClr val="tx1"/>
-                </a:solidFill>
-                <a:latin typeface="+mn-lt"/>
-                <a:ea typeface="+mn-ea"/>
-                <a:cs typeface="+mn-cs"/>
-              </a:defRPr>
-            </a:lvl3pPr>
-            <a:lvl4pPr marL="1600200" indent="-228600" algn="l" defTabSz="914400" rtl="0" eaLnBrk="1" latinLnBrk="0" hangingPunct="1">
-              <a:lnSpc>
-                <a:spcPct val="90000"/>
-              </a:lnSpc>
-              <a:spcBef>
-                <a:spcPts val="500"/>
-              </a:spcBef>
-              <a:buFont typeface="Arial" panose="020B0604020202020204" pitchFamily="34" charset="0"/>
-              <a:buChar char="•"/>
-              <a:defRPr sz="1800" kern="1200">
-                <a:solidFill>
-                  <a:schemeClr val="tx1"/>
-                </a:solidFill>
-                <a:latin typeface="+mn-lt"/>
-                <a:ea typeface="+mn-ea"/>
-                <a:cs typeface="+mn-cs"/>
-              </a:defRPr>
-            </a:lvl4pPr>
-            <a:lvl5pPr marL="2057400" indent="-228600" algn="l" defTabSz="914400" rtl="0" eaLnBrk="1" latinLnBrk="0" hangingPunct="1">
-              <a:lnSpc>
-                <a:spcPct val="90000"/>
-              </a:lnSpc>
-              <a:spcBef>
-                <a:spcPts val="500"/>
-              </a:spcBef>
-              <a:buFont typeface="Arial" panose="020B0604020202020204" pitchFamily="34" charset="0"/>
-              <a:buChar char="•"/>
-              <a:defRPr sz="1800" kern="1200">
-                <a:solidFill>
-                  <a:schemeClr val="tx1"/>
-                </a:solidFill>
-                <a:latin typeface="+mn-lt"/>
-                <a:ea typeface="+mn-ea"/>
-                <a:cs typeface="+mn-cs"/>
-              </a:defRPr>
-            </a:lvl5pPr>
-            <a:lvl6pPr marL="2514600" indent="-228600" algn="l" defTabSz="914400" rtl="0" eaLnBrk="1" latinLnBrk="0" hangingPunct="1">
-              <a:lnSpc>
-                <a:spcPct val="90000"/>
-              </a:lnSpc>
-              <a:spcBef>
-                <a:spcPts val="500"/>
-              </a:spcBef>
-              <a:buFont typeface="Arial" panose="020B0604020202020204" pitchFamily="34" charset="0"/>
-              <a:buChar char="•"/>
-              <a:defRPr sz="1800" kern="1200">
-                <a:solidFill>
-                  <a:schemeClr val="tx1"/>
-                </a:solidFill>
-                <a:latin typeface="+mn-lt"/>
-                <a:ea typeface="+mn-ea"/>
-                <a:cs typeface="+mn-cs"/>
-              </a:defRPr>
-            </a:lvl6pPr>
-            <a:lvl7pPr marL="2971800" indent="-228600" algn="l" defTabSz="914400" rtl="0" eaLnBrk="1" latinLnBrk="0" hangingPunct="1">
-              <a:lnSpc>
-                <a:spcPct val="90000"/>
-              </a:lnSpc>
-              <a:spcBef>
-                <a:spcPts val="500"/>
-              </a:spcBef>
-              <a:buFont typeface="Arial" panose="020B0604020202020204" pitchFamily="34" charset="0"/>
-              <a:buChar char="•"/>
-              <a:defRPr sz="1800" kern="1200">
-                <a:solidFill>
-                  <a:schemeClr val="tx1"/>
-                </a:solidFill>
-                <a:latin typeface="+mn-lt"/>
-                <a:ea typeface="+mn-ea"/>
-                <a:cs typeface="+mn-cs"/>
-              </a:defRPr>
-            </a:lvl7pPr>
-            <a:lvl8pPr marL="3429000" indent="-228600" algn="l" defTabSz="914400" rtl="0" eaLnBrk="1" latinLnBrk="0" hangingPunct="1">
-              <a:lnSpc>
-                <a:spcPct val="90000"/>
-              </a:lnSpc>
-              <a:spcBef>
-                <a:spcPts val="500"/>
-              </a:spcBef>
-              <a:buFont typeface="Arial" panose="020B0604020202020204" pitchFamily="34" charset="0"/>
-              <a:buChar char="•"/>
-              <a:defRPr sz="1800" kern="1200">
-                <a:solidFill>
-                  <a:schemeClr val="tx1"/>
-                </a:solidFill>
-                <a:latin typeface="+mn-lt"/>
-                <a:ea typeface="+mn-ea"/>
-                <a:cs typeface="+mn-cs"/>
-              </a:defRPr>
-            </a:lvl8pPr>
-            <a:lvl9pPr marL="3886200" indent="-228600" algn="l" defTabSz="914400" rtl="0" eaLnBrk="1" latinLnBrk="0" hangingPunct="1">
-              <a:lnSpc>
-                <a:spcPct val="90000"/>
-              </a:lnSpc>
-              <a:spcBef>
-                <a:spcPts val="500"/>
-              </a:spcBef>
-              <a:buFont typeface="Arial" panose="020B0604020202020204" pitchFamily="34" charset="0"/>
-              <a:buChar char="•"/>
-              <a:defRPr sz="1800" kern="1200">
-                <a:solidFill>
-                  <a:schemeClr val="tx1"/>
-                </a:solidFill>
-                <a:latin typeface="+mn-lt"/>
-                <a:ea typeface="+mn-ea"/>
-                <a:cs typeface="+mn-cs"/>
-              </a:defRPr>
-            </a:lvl9pPr>
-          </a:lstStyle>
-          <a:p>
-            <a:r>
-              <a:rPr lang="es-ES" sz="2000" dirty="0"/>
-              <a:t>Ajustar una regresión lineal simple</a:t>
-            </a:r>
-          </a:p>
-          <a:p>
-            <a:r>
-              <a:rPr lang="es-ES" sz="2000" dirty="0"/>
-              <a:t>Examinar los casos que están por fuera de las bandas de un intervalo de predicción individual (95%)</a:t>
-            </a:r>
-          </a:p>
-          <a:p>
-            <a:endParaRPr lang="es-CO" sz="2000" dirty="0"/>
-          </a:p>
-        </p:txBody>
-      </p:sp>
-    </p:spTree>
-    <p:extLst>
-      <p:ext uri="{BB962C8B-B14F-4D97-AF65-F5344CB8AC3E}">
-        <p14:creationId xmlns:p14="http://schemas.microsoft.com/office/powerpoint/2010/main" val="1660012433"/>
-      </p:ext>
-    </p:extLst>
-  </p:cSld>
-  <p:clrMapOvr>
-    <a:masterClrMapping/>
-  </p:clrMapOvr>
-</p:sld>
-</file>
-
-<file path=ppt/slides/slide28.xml><?xml version="1.0" encoding="utf-8"?>
-<p:sld xmlns:a="http://schemas.openxmlformats.org/drawingml/2006/main" xmlns:r="http://schemas.openxmlformats.org/officeDocument/2006/relationships" xmlns:p="http://schemas.openxmlformats.org/presentationml/2006/main">
-  <p:cSld>
-    <p:spTree>
-      <p:nvGrpSpPr>
-        <p:cNvPr id="1" name=""/>
-        <p:cNvGrpSpPr/>
-        <p:nvPr/>
-      </p:nvGrpSpPr>
-      <p:grpSpPr>
-        <a:xfrm>
-          <a:off x="0" y="0"/>
-          <a:ext cx="0" cy="0"/>
-          <a:chOff x="0" y="0"/>
-          <a:chExt cx="0" cy="0"/>
-        </a:xfrm>
-      </p:grpSpPr>
-      <p:sp>
-        <p:nvSpPr>
-          <p:cNvPr id="2" name="Título 1">
-            <a:extLst>
-              <a:ext uri="{FF2B5EF4-FFF2-40B4-BE49-F238E27FC236}">
-                <a16:creationId xmlns:a16="http://schemas.microsoft.com/office/drawing/2014/main" id="{A05FBAE7-10CD-FE3A-CAE0-FCB5C3F35AF8}"/>
-              </a:ext>
-            </a:extLst>
-          </p:cNvPr>
-          <p:cNvSpPr>
-            <a:spLocks noGrp="1"/>
-          </p:cNvSpPr>
-          <p:nvPr>
-            <p:ph type="title"/>
-          </p:nvPr>
-        </p:nvSpPr>
-        <p:spPr/>
-        <p:txBody>
-          <a:bodyPr/>
-          <a:lstStyle/>
-          <a:p>
-            <a:r>
-              <a:rPr lang="es-ES" dirty="0"/>
-              <a:t>Gráficas de datos faltantes en filas</a:t>
-            </a:r>
-            <a:endParaRPr lang="es-CO" dirty="0"/>
-          </a:p>
-        </p:txBody>
-      </p:sp>
-      <p:sp>
-        <p:nvSpPr>
-          <p:cNvPr id="3" name="Marcador de contenido 2">
-            <a:extLst>
-              <a:ext uri="{FF2B5EF4-FFF2-40B4-BE49-F238E27FC236}">
-                <a16:creationId xmlns:a16="http://schemas.microsoft.com/office/drawing/2014/main" id="{3678414F-E364-8B87-8661-D18AB1569415}"/>
-              </a:ext>
-            </a:extLst>
-          </p:cNvPr>
-          <p:cNvSpPr>
-            <a:spLocks noGrp="1"/>
-          </p:cNvSpPr>
-          <p:nvPr>
-            <p:ph idx="1"/>
-          </p:nvPr>
-        </p:nvSpPr>
-        <p:spPr>
-          <a:xfrm>
-            <a:off x="838200" y="1920510"/>
-            <a:ext cx="9648039" cy="1202801"/>
-          </a:xfrm>
-        </p:spPr>
-        <p:txBody>
-          <a:bodyPr>
-            <a:normAutofit/>
-          </a:bodyPr>
-          <a:lstStyle/>
-          <a:p>
-            <a:pPr marL="0" indent="0">
-              <a:buNone/>
-            </a:pPr>
-            <a:r>
-              <a:rPr lang="es-ES" sz="2000" dirty="0"/>
-              <a:t>Si no hay una variable dependiente bien definida, el investigador podría estar interesado en examinar si un caso es atípico en relación con el conjunto completo de datos (p. 49 de Aldás y Uriel).</a:t>
-            </a:r>
-            <a:endParaRPr lang="es-CO" sz="2000" dirty="0"/>
-          </a:p>
-        </p:txBody>
-      </p:sp>
-      <p:sp>
-        <p:nvSpPr>
-          <p:cNvPr id="4" name="Marcador de contenido 2">
-            <a:extLst>
-              <a:ext uri="{FF2B5EF4-FFF2-40B4-BE49-F238E27FC236}">
-                <a16:creationId xmlns:a16="http://schemas.microsoft.com/office/drawing/2014/main" id="{90E4CC4C-C3C7-2C01-BD95-BD6F7605669C}"/>
-              </a:ext>
-            </a:extLst>
-          </p:cNvPr>
-          <p:cNvSpPr txBox="1">
-            <a:spLocks/>
-          </p:cNvSpPr>
-          <p:nvPr/>
-        </p:nvSpPr>
-        <p:spPr>
-          <a:xfrm>
-            <a:off x="2323052" y="3353134"/>
-            <a:ext cx="6594446" cy="1400248"/>
-          </a:xfrm>
-          <a:prstGeom prst="rect">
-            <a:avLst/>
-          </a:prstGeom>
-        </p:spPr>
-        <p:txBody>
-          <a:bodyPr vert="horz" lIns="91440" tIns="45720" rIns="91440" bIns="45720" rtlCol="0">
-            <a:normAutofit/>
-          </a:bodyPr>
-          <a:lstStyle>
-            <a:lvl1pPr marL="228600" indent="-228600" algn="l" defTabSz="914400" rtl="0" eaLnBrk="1" latinLnBrk="0" hangingPunct="1">
-              <a:lnSpc>
-                <a:spcPct val="90000"/>
-              </a:lnSpc>
-              <a:spcBef>
-                <a:spcPts val="1000"/>
-              </a:spcBef>
-              <a:buFont typeface="Arial" panose="020B0604020202020204" pitchFamily="34" charset="0"/>
-              <a:buChar char="•"/>
-              <a:defRPr sz="2800" kern="1200">
-                <a:solidFill>
-                  <a:schemeClr val="tx1"/>
-                </a:solidFill>
-                <a:latin typeface="+mn-lt"/>
-                <a:ea typeface="+mn-ea"/>
-                <a:cs typeface="+mn-cs"/>
-              </a:defRPr>
-            </a:lvl1pPr>
-            <a:lvl2pPr marL="685800" indent="-228600" algn="l" defTabSz="914400" rtl="0" eaLnBrk="1" latinLnBrk="0" hangingPunct="1">
-              <a:lnSpc>
-                <a:spcPct val="90000"/>
-              </a:lnSpc>
-              <a:spcBef>
-                <a:spcPts val="500"/>
-              </a:spcBef>
-              <a:buFont typeface="Arial" panose="020B0604020202020204" pitchFamily="34" charset="0"/>
-              <a:buChar char="•"/>
-              <a:defRPr sz="2400" kern="1200">
-                <a:solidFill>
-                  <a:schemeClr val="tx1"/>
-                </a:solidFill>
-                <a:latin typeface="+mn-lt"/>
-                <a:ea typeface="+mn-ea"/>
-                <a:cs typeface="+mn-cs"/>
-              </a:defRPr>
-            </a:lvl2pPr>
-            <a:lvl3pPr marL="1143000" indent="-228600" algn="l" defTabSz="914400" rtl="0" eaLnBrk="1" latinLnBrk="0" hangingPunct="1">
-              <a:lnSpc>
-                <a:spcPct val="90000"/>
-              </a:lnSpc>
-              <a:spcBef>
-                <a:spcPts val="500"/>
-              </a:spcBef>
-              <a:buFont typeface="Arial" panose="020B0604020202020204" pitchFamily="34" charset="0"/>
-              <a:buChar char="•"/>
-              <a:defRPr sz="2000" kern="1200">
-                <a:solidFill>
-                  <a:schemeClr val="tx1"/>
-                </a:solidFill>
-                <a:latin typeface="+mn-lt"/>
-                <a:ea typeface="+mn-ea"/>
-                <a:cs typeface="+mn-cs"/>
-              </a:defRPr>
-            </a:lvl3pPr>
-            <a:lvl4pPr marL="1600200" indent="-228600" algn="l" defTabSz="914400" rtl="0" eaLnBrk="1" latinLnBrk="0" hangingPunct="1">
-              <a:lnSpc>
-                <a:spcPct val="90000"/>
-              </a:lnSpc>
-              <a:spcBef>
-                <a:spcPts val="500"/>
-              </a:spcBef>
-              <a:buFont typeface="Arial" panose="020B0604020202020204" pitchFamily="34" charset="0"/>
-              <a:buChar char="•"/>
-              <a:defRPr sz="1800" kern="1200">
-                <a:solidFill>
-                  <a:schemeClr val="tx1"/>
-                </a:solidFill>
-                <a:latin typeface="+mn-lt"/>
-                <a:ea typeface="+mn-ea"/>
-                <a:cs typeface="+mn-cs"/>
-              </a:defRPr>
-            </a:lvl4pPr>
-            <a:lvl5pPr marL="2057400" indent="-228600" algn="l" defTabSz="914400" rtl="0" eaLnBrk="1" latinLnBrk="0" hangingPunct="1">
-              <a:lnSpc>
-                <a:spcPct val="90000"/>
-              </a:lnSpc>
-              <a:spcBef>
-                <a:spcPts val="500"/>
-              </a:spcBef>
-              <a:buFont typeface="Arial" panose="020B0604020202020204" pitchFamily="34" charset="0"/>
-              <a:buChar char="•"/>
-              <a:defRPr sz="1800" kern="1200">
-                <a:solidFill>
-                  <a:schemeClr val="tx1"/>
-                </a:solidFill>
-                <a:latin typeface="+mn-lt"/>
-                <a:ea typeface="+mn-ea"/>
-                <a:cs typeface="+mn-cs"/>
-              </a:defRPr>
-            </a:lvl5pPr>
-            <a:lvl6pPr marL="2514600" indent="-228600" algn="l" defTabSz="914400" rtl="0" eaLnBrk="1" latinLnBrk="0" hangingPunct="1">
-              <a:lnSpc>
-                <a:spcPct val="90000"/>
-              </a:lnSpc>
-              <a:spcBef>
-                <a:spcPts val="500"/>
-              </a:spcBef>
-              <a:buFont typeface="Arial" panose="020B0604020202020204" pitchFamily="34" charset="0"/>
-              <a:buChar char="•"/>
-              <a:defRPr sz="1800" kern="1200">
-                <a:solidFill>
-                  <a:schemeClr val="tx1"/>
-                </a:solidFill>
-                <a:latin typeface="+mn-lt"/>
-                <a:ea typeface="+mn-ea"/>
-                <a:cs typeface="+mn-cs"/>
-              </a:defRPr>
-            </a:lvl6pPr>
-            <a:lvl7pPr marL="2971800" indent="-228600" algn="l" defTabSz="914400" rtl="0" eaLnBrk="1" latinLnBrk="0" hangingPunct="1">
-              <a:lnSpc>
-                <a:spcPct val="90000"/>
-              </a:lnSpc>
-              <a:spcBef>
-                <a:spcPts val="500"/>
-              </a:spcBef>
-              <a:buFont typeface="Arial" panose="020B0604020202020204" pitchFamily="34" charset="0"/>
-              <a:buChar char="•"/>
-              <a:defRPr sz="1800" kern="1200">
-                <a:solidFill>
-                  <a:schemeClr val="tx1"/>
-                </a:solidFill>
-                <a:latin typeface="+mn-lt"/>
-                <a:ea typeface="+mn-ea"/>
-                <a:cs typeface="+mn-cs"/>
-              </a:defRPr>
-            </a:lvl7pPr>
-            <a:lvl8pPr marL="3429000" indent="-228600" algn="l" defTabSz="914400" rtl="0" eaLnBrk="1" latinLnBrk="0" hangingPunct="1">
-              <a:lnSpc>
-                <a:spcPct val="90000"/>
-              </a:lnSpc>
-              <a:spcBef>
-                <a:spcPts val="500"/>
-              </a:spcBef>
-              <a:buFont typeface="Arial" panose="020B0604020202020204" pitchFamily="34" charset="0"/>
-              <a:buChar char="•"/>
-              <a:defRPr sz="1800" kern="1200">
-                <a:solidFill>
-                  <a:schemeClr val="tx1"/>
-                </a:solidFill>
-                <a:latin typeface="+mn-lt"/>
-                <a:ea typeface="+mn-ea"/>
-                <a:cs typeface="+mn-cs"/>
-              </a:defRPr>
-            </a:lvl8pPr>
-            <a:lvl9pPr marL="3886200" indent="-228600" algn="l" defTabSz="914400" rtl="0" eaLnBrk="1" latinLnBrk="0" hangingPunct="1">
-              <a:lnSpc>
-                <a:spcPct val="90000"/>
-              </a:lnSpc>
-              <a:spcBef>
-                <a:spcPts val="500"/>
-              </a:spcBef>
-              <a:buFont typeface="Arial" panose="020B0604020202020204" pitchFamily="34" charset="0"/>
-              <a:buChar char="•"/>
-              <a:defRPr sz="1800" kern="1200">
-                <a:solidFill>
-                  <a:schemeClr val="tx1"/>
-                </a:solidFill>
-                <a:latin typeface="+mn-lt"/>
-                <a:ea typeface="+mn-ea"/>
-                <a:cs typeface="+mn-cs"/>
-              </a:defRPr>
-            </a:lvl9pPr>
-          </a:lstStyle>
-          <a:p>
-            <a:r>
-              <a:rPr lang="es-ES" sz="2000" dirty="0"/>
-              <a:t>Ajustar una regresión lineal simple</a:t>
-            </a:r>
-          </a:p>
-          <a:p>
-            <a:r>
-              <a:rPr lang="es-ES" sz="2000" dirty="0"/>
-              <a:t>Examinar los casos que están por fuera de las bandas de un intervalo de predicción individual (95%)</a:t>
-            </a:r>
-          </a:p>
-          <a:p>
-            <a:endParaRPr lang="es-CO" sz="2000" dirty="0"/>
-          </a:p>
-        </p:txBody>
-      </p:sp>
-    </p:spTree>
-    <p:extLst>
-      <p:ext uri="{BB962C8B-B14F-4D97-AF65-F5344CB8AC3E}">
-        <p14:creationId xmlns:p14="http://schemas.microsoft.com/office/powerpoint/2010/main" val="336019372"/>
-      </p:ext>
-    </p:extLst>
-  </p:cSld>
-  <p:clrMapOvr>
-    <a:masterClrMapping/>
-  </p:clrMapOvr>
-</p:sld>
-</file>
-
-<file path=ppt/slides/slide29.xml><?xml version="1.0" encoding="utf-8"?>
-<p:sld xmlns:a="http://schemas.openxmlformats.org/drawingml/2006/main" xmlns:r="http://schemas.openxmlformats.org/officeDocument/2006/relationships" xmlns:p="http://schemas.openxmlformats.org/presentationml/2006/main">
-  <p:cSld>
-    <p:spTree>
-      <p:nvGrpSpPr>
-        <p:cNvPr id="1" name=""/>
-        <p:cNvGrpSpPr/>
-        <p:nvPr/>
-      </p:nvGrpSpPr>
-      <p:grpSpPr>
-        <a:xfrm>
-          <a:off x="0" y="0"/>
-          <a:ext cx="0" cy="0"/>
-          <a:chOff x="0" y="0"/>
-          <a:chExt cx="0" cy="0"/>
-        </a:xfrm>
-      </p:grpSpPr>
-      <p:sp>
-        <p:nvSpPr>
-          <p:cNvPr id="2" name="Título 1">
-            <a:extLst>
-              <a:ext uri="{FF2B5EF4-FFF2-40B4-BE49-F238E27FC236}">
-                <a16:creationId xmlns:a16="http://schemas.microsoft.com/office/drawing/2014/main" id="{6A97BA76-486F-CB55-C28E-847CB6E676D6}"/>
-              </a:ext>
-            </a:extLst>
-          </p:cNvPr>
-          <p:cNvSpPr>
-            <a:spLocks noGrp="1"/>
-          </p:cNvSpPr>
-          <p:nvPr>
-            <p:ph type="title"/>
-          </p:nvPr>
-        </p:nvSpPr>
-        <p:spPr>
-          <a:xfrm>
-            <a:off x="4228052" y="3800213"/>
-            <a:ext cx="7589940" cy="2571532"/>
-          </a:xfrm>
-        </p:spPr>
-        <p:txBody>
-          <a:bodyPr>
-            <a:normAutofit/>
-          </a:bodyPr>
-          <a:lstStyle/>
-          <a:p>
-            <a:r>
-              <a:rPr lang="es-ES" dirty="0"/>
-              <a:t>Imputación múltiple:</a:t>
-            </a:r>
-            <a:br>
-              <a:rPr lang="es-ES" dirty="0"/>
-            </a:br>
-            <a:r>
-              <a:rPr lang="es-ES" dirty="0"/>
-              <a:t>Aplicación de las leyes de </a:t>
-            </a:r>
-            <a:r>
-              <a:rPr lang="es-ES" dirty="0" err="1"/>
-              <a:t>Rubin</a:t>
-            </a:r>
-            <a:endParaRPr lang="es-CO" dirty="0"/>
-          </a:p>
-        </p:txBody>
-      </p:sp>
-    </p:spTree>
-    <p:extLst>
-      <p:ext uri="{BB962C8B-B14F-4D97-AF65-F5344CB8AC3E}">
-        <p14:creationId xmlns:p14="http://schemas.microsoft.com/office/powerpoint/2010/main" val="1877949141"/>
-      </p:ext>
-    </p:extLst>
-  </p:cSld>
-  <p:clrMapOvr>
-    <a:masterClrMapping/>
-  </p:clrMapOvr>
-</p:sld>
-</file>
-
-<file path=ppt/slides/slide3.xml><?xml version="1.0" encoding="utf-8"?>
-<p:sld xmlns:a="http://schemas.openxmlformats.org/drawingml/2006/main" xmlns:r="http://schemas.openxmlformats.org/officeDocument/2006/relationships" xmlns:p="http://schemas.openxmlformats.org/presentationml/2006/main">
-  <p:cSld>
-    <p:spTree>
-      <p:nvGrpSpPr>
-        <p:cNvPr id="1" name=""/>
-        <p:cNvGrpSpPr/>
-        <p:nvPr/>
-      </p:nvGrpSpPr>
-      <p:grpSpPr>
-        <a:xfrm>
-          <a:off x="0" y="0"/>
-          <a:ext cx="0" cy="0"/>
-          <a:chOff x="0" y="0"/>
-          <a:chExt cx="0" cy="0"/>
-        </a:xfrm>
-      </p:grpSpPr>
-      <p:sp>
-        <p:nvSpPr>
-          <p:cNvPr id="2" name="Título 1">
-            <a:extLst>
-              <a:ext uri="{FF2B5EF4-FFF2-40B4-BE49-F238E27FC236}">
-                <a16:creationId xmlns:a16="http://schemas.microsoft.com/office/drawing/2014/main" id="{6A97BA76-486F-CB55-C28E-847CB6E676D6}"/>
-              </a:ext>
-            </a:extLst>
-          </p:cNvPr>
-          <p:cNvSpPr>
-            <a:spLocks noGrp="1"/>
-          </p:cNvSpPr>
-          <p:nvPr>
-            <p:ph type="title"/>
-          </p:nvPr>
-        </p:nvSpPr>
-        <p:spPr>
-          <a:xfrm>
-            <a:off x="6096000" y="5046181"/>
-            <a:ext cx="5721991" cy="1325563"/>
-          </a:xfrm>
-        </p:spPr>
-        <p:txBody>
-          <a:bodyPr>
-            <a:normAutofit/>
-          </a:bodyPr>
-          <a:lstStyle/>
-          <a:p>
-            <a:r>
-              <a:rPr lang="es-ES" dirty="0"/>
-              <a:t>Análisis de variables categóricas</a:t>
-            </a:r>
-            <a:endParaRPr lang="es-CO" dirty="0"/>
-          </a:p>
-        </p:txBody>
-      </p:sp>
-    </p:spTree>
-    <p:extLst>
-      <p:ext uri="{BB962C8B-B14F-4D97-AF65-F5344CB8AC3E}">
-        <p14:creationId xmlns:p14="http://schemas.microsoft.com/office/powerpoint/2010/main" val="1404860635"/>
-      </p:ext>
-    </p:extLst>
-  </p:cSld>
-  <p:clrMapOvr>
-    <a:masterClrMapping/>
-  </p:clrMapOvr>
-</p:sld>
-</file>
-
-<file path=ppt/slides/slide30.xml><?xml version="1.0" encoding="utf-8"?>
-<p:sld xmlns:a="http://schemas.openxmlformats.org/drawingml/2006/main" xmlns:r="http://schemas.openxmlformats.org/officeDocument/2006/relationships" xmlns:p="http://schemas.openxmlformats.org/presentationml/2006/main">
-  <p:cSld>
-    <p:spTree>
-      <p:nvGrpSpPr>
-        <p:cNvPr id="1" name=""/>
-        <p:cNvGrpSpPr/>
-        <p:nvPr/>
-      </p:nvGrpSpPr>
-      <p:grpSpPr>
-        <a:xfrm>
-          <a:off x="0" y="0"/>
-          <a:ext cx="0" cy="0"/>
-          <a:chOff x="0" y="0"/>
-          <a:chExt cx="0" cy="0"/>
-        </a:xfrm>
-      </p:grpSpPr>
-      <p:sp>
-        <p:nvSpPr>
-          <p:cNvPr id="2" name="Título 1">
-            <a:extLst>
-              <a:ext uri="{FF2B5EF4-FFF2-40B4-BE49-F238E27FC236}">
-                <a16:creationId xmlns:a16="http://schemas.microsoft.com/office/drawing/2014/main" id="{A05FBAE7-10CD-FE3A-CAE0-FCB5C3F35AF8}"/>
-              </a:ext>
-            </a:extLst>
-          </p:cNvPr>
-          <p:cNvSpPr>
-            <a:spLocks noGrp="1"/>
-          </p:cNvSpPr>
-          <p:nvPr>
-            <p:ph type="title"/>
-          </p:nvPr>
-        </p:nvSpPr>
-        <p:spPr/>
-        <p:txBody>
-          <a:bodyPr/>
-          <a:lstStyle/>
-          <a:p>
-            <a:r>
-              <a:rPr lang="es-ES" dirty="0"/>
-              <a:t>Imputación</a:t>
-            </a:r>
-            <a:endParaRPr lang="es-CO" dirty="0"/>
-          </a:p>
-        </p:txBody>
-      </p:sp>
-      <p:sp>
-        <p:nvSpPr>
-          <p:cNvPr id="3" name="Marcador de contenido 2">
-            <a:extLst>
-              <a:ext uri="{FF2B5EF4-FFF2-40B4-BE49-F238E27FC236}">
-                <a16:creationId xmlns:a16="http://schemas.microsoft.com/office/drawing/2014/main" id="{3678414F-E364-8B87-8661-D18AB1569415}"/>
-              </a:ext>
-            </a:extLst>
-          </p:cNvPr>
-          <p:cNvSpPr>
-            <a:spLocks noGrp="1"/>
-          </p:cNvSpPr>
-          <p:nvPr>
-            <p:ph idx="1"/>
-          </p:nvPr>
-        </p:nvSpPr>
-        <p:spPr>
-          <a:xfrm>
-            <a:off x="838200" y="1920510"/>
-            <a:ext cx="9648039" cy="1202801"/>
-          </a:xfrm>
-        </p:spPr>
-        <p:txBody>
-          <a:bodyPr>
-            <a:normAutofit/>
-          </a:bodyPr>
-          <a:lstStyle/>
-          <a:p>
-            <a:pPr marL="0" indent="0">
-              <a:buNone/>
-            </a:pPr>
-            <a:r>
-              <a:rPr lang="es-ES" sz="2000" dirty="0"/>
-              <a:t>Si no hay una variable dependiente bien definida, el investigador podría estar interesado en examinar si un caso es atípico en relación con el conjunto completo de datos (p. 49 de Aldás y Uriel).</a:t>
-            </a:r>
-            <a:endParaRPr lang="es-CO" sz="2000" dirty="0"/>
-          </a:p>
-        </p:txBody>
-      </p:sp>
-      <p:sp>
-        <p:nvSpPr>
-          <p:cNvPr id="4" name="Marcador de contenido 2">
-            <a:extLst>
-              <a:ext uri="{FF2B5EF4-FFF2-40B4-BE49-F238E27FC236}">
-                <a16:creationId xmlns:a16="http://schemas.microsoft.com/office/drawing/2014/main" id="{90E4CC4C-C3C7-2C01-BD95-BD6F7605669C}"/>
-              </a:ext>
-            </a:extLst>
-          </p:cNvPr>
-          <p:cNvSpPr txBox="1">
-            <a:spLocks/>
-          </p:cNvSpPr>
-          <p:nvPr/>
-        </p:nvSpPr>
-        <p:spPr>
-          <a:xfrm>
-            <a:off x="2323052" y="3353134"/>
-            <a:ext cx="6594446" cy="1400248"/>
-          </a:xfrm>
-          <a:prstGeom prst="rect">
-            <a:avLst/>
-          </a:prstGeom>
-        </p:spPr>
-        <p:txBody>
-          <a:bodyPr vert="horz" lIns="91440" tIns="45720" rIns="91440" bIns="45720" rtlCol="0">
-            <a:normAutofit/>
-          </a:bodyPr>
-          <a:lstStyle>
-            <a:lvl1pPr marL="228600" indent="-228600" algn="l" defTabSz="914400" rtl="0" eaLnBrk="1" latinLnBrk="0" hangingPunct="1">
-              <a:lnSpc>
-                <a:spcPct val="90000"/>
-              </a:lnSpc>
-              <a:spcBef>
-                <a:spcPts val="1000"/>
-              </a:spcBef>
-              <a:buFont typeface="Arial" panose="020B0604020202020204" pitchFamily="34" charset="0"/>
-              <a:buChar char="•"/>
-              <a:defRPr sz="2800" kern="1200">
-                <a:solidFill>
-                  <a:schemeClr val="tx1"/>
-                </a:solidFill>
-                <a:latin typeface="+mn-lt"/>
-                <a:ea typeface="+mn-ea"/>
-                <a:cs typeface="+mn-cs"/>
-              </a:defRPr>
-            </a:lvl1pPr>
-            <a:lvl2pPr marL="685800" indent="-228600" algn="l" defTabSz="914400" rtl="0" eaLnBrk="1" latinLnBrk="0" hangingPunct="1">
-              <a:lnSpc>
-                <a:spcPct val="90000"/>
-              </a:lnSpc>
-              <a:spcBef>
-                <a:spcPts val="500"/>
-              </a:spcBef>
-              <a:buFont typeface="Arial" panose="020B0604020202020204" pitchFamily="34" charset="0"/>
-              <a:buChar char="•"/>
-              <a:defRPr sz="2400" kern="1200">
-                <a:solidFill>
-                  <a:schemeClr val="tx1"/>
-                </a:solidFill>
-                <a:latin typeface="+mn-lt"/>
-                <a:ea typeface="+mn-ea"/>
-                <a:cs typeface="+mn-cs"/>
-              </a:defRPr>
-            </a:lvl2pPr>
-            <a:lvl3pPr marL="1143000" indent="-228600" algn="l" defTabSz="914400" rtl="0" eaLnBrk="1" latinLnBrk="0" hangingPunct="1">
-              <a:lnSpc>
-                <a:spcPct val="90000"/>
-              </a:lnSpc>
-              <a:spcBef>
-                <a:spcPts val="500"/>
-              </a:spcBef>
-              <a:buFont typeface="Arial" panose="020B0604020202020204" pitchFamily="34" charset="0"/>
-              <a:buChar char="•"/>
-              <a:defRPr sz="2000" kern="1200">
-                <a:solidFill>
-                  <a:schemeClr val="tx1"/>
-                </a:solidFill>
-                <a:latin typeface="+mn-lt"/>
-                <a:ea typeface="+mn-ea"/>
-                <a:cs typeface="+mn-cs"/>
-              </a:defRPr>
-            </a:lvl3pPr>
-            <a:lvl4pPr marL="1600200" indent="-228600" algn="l" defTabSz="914400" rtl="0" eaLnBrk="1" latinLnBrk="0" hangingPunct="1">
-              <a:lnSpc>
-                <a:spcPct val="90000"/>
-              </a:lnSpc>
-              <a:spcBef>
-                <a:spcPts val="500"/>
-              </a:spcBef>
-              <a:buFont typeface="Arial" panose="020B0604020202020204" pitchFamily="34" charset="0"/>
-              <a:buChar char="•"/>
-              <a:defRPr sz="1800" kern="1200">
-                <a:solidFill>
-                  <a:schemeClr val="tx1"/>
-                </a:solidFill>
-                <a:latin typeface="+mn-lt"/>
-                <a:ea typeface="+mn-ea"/>
-                <a:cs typeface="+mn-cs"/>
-              </a:defRPr>
-            </a:lvl4pPr>
-            <a:lvl5pPr marL="2057400" indent="-228600" algn="l" defTabSz="914400" rtl="0" eaLnBrk="1" latinLnBrk="0" hangingPunct="1">
-              <a:lnSpc>
-                <a:spcPct val="90000"/>
-              </a:lnSpc>
-              <a:spcBef>
-                <a:spcPts val="500"/>
-              </a:spcBef>
-              <a:buFont typeface="Arial" panose="020B0604020202020204" pitchFamily="34" charset="0"/>
-              <a:buChar char="•"/>
-              <a:defRPr sz="1800" kern="1200">
-                <a:solidFill>
-                  <a:schemeClr val="tx1"/>
-                </a:solidFill>
-                <a:latin typeface="+mn-lt"/>
-                <a:ea typeface="+mn-ea"/>
-                <a:cs typeface="+mn-cs"/>
-              </a:defRPr>
-            </a:lvl5pPr>
-            <a:lvl6pPr marL="2514600" indent="-228600" algn="l" defTabSz="914400" rtl="0" eaLnBrk="1" latinLnBrk="0" hangingPunct="1">
-              <a:lnSpc>
-                <a:spcPct val="90000"/>
-              </a:lnSpc>
-              <a:spcBef>
-                <a:spcPts val="500"/>
-              </a:spcBef>
-              <a:buFont typeface="Arial" panose="020B0604020202020204" pitchFamily="34" charset="0"/>
-              <a:buChar char="•"/>
-              <a:defRPr sz="1800" kern="1200">
-                <a:solidFill>
-                  <a:schemeClr val="tx1"/>
-                </a:solidFill>
-                <a:latin typeface="+mn-lt"/>
-                <a:ea typeface="+mn-ea"/>
-                <a:cs typeface="+mn-cs"/>
-              </a:defRPr>
-            </a:lvl6pPr>
-            <a:lvl7pPr marL="2971800" indent="-228600" algn="l" defTabSz="914400" rtl="0" eaLnBrk="1" latinLnBrk="0" hangingPunct="1">
-              <a:lnSpc>
-                <a:spcPct val="90000"/>
-              </a:lnSpc>
-              <a:spcBef>
-                <a:spcPts val="500"/>
-              </a:spcBef>
-              <a:buFont typeface="Arial" panose="020B0604020202020204" pitchFamily="34" charset="0"/>
-              <a:buChar char="•"/>
-              <a:defRPr sz="1800" kern="1200">
-                <a:solidFill>
-                  <a:schemeClr val="tx1"/>
-                </a:solidFill>
-                <a:latin typeface="+mn-lt"/>
-                <a:ea typeface="+mn-ea"/>
-                <a:cs typeface="+mn-cs"/>
-              </a:defRPr>
-            </a:lvl7pPr>
-            <a:lvl8pPr marL="3429000" indent="-228600" algn="l" defTabSz="914400" rtl="0" eaLnBrk="1" latinLnBrk="0" hangingPunct="1">
-              <a:lnSpc>
-                <a:spcPct val="90000"/>
-              </a:lnSpc>
-              <a:spcBef>
-                <a:spcPts val="500"/>
-              </a:spcBef>
-              <a:buFont typeface="Arial" panose="020B0604020202020204" pitchFamily="34" charset="0"/>
-              <a:buChar char="•"/>
-              <a:defRPr sz="1800" kern="1200">
-                <a:solidFill>
-                  <a:schemeClr val="tx1"/>
-                </a:solidFill>
-                <a:latin typeface="+mn-lt"/>
-                <a:ea typeface="+mn-ea"/>
-                <a:cs typeface="+mn-cs"/>
-              </a:defRPr>
-            </a:lvl8pPr>
-            <a:lvl9pPr marL="3886200" indent="-228600" algn="l" defTabSz="914400" rtl="0" eaLnBrk="1" latinLnBrk="0" hangingPunct="1">
-              <a:lnSpc>
-                <a:spcPct val="90000"/>
-              </a:lnSpc>
-              <a:spcBef>
-                <a:spcPts val="500"/>
-              </a:spcBef>
-              <a:buFont typeface="Arial" panose="020B0604020202020204" pitchFamily="34" charset="0"/>
-              <a:buChar char="•"/>
-              <a:defRPr sz="1800" kern="1200">
-                <a:solidFill>
-                  <a:schemeClr val="tx1"/>
-                </a:solidFill>
-                <a:latin typeface="+mn-lt"/>
-                <a:ea typeface="+mn-ea"/>
-                <a:cs typeface="+mn-cs"/>
-              </a:defRPr>
-            </a:lvl9pPr>
-          </a:lstStyle>
-          <a:p>
             <a:r>
               <a:rPr lang="es-ES" sz="2000" dirty="0"/>
               <a:t>Ajustar una regresión lineal simple</a:t>
@@ -7339,7 +6325,7 @@
           <p:cNvPr id="2" name="Título 1">
             <a:extLst>
               <a:ext uri="{FF2B5EF4-FFF2-40B4-BE49-F238E27FC236}">
-                <a16:creationId xmlns:a16="http://schemas.microsoft.com/office/drawing/2014/main" id="{758FBC08-6F65-2E0E-B919-895DCC315CB6}"/>
+                <a16:creationId xmlns:a16="http://schemas.microsoft.com/office/drawing/2014/main" id="{B3394097-780E-C33A-BF84-2B55EBEECA6C}"/>
               </a:ext>
             </a:extLst>
           </p:cNvPr>
@@ -7357,7 +6343,7 @@
           <a:p>
             <a:r>
               <a:rPr lang="es-ES" dirty="0"/>
-              <a:t>Examinar variables categóricas</a:t>
+              <a:t>Transformación: caso del ingreso y tiempo de viaje</a:t>
             </a:r>
             <a:endParaRPr lang="es-CO" dirty="0"/>
           </a:p>
@@ -7365,19 +6351,17 @@
       </p:sp>
       <p:pic>
         <p:nvPicPr>
-          <p:cNvPr id="5" name="Marcador de contenido 4">
-            <a:extLst>
-              <a:ext uri="{FF2B5EF4-FFF2-40B4-BE49-F238E27FC236}">
-                <a16:creationId xmlns:a16="http://schemas.microsoft.com/office/drawing/2014/main" id="{CD1F65B7-C566-D6CD-F6AF-E3BF02CDB9AC}"/>
+          <p:cNvPr id="5" name="Imagen 4">
+            <a:extLst>
+              <a:ext uri="{FF2B5EF4-FFF2-40B4-BE49-F238E27FC236}">
+                <a16:creationId xmlns:a16="http://schemas.microsoft.com/office/drawing/2014/main" id="{E4790729-01F7-FCAC-EBED-7327E834D6E3}"/>
               </a:ext>
             </a:extLst>
           </p:cNvPr>
           <p:cNvPicPr>
-            <a:picLocks noGrp="1" noChangeAspect="1"/>
+            <a:picLocks noChangeAspect="1"/>
           </p:cNvPicPr>
-          <p:nvPr>
-            <p:ph idx="1"/>
-          </p:nvPr>
+          <p:nvPr/>
         </p:nvPicPr>
         <p:blipFill>
           <a:blip r:embed="rId2"/>
@@ -7387,15 +6371,54 @@
         </p:blipFill>
         <p:spPr>
           <a:xfrm>
-            <a:off x="1486101" y="1448120"/>
-            <a:ext cx="9520255" cy="4893902"/>
-          </a:xfrm>
+            <a:off x="3699817" y="1810765"/>
+            <a:ext cx="5041241" cy="4581952"/>
+          </a:xfrm>
+          <a:prstGeom prst="rect">
+            <a:avLst/>
+          </a:prstGeom>
         </p:spPr>
       </p:pic>
+      <p:sp>
+        <p:nvSpPr>
+          <p:cNvPr id="8" name="CuadroTexto 7">
+            <a:extLst>
+              <a:ext uri="{FF2B5EF4-FFF2-40B4-BE49-F238E27FC236}">
+                <a16:creationId xmlns:a16="http://schemas.microsoft.com/office/drawing/2014/main" id="{16F5102A-896F-24AE-E208-380F6BA5ADA9}"/>
+              </a:ext>
+            </a:extLst>
+          </p:cNvPr>
+          <p:cNvSpPr txBox="1"/>
+          <p:nvPr/>
+        </p:nvSpPr>
+        <p:spPr>
+          <a:xfrm>
+            <a:off x="5654181" y="1321356"/>
+            <a:ext cx="1132514" cy="369332"/>
+          </a:xfrm>
+          <a:prstGeom prst="rect">
+            <a:avLst/>
+          </a:prstGeom>
+          <a:noFill/>
+        </p:spPr>
+        <p:txBody>
+          <a:bodyPr wrap="square" rtlCol="0">
+            <a:spAutoFit/>
+          </a:bodyPr>
+          <a:lstStyle/>
+          <a:p>
+            <a:r>
+              <a:rPr lang="es-ES" dirty="0"/>
+              <a:t>Ingreso</a:t>
+            </a:r>
+            <a:endParaRPr lang="es-CO" dirty="0"/>
+          </a:p>
+        </p:txBody>
+      </p:sp>
     </p:spTree>
     <p:extLst>
       <p:ext uri="{BB962C8B-B14F-4D97-AF65-F5344CB8AC3E}">
-        <p14:creationId xmlns:p14="http://schemas.microsoft.com/office/powerpoint/2010/main" val="4186340982"/>
+        <p14:creationId xmlns:p14="http://schemas.microsoft.com/office/powerpoint/2010/main" val="3872630571"/>
       </p:ext>
     </p:extLst>
   </p:cSld>
@@ -7427,7 +6450,7 @@
           <p:cNvPr id="2" name="Título 1">
             <a:extLst>
               <a:ext uri="{FF2B5EF4-FFF2-40B4-BE49-F238E27FC236}">
-                <a16:creationId xmlns:a16="http://schemas.microsoft.com/office/drawing/2014/main" id="{758FBC08-6F65-2E0E-B919-895DCC315CB6}"/>
+                <a16:creationId xmlns:a16="http://schemas.microsoft.com/office/drawing/2014/main" id="{6A97BA76-486F-CB55-C28E-847CB6E676D6}"/>
               </a:ext>
             </a:extLst>
           </p:cNvPr>
@@ -7445,111 +6468,41 @@
           <a:p>
             <a:r>
               <a:rPr lang="es-ES" dirty="0"/>
-              <a:t>Tabla de contingencia</a:t>
+              <a:t>EDA multivariante</a:t>
             </a:r>
             <a:endParaRPr lang="es-CO" dirty="0"/>
           </a:p>
         </p:txBody>
       </p:sp>
-      <p:pic>
-        <p:nvPicPr>
-          <p:cNvPr id="7" name="Marcador de contenido 6">
-            <a:extLst>
-              <a:ext uri="{FF2B5EF4-FFF2-40B4-BE49-F238E27FC236}">
-                <a16:creationId xmlns:a16="http://schemas.microsoft.com/office/drawing/2014/main" id="{C1977025-E0E7-E92E-6B5D-8D42559B9B80}"/>
-              </a:ext>
-            </a:extLst>
-          </p:cNvPr>
-          <p:cNvPicPr>
-            <a:picLocks noGrp="1" noChangeAspect="1"/>
-          </p:cNvPicPr>
+      <p:sp>
+        <p:nvSpPr>
+          <p:cNvPr id="3" name="Marcador de contenido 2">
+            <a:extLst>
+              <a:ext uri="{FF2B5EF4-FFF2-40B4-BE49-F238E27FC236}">
+                <a16:creationId xmlns:a16="http://schemas.microsoft.com/office/drawing/2014/main" id="{A5074468-631E-E576-C197-DC03E072D7D6}"/>
+              </a:ext>
+            </a:extLst>
+          </p:cNvPr>
+          <p:cNvSpPr>
+            <a:spLocks noGrp="1"/>
+          </p:cNvSpPr>
           <p:nvPr>
             <p:ph idx="1"/>
           </p:nvPr>
-        </p:nvPicPr>
-        <p:blipFill>
-          <a:blip r:embed="rId2"/>
-          <a:stretch>
-            <a:fillRect/>
-          </a:stretch>
-        </p:blipFill>
-        <p:spPr>
-          <a:xfrm>
-            <a:off x="754310" y="1581632"/>
-            <a:ext cx="10515600" cy="2456585"/>
-          </a:xfrm>
-        </p:spPr>
-      </p:pic>
-      <p:sp>
-        <p:nvSpPr>
-          <p:cNvPr id="8" name="CuadroTexto 7">
-            <a:extLst>
-              <a:ext uri="{FF2B5EF4-FFF2-40B4-BE49-F238E27FC236}">
-                <a16:creationId xmlns:a16="http://schemas.microsoft.com/office/drawing/2014/main" id="{FB6A37E4-EA6B-7CEA-B8F6-01B164C26755}"/>
-              </a:ext>
-            </a:extLst>
-          </p:cNvPr>
-          <p:cNvSpPr txBox="1"/>
-          <p:nvPr/>
-        </p:nvSpPr>
-        <p:spPr>
-          <a:xfrm>
-            <a:off x="838200" y="4333995"/>
-            <a:ext cx="4286774" cy="369332"/>
-          </a:xfrm>
-          <a:prstGeom prst="rect">
-            <a:avLst/>
-          </a:prstGeom>
-          <a:noFill/>
-        </p:spPr>
-        <p:txBody>
-          <a:bodyPr wrap="square" rtlCol="0">
-            <a:spAutoFit/>
-          </a:bodyPr>
-          <a:lstStyle/>
-          <a:p>
-            <a:r>
-              <a:rPr lang="es-ES" dirty="0"/>
-              <a:t>Prueba Chi-2 de independencia:</a:t>
-            </a:r>
-            <a:endParaRPr lang="es-CO" dirty="0"/>
-          </a:p>
-        </p:txBody>
-      </p:sp>
-      <p:pic>
-        <p:nvPicPr>
-          <p:cNvPr id="10" name="Imagen 9">
-            <a:extLst>
-              <a:ext uri="{FF2B5EF4-FFF2-40B4-BE49-F238E27FC236}">
-                <a16:creationId xmlns:a16="http://schemas.microsoft.com/office/drawing/2014/main" id="{3D5E9E2E-A580-177A-0174-C83C9A40EB24}"/>
-              </a:ext>
-            </a:extLst>
-          </p:cNvPr>
-          <p:cNvPicPr>
-            <a:picLocks noChangeAspect="1"/>
-          </p:cNvPicPr>
-          <p:nvPr/>
-        </p:nvPicPr>
-        <p:blipFill>
-          <a:blip r:embed="rId3"/>
-          <a:stretch>
-            <a:fillRect/>
-          </a:stretch>
-        </p:blipFill>
-        <p:spPr>
-          <a:xfrm>
-            <a:off x="4043362" y="5099895"/>
-            <a:ext cx="4105275" cy="819150"/>
-          </a:xfrm>
-          <a:prstGeom prst="rect">
-            <a:avLst/>
-          </a:prstGeom>
-        </p:spPr>
-      </p:pic>
+        </p:nvSpPr>
+        <p:spPr/>
+        <p:txBody>
+          <a:bodyPr/>
+          <a:lstStyle/>
+          <a:p>
+            <a:endParaRPr lang="es-CO"/>
+          </a:p>
+        </p:txBody>
+      </p:sp>
     </p:spTree>
     <p:extLst>
       <p:ext uri="{BB962C8B-B14F-4D97-AF65-F5344CB8AC3E}">
-        <p14:creationId xmlns:p14="http://schemas.microsoft.com/office/powerpoint/2010/main" val="675175082"/>
+        <p14:creationId xmlns:p14="http://schemas.microsoft.com/office/powerpoint/2010/main" val="1489651553"/>
       </p:ext>
     </p:extLst>
   </p:cSld>
@@ -7581,7 +6534,7 @@
           <p:cNvPr id="2" name="Título 1">
             <a:extLst>
               <a:ext uri="{FF2B5EF4-FFF2-40B4-BE49-F238E27FC236}">
-                <a16:creationId xmlns:a16="http://schemas.microsoft.com/office/drawing/2014/main" id="{758FBC08-6F65-2E0E-B919-895DCC315CB6}"/>
+                <a16:creationId xmlns:a16="http://schemas.microsoft.com/office/drawing/2014/main" id="{6A97BA76-486F-CB55-C28E-847CB6E676D6}"/>
               </a:ext>
             </a:extLst>
           </p:cNvPr>
@@ -7594,61 +6547,28 @@
         </p:nvSpPr>
         <p:spPr>
           <a:xfrm>
-            <a:off x="617075" y="130233"/>
-            <a:ext cx="10515600" cy="1325563"/>
-          </a:xfrm>
-        </p:spPr>
-        <p:txBody>
-          <a:bodyPr/>
+            <a:off x="6096000" y="5046181"/>
+            <a:ext cx="5721991" cy="1325563"/>
+          </a:xfrm>
+        </p:spPr>
+        <p:txBody>
+          <a:bodyPr>
+            <a:normAutofit/>
+          </a:bodyPr>
           <a:lstStyle/>
           <a:p>
             <a:r>
               <a:rPr lang="es-ES" dirty="0"/>
-              <a:t>Mosaico </a:t>
+              <a:t>Análisis de variables categóricas</a:t>
             </a:r>
             <a:endParaRPr lang="es-CO" dirty="0"/>
           </a:p>
         </p:txBody>
       </p:sp>
-      <p:pic>
-        <p:nvPicPr>
-          <p:cNvPr id="6" name="Imagen 5">
-            <a:extLst>
-              <a:ext uri="{FF2B5EF4-FFF2-40B4-BE49-F238E27FC236}">
-                <a16:creationId xmlns:a16="http://schemas.microsoft.com/office/drawing/2014/main" id="{F03F8803-2261-0629-C305-20A421E7D525}"/>
-              </a:ext>
-            </a:extLst>
-          </p:cNvPr>
-          <p:cNvPicPr>
-            <a:picLocks noChangeAspect="1"/>
-          </p:cNvPicPr>
-          <p:nvPr/>
-        </p:nvPicPr>
-        <p:blipFill>
-          <a:blip r:embed="rId2"/>
-          <a:stretch>
-            <a:fillRect/>
-          </a:stretch>
-        </p:blipFill>
-        <p:spPr>
-          <a:xfrm>
-            <a:off x="1059324" y="1249960"/>
-            <a:ext cx="10073351" cy="5242915"/>
-          </a:xfrm>
-          <a:prstGeom prst="rect">
-            <a:avLst/>
-          </a:prstGeom>
-          <a:ln w="12700">
-            <a:solidFill>
-              <a:schemeClr val="tx1"/>
-            </a:solidFill>
-          </a:ln>
-        </p:spPr>
-      </p:pic>
     </p:spTree>
     <p:extLst>
       <p:ext uri="{BB962C8B-B14F-4D97-AF65-F5344CB8AC3E}">
-        <p14:creationId xmlns:p14="http://schemas.microsoft.com/office/powerpoint/2010/main" val="1570179402"/>
+        <p14:creationId xmlns:p14="http://schemas.microsoft.com/office/powerpoint/2010/main" val="1404860635"/>
       </p:ext>
     </p:extLst>
   </p:cSld>
@@ -7691,19 +6611,14 @@
             <p:ph type="title"/>
           </p:nvPr>
         </p:nvSpPr>
-        <p:spPr>
-          <a:xfrm>
-            <a:off x="838200" y="155623"/>
-            <a:ext cx="10515600" cy="1325563"/>
-          </a:xfrm>
-        </p:spPr>
+        <p:spPr/>
         <p:txBody>
           <a:bodyPr/>
           <a:lstStyle/>
           <a:p>
             <a:r>
               <a:rPr lang="es-ES" dirty="0"/>
-              <a:t>Examinar variables categóricas (cont.) </a:t>
+              <a:t>Examinar variables categóricas</a:t>
             </a:r>
             <a:endParaRPr lang="es-CO" dirty="0"/>
           </a:p>
@@ -7711,17 +6626,19 @@
       </p:sp>
       <p:pic>
         <p:nvPicPr>
-          <p:cNvPr id="4" name="Imagen 3">
-            <a:extLst>
-              <a:ext uri="{FF2B5EF4-FFF2-40B4-BE49-F238E27FC236}">
-                <a16:creationId xmlns:a16="http://schemas.microsoft.com/office/drawing/2014/main" id="{4E1FBA2F-3F7C-C2EA-0F73-A3F47736D450}"/>
+          <p:cNvPr id="5" name="Marcador de contenido 4">
+            <a:extLst>
+              <a:ext uri="{FF2B5EF4-FFF2-40B4-BE49-F238E27FC236}">
+                <a16:creationId xmlns:a16="http://schemas.microsoft.com/office/drawing/2014/main" id="{CD1F65B7-C566-D6CD-F6AF-E3BF02CDB9AC}"/>
               </a:ext>
             </a:extLst>
           </p:cNvPr>
           <p:cNvPicPr>
-            <a:picLocks noChangeAspect="1"/>
+            <a:picLocks noGrp="1" noChangeAspect="1"/>
           </p:cNvPicPr>
-          <p:nvPr/>
+          <p:nvPr>
+            <p:ph idx="1"/>
+          </p:nvPr>
         </p:nvPicPr>
         <p:blipFill>
           <a:blip r:embed="rId2"/>
@@ -7731,166 +6648,15 @@
         </p:blipFill>
         <p:spPr>
           <a:xfrm>
-            <a:off x="1165851" y="1321796"/>
-            <a:ext cx="4930149" cy="5078131"/>
-          </a:xfrm>
-          <a:prstGeom prst="rect">
-            <a:avLst/>
-          </a:prstGeom>
-          <a:ln w="12700">
-            <a:solidFill>
-              <a:schemeClr val="tx1"/>
-            </a:solidFill>
-          </a:ln>
+            <a:off x="1486101" y="1448120"/>
+            <a:ext cx="9520255" cy="4893902"/>
+          </a:xfrm>
         </p:spPr>
       </p:pic>
-      <p:pic>
-        <p:nvPicPr>
-          <p:cNvPr id="7" name="Imagen 6">
-            <a:extLst>
-              <a:ext uri="{FF2B5EF4-FFF2-40B4-BE49-F238E27FC236}">
-                <a16:creationId xmlns:a16="http://schemas.microsoft.com/office/drawing/2014/main" id="{944EF5AA-5893-7CA2-2250-1F6835C2EDD0}"/>
-              </a:ext>
-            </a:extLst>
-          </p:cNvPr>
-          <p:cNvPicPr>
-            <a:picLocks noChangeAspect="1"/>
-          </p:cNvPicPr>
-          <p:nvPr/>
-        </p:nvPicPr>
-        <p:blipFill>
-          <a:blip r:embed="rId3"/>
-          <a:stretch>
-            <a:fillRect/>
-          </a:stretch>
-        </p:blipFill>
-        <p:spPr>
-          <a:xfrm>
-            <a:off x="7806437" y="2410485"/>
-            <a:ext cx="2152650" cy="1895475"/>
-          </a:xfrm>
-          <a:prstGeom prst="rect">
-            <a:avLst/>
-          </a:prstGeom>
-          <a:ln w="12700">
-            <a:solidFill>
-              <a:schemeClr val="tx1"/>
-            </a:solidFill>
-          </a:ln>
-        </p:spPr>
-      </p:pic>
-      <p:sp>
-        <p:nvSpPr>
-          <p:cNvPr id="8" name="CuadroTexto 7">
-            <a:extLst>
-              <a:ext uri="{FF2B5EF4-FFF2-40B4-BE49-F238E27FC236}">
-                <a16:creationId xmlns:a16="http://schemas.microsoft.com/office/drawing/2014/main" id="{30C82750-CC75-68DC-6892-D0F91C60A40F}"/>
-              </a:ext>
-            </a:extLst>
-          </p:cNvPr>
-          <p:cNvSpPr txBox="1"/>
-          <p:nvPr/>
-        </p:nvSpPr>
-        <p:spPr>
-          <a:xfrm>
-            <a:off x="6581513" y="1481186"/>
-            <a:ext cx="4286774" cy="646331"/>
-          </a:xfrm>
-          <a:prstGeom prst="rect">
-            <a:avLst/>
-          </a:prstGeom>
-          <a:noFill/>
-        </p:spPr>
-        <p:txBody>
-          <a:bodyPr wrap="square" rtlCol="0">
-            <a:spAutoFit/>
-          </a:bodyPr>
-          <a:lstStyle/>
-          <a:p>
-            <a:r>
-              <a:rPr lang="es-ES" dirty="0"/>
-              <a:t>Los resultados son verificados mediante una prueba chi-2 por independencia</a:t>
-            </a:r>
-            <a:endParaRPr lang="es-CO" dirty="0"/>
-          </a:p>
-        </p:txBody>
-      </p:sp>
-      <p:sp>
-        <p:nvSpPr>
-          <p:cNvPr id="9" name="CuadroTexto 8">
-            <a:extLst>
-              <a:ext uri="{FF2B5EF4-FFF2-40B4-BE49-F238E27FC236}">
-                <a16:creationId xmlns:a16="http://schemas.microsoft.com/office/drawing/2014/main" id="{DB7F0733-3C70-7C1A-7DED-83E0D4903130}"/>
-              </a:ext>
-            </a:extLst>
-          </p:cNvPr>
-          <p:cNvSpPr txBox="1"/>
-          <p:nvPr/>
-        </p:nvSpPr>
-        <p:spPr>
-          <a:xfrm>
-            <a:off x="6739375" y="5376814"/>
-            <a:ext cx="4286774" cy="923330"/>
-          </a:xfrm>
-          <a:prstGeom prst="rect">
-            <a:avLst/>
-          </a:prstGeom>
-          <a:noFill/>
-        </p:spPr>
-        <p:txBody>
-          <a:bodyPr wrap="square" rtlCol="0">
-            <a:spAutoFit/>
-          </a:bodyPr>
-          <a:lstStyle/>
-          <a:p>
-            <a:r>
-              <a:rPr lang="es-ES" dirty="0"/>
-              <a:t>Nota: esta forma extendida no debe ser el centro. Sólo deben aprender a correr la prueba.</a:t>
-            </a:r>
-            <a:endParaRPr lang="es-CO" dirty="0"/>
-          </a:p>
-        </p:txBody>
-      </p:sp>
-      <p:sp>
-        <p:nvSpPr>
-          <p:cNvPr id="10" name="CuadroTexto 9">
-            <a:extLst>
-              <a:ext uri="{FF2B5EF4-FFF2-40B4-BE49-F238E27FC236}">
-                <a16:creationId xmlns:a16="http://schemas.microsoft.com/office/drawing/2014/main" id="{72560CEF-612D-FF02-75BB-533B77B5B46A}"/>
-              </a:ext>
-            </a:extLst>
-          </p:cNvPr>
-          <p:cNvSpPr txBox="1"/>
-          <p:nvPr/>
-        </p:nvSpPr>
-        <p:spPr>
-          <a:xfrm>
-            <a:off x="6739375" y="4588928"/>
-            <a:ext cx="4286774" cy="646331"/>
-          </a:xfrm>
-          <a:prstGeom prst="rect">
-            <a:avLst/>
-          </a:prstGeom>
-          <a:noFill/>
-        </p:spPr>
-        <p:txBody>
-          <a:bodyPr wrap="square" rtlCol="0">
-            <a:spAutoFit/>
-          </a:bodyPr>
-          <a:lstStyle/>
-          <a:p>
-            <a:r>
-              <a:rPr lang="es-ES" dirty="0"/>
-              <a:t>Lo mismo se realiza para la variable educación</a:t>
-            </a:r>
-            <a:endParaRPr lang="es-CO" dirty="0"/>
-          </a:p>
-        </p:txBody>
-      </p:sp>
     </p:spTree>
     <p:extLst>
       <p:ext uri="{BB962C8B-B14F-4D97-AF65-F5344CB8AC3E}">
-        <p14:creationId xmlns:p14="http://schemas.microsoft.com/office/powerpoint/2010/main" val="1385627984"/>
+        <p14:creationId xmlns:p14="http://schemas.microsoft.com/office/powerpoint/2010/main" val="4186340982"/>
       </p:ext>
     </p:extLst>
   </p:cSld>
@@ -7922,7 +6688,7 @@
           <p:cNvPr id="2" name="Título 1">
             <a:extLst>
               <a:ext uri="{FF2B5EF4-FFF2-40B4-BE49-F238E27FC236}">
-                <a16:creationId xmlns:a16="http://schemas.microsoft.com/office/drawing/2014/main" id="{3FA5BEAA-1C13-D6B6-7AFE-5A28A5A37B23}"/>
+                <a16:creationId xmlns:a16="http://schemas.microsoft.com/office/drawing/2014/main" id="{758FBC08-6F65-2E0E-B919-895DCC315CB6}"/>
               </a:ext>
             </a:extLst>
           </p:cNvPr>
@@ -7933,19 +6699,14 @@
             <p:ph type="title"/>
           </p:nvPr>
         </p:nvSpPr>
-        <p:spPr>
-          <a:xfrm>
-            <a:off x="829811" y="245991"/>
-            <a:ext cx="3935136" cy="1287506"/>
-          </a:xfrm>
-        </p:spPr>
+        <p:spPr/>
         <p:txBody>
           <a:bodyPr/>
           <a:lstStyle/>
           <a:p>
             <a:r>
               <a:rPr lang="es-ES" dirty="0"/>
-              <a:t>Alternativa:</a:t>
+              <a:t>Tabla de contingencia</a:t>
             </a:r>
             <a:endParaRPr lang="es-CO" dirty="0"/>
           </a:p>
@@ -7953,17 +6714,19 @@
       </p:sp>
       <p:pic>
         <p:nvPicPr>
-          <p:cNvPr id="5" name="Imagen 4">
-            <a:extLst>
-              <a:ext uri="{FF2B5EF4-FFF2-40B4-BE49-F238E27FC236}">
-                <a16:creationId xmlns:a16="http://schemas.microsoft.com/office/drawing/2014/main" id="{7EC0A3F9-3ADF-D5BE-3E96-97953F377372}"/>
+          <p:cNvPr id="7" name="Marcador de contenido 6">
+            <a:extLst>
+              <a:ext uri="{FF2B5EF4-FFF2-40B4-BE49-F238E27FC236}">
+                <a16:creationId xmlns:a16="http://schemas.microsoft.com/office/drawing/2014/main" id="{C1977025-E0E7-E92E-6B5D-8D42559B9B80}"/>
               </a:ext>
             </a:extLst>
           </p:cNvPr>
           <p:cNvPicPr>
-            <a:picLocks noChangeAspect="1"/>
+            <a:picLocks noGrp="1" noChangeAspect="1"/>
           </p:cNvPicPr>
-          <p:nvPr/>
+          <p:nvPr>
+            <p:ph idx="1"/>
+          </p:nvPr>
         </p:nvPicPr>
         <p:blipFill>
           <a:blip r:embed="rId2"/>
@@ -7973,12 +6736,9 @@
         </p:blipFill>
         <p:spPr>
           <a:xfrm>
-            <a:off x="6316909" y="2024897"/>
-            <a:ext cx="5595458" cy="4536035"/>
-          </a:xfrm>
-          <a:prstGeom prst="rect">
-            <a:avLst/>
-          </a:prstGeom>
+            <a:off x="754310" y="1581632"/>
+            <a:ext cx="10515600" cy="2456585"/>
+          </a:xfrm>
         </p:spPr>
       </p:pic>
       <p:sp>
@@ -7986,7 +6746,7 @@
           <p:cNvPr id="8" name="CuadroTexto 7">
             <a:extLst>
               <a:ext uri="{FF2B5EF4-FFF2-40B4-BE49-F238E27FC236}">
-                <a16:creationId xmlns:a16="http://schemas.microsoft.com/office/drawing/2014/main" id="{2898B067-88E6-D5A8-0EDC-5142C573B3F8}"/>
+                <a16:creationId xmlns:a16="http://schemas.microsoft.com/office/drawing/2014/main" id="{FB6A37E4-EA6B-7CEA-B8F6-01B164C26755}"/>
               </a:ext>
             </a:extLst>
           </p:cNvPr>
@@ -7995,8 +6755,8 @@
         </p:nvSpPr>
         <p:spPr>
           <a:xfrm>
-            <a:off x="486562" y="1348831"/>
-            <a:ext cx="10754686" cy="369332"/>
+            <a:off x="838200" y="4333995"/>
+            <a:ext cx="4286774" cy="369332"/>
           </a:xfrm>
           <a:prstGeom prst="rect">
             <a:avLst/>
@@ -8011,7 +6771,7 @@
           <a:p>
             <a:r>
               <a:rPr lang="es-ES" dirty="0"/>
-              <a:t>Esta es una forma sencilla de mostrar el resultado diferenciado por grupos (pares de variables categóricas).</a:t>
+              <a:t>Prueba Chi-2 de independencia:</a:t>
             </a:r>
             <a:endParaRPr lang="es-CO" dirty="0"/>
           </a:p>
@@ -8022,7 +6782,7 @@
           <p:cNvPr id="10" name="Imagen 9">
             <a:extLst>
               <a:ext uri="{FF2B5EF4-FFF2-40B4-BE49-F238E27FC236}">
-                <a16:creationId xmlns:a16="http://schemas.microsoft.com/office/drawing/2014/main" id="{E062E314-B9BC-451B-FF53-1E6FE556E821}"/>
+                <a16:creationId xmlns:a16="http://schemas.microsoft.com/office/drawing/2014/main" id="{3D5E9E2E-A580-177A-0174-C83C9A40EB24}"/>
               </a:ext>
             </a:extLst>
           </p:cNvPr>
@@ -8039,8 +6799,8 @@
         </p:blipFill>
         <p:spPr>
           <a:xfrm>
-            <a:off x="486561" y="2024897"/>
-            <a:ext cx="5830348" cy="4536035"/>
+            <a:off x="4043362" y="5099895"/>
+            <a:ext cx="4105275" cy="819150"/>
           </a:xfrm>
           <a:prstGeom prst="rect">
             <a:avLst/>
@@ -8050,7 +6810,7 @@
     </p:spTree>
     <p:extLst>
       <p:ext uri="{BB962C8B-B14F-4D97-AF65-F5344CB8AC3E}">
-        <p14:creationId xmlns:p14="http://schemas.microsoft.com/office/powerpoint/2010/main" val="3052615878"/>
+        <p14:creationId xmlns:p14="http://schemas.microsoft.com/office/powerpoint/2010/main" val="675175082"/>
       </p:ext>
     </p:extLst>
   </p:cSld>
@@ -8082,7 +6842,7 @@
           <p:cNvPr id="2" name="Título 1">
             <a:extLst>
               <a:ext uri="{FF2B5EF4-FFF2-40B4-BE49-F238E27FC236}">
-                <a16:creationId xmlns:a16="http://schemas.microsoft.com/office/drawing/2014/main" id="{6A97BA76-486F-CB55-C28E-847CB6E676D6}"/>
+                <a16:creationId xmlns:a16="http://schemas.microsoft.com/office/drawing/2014/main" id="{758FBC08-6F65-2E0E-B919-895DCC315CB6}"/>
               </a:ext>
             </a:extLst>
           </p:cNvPr>
@@ -8095,28 +6855,61 @@
         </p:nvSpPr>
         <p:spPr>
           <a:xfrm>
-            <a:off x="6096000" y="5046181"/>
-            <a:ext cx="5721991" cy="1325563"/>
-          </a:xfrm>
-        </p:spPr>
-        <p:txBody>
-          <a:bodyPr>
-            <a:normAutofit/>
-          </a:bodyPr>
+            <a:off x="617075" y="130233"/>
+            <a:ext cx="10515600" cy="1325563"/>
+          </a:xfrm>
+        </p:spPr>
+        <p:txBody>
+          <a:bodyPr/>
           <a:lstStyle/>
           <a:p>
             <a:r>
               <a:rPr lang="es-ES" dirty="0"/>
-              <a:t>Análisis de variables continuas según grupos</a:t>
+              <a:t>Mosaico </a:t>
             </a:r>
             <a:endParaRPr lang="es-CO" dirty="0"/>
           </a:p>
         </p:txBody>
       </p:sp>
+      <p:pic>
+        <p:nvPicPr>
+          <p:cNvPr id="6" name="Imagen 5">
+            <a:extLst>
+              <a:ext uri="{FF2B5EF4-FFF2-40B4-BE49-F238E27FC236}">
+                <a16:creationId xmlns:a16="http://schemas.microsoft.com/office/drawing/2014/main" id="{F03F8803-2261-0629-C305-20A421E7D525}"/>
+              </a:ext>
+            </a:extLst>
+          </p:cNvPr>
+          <p:cNvPicPr>
+            <a:picLocks noChangeAspect="1"/>
+          </p:cNvPicPr>
+          <p:nvPr/>
+        </p:nvPicPr>
+        <p:blipFill>
+          <a:blip r:embed="rId2"/>
+          <a:stretch>
+            <a:fillRect/>
+          </a:stretch>
+        </p:blipFill>
+        <p:spPr>
+          <a:xfrm>
+            <a:off x="1059324" y="1249960"/>
+            <a:ext cx="10073351" cy="5242915"/>
+          </a:xfrm>
+          <a:prstGeom prst="rect">
+            <a:avLst/>
+          </a:prstGeom>
+          <a:ln w="12700">
+            <a:solidFill>
+              <a:schemeClr val="tx1"/>
+            </a:solidFill>
+          </a:ln>
+        </p:spPr>
+      </p:pic>
     </p:spTree>
     <p:extLst>
       <p:ext uri="{BB962C8B-B14F-4D97-AF65-F5344CB8AC3E}">
-        <p14:creationId xmlns:p14="http://schemas.microsoft.com/office/powerpoint/2010/main" val="1333504306"/>
+        <p14:creationId xmlns:p14="http://schemas.microsoft.com/office/powerpoint/2010/main" val="1570179402"/>
       </p:ext>
     </p:extLst>
   </p:cSld>

</xml_diff>

<commit_message>
Ajustes sobre el modulo 3
</commit_message>
<xml_diff>
--- a/Módulos/Módulo 3/Boceto/Boceto.pptx
+++ b/Módulos/Módulo 3/Boceto/Boceto.pptx
@@ -293,7 +293,7 @@
           <a:p>
             <a:fld id="{92A6B4C6-52FB-4472-9FB7-3E8303B7B811}" type="datetimeFigureOut">
               <a:rPr lang="es-CO" smtClean="0"/>
-              <a:t>20/03/2024</a:t>
+              <a:t>22/03/2024</a:t>
             </a:fld>
             <a:endParaRPr lang="es-CO"/>
           </a:p>
@@ -493,7 +493,7 @@
           <a:p>
             <a:fld id="{92A6B4C6-52FB-4472-9FB7-3E8303B7B811}" type="datetimeFigureOut">
               <a:rPr lang="es-CO" smtClean="0"/>
-              <a:t>20/03/2024</a:t>
+              <a:t>22/03/2024</a:t>
             </a:fld>
             <a:endParaRPr lang="es-CO"/>
           </a:p>
@@ -703,7 +703,7 @@
           <a:p>
             <a:fld id="{92A6B4C6-52FB-4472-9FB7-3E8303B7B811}" type="datetimeFigureOut">
               <a:rPr lang="es-CO" smtClean="0"/>
-              <a:t>20/03/2024</a:t>
+              <a:t>22/03/2024</a:t>
             </a:fld>
             <a:endParaRPr lang="es-CO"/>
           </a:p>
@@ -903,7 +903,7 @@
           <a:p>
             <a:fld id="{92A6B4C6-52FB-4472-9FB7-3E8303B7B811}" type="datetimeFigureOut">
               <a:rPr lang="es-CO" smtClean="0"/>
-              <a:t>20/03/2024</a:t>
+              <a:t>22/03/2024</a:t>
             </a:fld>
             <a:endParaRPr lang="es-CO"/>
           </a:p>
@@ -1179,7 +1179,7 @@
           <a:p>
             <a:fld id="{92A6B4C6-52FB-4472-9FB7-3E8303B7B811}" type="datetimeFigureOut">
               <a:rPr lang="es-CO" smtClean="0"/>
-              <a:t>20/03/2024</a:t>
+              <a:t>22/03/2024</a:t>
             </a:fld>
             <a:endParaRPr lang="es-CO"/>
           </a:p>
@@ -1447,7 +1447,7 @@
           <a:p>
             <a:fld id="{92A6B4C6-52FB-4472-9FB7-3E8303B7B811}" type="datetimeFigureOut">
               <a:rPr lang="es-CO" smtClean="0"/>
-              <a:t>20/03/2024</a:t>
+              <a:t>22/03/2024</a:t>
             </a:fld>
             <a:endParaRPr lang="es-CO"/>
           </a:p>
@@ -1862,7 +1862,7 @@
           <a:p>
             <a:fld id="{92A6B4C6-52FB-4472-9FB7-3E8303B7B811}" type="datetimeFigureOut">
               <a:rPr lang="es-CO" smtClean="0"/>
-              <a:t>20/03/2024</a:t>
+              <a:t>22/03/2024</a:t>
             </a:fld>
             <a:endParaRPr lang="es-CO"/>
           </a:p>
@@ -2004,7 +2004,7 @@
           <a:p>
             <a:fld id="{92A6B4C6-52FB-4472-9FB7-3E8303B7B811}" type="datetimeFigureOut">
               <a:rPr lang="es-CO" smtClean="0"/>
-              <a:t>20/03/2024</a:t>
+              <a:t>22/03/2024</a:t>
             </a:fld>
             <a:endParaRPr lang="es-CO"/>
           </a:p>
@@ -2117,7 +2117,7 @@
           <a:p>
             <a:fld id="{92A6B4C6-52FB-4472-9FB7-3E8303B7B811}" type="datetimeFigureOut">
               <a:rPr lang="es-CO" smtClean="0"/>
-              <a:t>20/03/2024</a:t>
+              <a:t>22/03/2024</a:t>
             </a:fld>
             <a:endParaRPr lang="es-CO"/>
           </a:p>
@@ -2430,7 +2430,7 @@
           <a:p>
             <a:fld id="{92A6B4C6-52FB-4472-9FB7-3E8303B7B811}" type="datetimeFigureOut">
               <a:rPr lang="es-CO" smtClean="0"/>
-              <a:t>20/03/2024</a:t>
+              <a:t>22/03/2024</a:t>
             </a:fld>
             <a:endParaRPr lang="es-CO"/>
           </a:p>
@@ -2719,7 +2719,7 @@
           <a:p>
             <a:fld id="{92A6B4C6-52FB-4472-9FB7-3E8303B7B811}" type="datetimeFigureOut">
               <a:rPr lang="es-CO" smtClean="0"/>
-              <a:t>20/03/2024</a:t>
+              <a:t>22/03/2024</a:t>
             </a:fld>
             <a:endParaRPr lang="es-CO"/>
           </a:p>
@@ -2962,7 +2962,7 @@
           <a:p>
             <a:fld id="{92A6B4C6-52FB-4472-9FB7-3E8303B7B811}" type="datetimeFigureOut">
               <a:rPr lang="es-CO" smtClean="0"/>
-              <a:t>20/03/2024</a:t>
+              <a:t>22/03/2024</a:t>
             </a:fld>
             <a:endParaRPr lang="es-CO"/>
           </a:p>
@@ -3499,10 +3499,10 @@
       </p:sp>
       <p:pic>
         <p:nvPicPr>
-          <p:cNvPr id="4" name="Imagen 3">
-            <a:extLst>
-              <a:ext uri="{FF2B5EF4-FFF2-40B4-BE49-F238E27FC236}">
-                <a16:creationId xmlns:a16="http://schemas.microsoft.com/office/drawing/2014/main" id="{4E1FBA2F-3F7C-C2EA-0F73-A3F47736D450}"/>
+          <p:cNvPr id="7" name="Imagen 6">
+            <a:extLst>
+              <a:ext uri="{FF2B5EF4-FFF2-40B4-BE49-F238E27FC236}">
+                <a16:creationId xmlns:a16="http://schemas.microsoft.com/office/drawing/2014/main" id="{944EF5AA-5893-7CA2-2250-1F6835C2EDD0}"/>
               </a:ext>
             </a:extLst>
           </p:cNvPr>
@@ -3519,8 +3519,8 @@
         </p:blipFill>
         <p:spPr>
           <a:xfrm>
-            <a:off x="1165851" y="1321796"/>
-            <a:ext cx="4930149" cy="5078131"/>
+            <a:off x="1613027" y="2243809"/>
+            <a:ext cx="2152650" cy="1895475"/>
           </a:xfrm>
           <a:prstGeom prst="rect">
             <a:avLst/>
@@ -3532,41 +3532,6 @@
           </a:ln>
         </p:spPr>
       </p:pic>
-      <p:pic>
-        <p:nvPicPr>
-          <p:cNvPr id="7" name="Imagen 6">
-            <a:extLst>
-              <a:ext uri="{FF2B5EF4-FFF2-40B4-BE49-F238E27FC236}">
-                <a16:creationId xmlns:a16="http://schemas.microsoft.com/office/drawing/2014/main" id="{944EF5AA-5893-7CA2-2250-1F6835C2EDD0}"/>
-              </a:ext>
-            </a:extLst>
-          </p:cNvPr>
-          <p:cNvPicPr>
-            <a:picLocks noChangeAspect="1"/>
-          </p:cNvPicPr>
-          <p:nvPr/>
-        </p:nvPicPr>
-        <p:blipFill>
-          <a:blip r:embed="rId3"/>
-          <a:stretch>
-            <a:fillRect/>
-          </a:stretch>
-        </p:blipFill>
-        <p:spPr>
-          <a:xfrm>
-            <a:off x="7806437" y="2410485"/>
-            <a:ext cx="2152650" cy="1895475"/>
-          </a:xfrm>
-          <a:prstGeom prst="rect">
-            <a:avLst/>
-          </a:prstGeom>
-          <a:ln w="12700">
-            <a:solidFill>
-              <a:schemeClr val="tx1"/>
-            </a:solidFill>
-          </a:ln>
-        </p:spPr>
-      </p:pic>
       <p:sp>
         <p:nvSpPr>
           <p:cNvPr id="8" name="CuadroTexto 7">
@@ -3581,8 +3546,8 @@
         </p:nvSpPr>
         <p:spPr>
           <a:xfrm>
-            <a:off x="6581513" y="1481186"/>
-            <a:ext cx="4286774" cy="646331"/>
+            <a:off x="765174" y="1158020"/>
+            <a:ext cx="10260975" cy="646331"/>
           </a:xfrm>
           <a:prstGeom prst="rect">
             <a:avLst/>
@@ -3597,7 +3562,7 @@
           <a:p>
             <a:r>
               <a:rPr lang="es-ES" dirty="0"/>
-              <a:t>Los resultados son verificados mediante una prueba chi-2 por independencia</a:t>
+              <a:t>Los resultados son verificados mediante una prueba chi-2 por independencia: ¿qué debería aparecer? El resumen con estadístico y valor-p. </a:t>
             </a:r>
             <a:endParaRPr lang="es-CO" dirty="0"/>
           </a:p>
@@ -3617,7 +3582,7 @@
         </p:nvSpPr>
         <p:spPr>
           <a:xfrm>
-            <a:off x="6739375" y="5376814"/>
+            <a:off x="1356670" y="5366628"/>
             <a:ext cx="4286774" cy="923330"/>
           </a:xfrm>
           <a:prstGeom prst="rect">
@@ -3653,7 +3618,7 @@
         </p:nvSpPr>
         <p:spPr>
           <a:xfrm>
-            <a:off x="6739375" y="4588928"/>
+            <a:off x="1356670" y="4578742"/>
             <a:ext cx="4286774" cy="646331"/>
           </a:xfrm>
           <a:prstGeom prst="rect">
@@ -3670,6 +3635,42 @@
             <a:r>
               <a:rPr lang="es-ES" dirty="0"/>
               <a:t>Lo mismo se realiza para la variable educación</a:t>
+            </a:r>
+            <a:endParaRPr lang="es-CO" dirty="0"/>
+          </a:p>
+        </p:txBody>
+      </p:sp>
+      <p:sp>
+        <p:nvSpPr>
+          <p:cNvPr id="12" name="CuadroTexto 11">
+            <a:extLst>
+              <a:ext uri="{FF2B5EF4-FFF2-40B4-BE49-F238E27FC236}">
+                <a16:creationId xmlns:a16="http://schemas.microsoft.com/office/drawing/2014/main" id="{F4F069F6-BD6A-40DE-9CC2-8223B7CF665F}"/>
+              </a:ext>
+            </a:extLst>
+          </p:cNvPr>
+          <p:cNvSpPr txBox="1"/>
+          <p:nvPr/>
+        </p:nvSpPr>
+        <p:spPr>
+          <a:xfrm>
+            <a:off x="6505276" y="2428068"/>
+            <a:ext cx="4286774" cy="646331"/>
+          </a:xfrm>
+          <a:prstGeom prst="rect">
+            <a:avLst/>
+          </a:prstGeom>
+          <a:noFill/>
+        </p:spPr>
+        <p:txBody>
+          <a:bodyPr wrap="square" rtlCol="0">
+            <a:spAutoFit/>
+          </a:bodyPr>
+          <a:lstStyle/>
+          <a:p>
+            <a:r>
+              <a:rPr lang="es-ES" dirty="0"/>
+              <a:t>Recuérdese que la hipótesis nula es la siguiente:</a:t>
             </a:r>
             <a:endParaRPr lang="es-CO" dirty="0"/>
           </a:p>

</xml_diff>